<commit_message>
changing product graph to match formal description
</commit_message>
<xml_diff>
--- a/paper/figures/compilation.pptx
+++ b/paper/figures/compilation.pptx
@@ -8,9 +8,10 @@
     <p:sldId id="408" r:id="rId2"/>
     <p:sldId id="409" r:id="rId3"/>
     <p:sldId id="410" r:id="rId4"/>
-    <p:sldId id="411" r:id="rId5"/>
-    <p:sldId id="412" r:id="rId6"/>
-    <p:sldId id="413" r:id="rId7"/>
+    <p:sldId id="414" r:id="rId5"/>
+    <p:sldId id="411" r:id="rId6"/>
+    <p:sldId id="412" r:id="rId7"/>
+    <p:sldId id="413" r:id="rId8"/>
   </p:sldIdLst>
   <p:sldSz cx="12192000" cy="6858000"/>
   <p:notesSz cx="6858000" cy="9144000"/>
@@ -248,7 +249,7 @@
           <a:p>
             <a:fld id="{D1C2FE12-02FD-40D2-9E73-08CF8D46514A}" type="datetimeFigureOut">
               <a:rPr lang="en-US" smtClean="0"/>
-              <a:t>1/27/2016</a:t>
+              <a:t>1/28/16</a:t>
             </a:fld>
             <a:endParaRPr lang="en-US"/>
           </a:p>
@@ -418,7 +419,7 @@
           <a:p>
             <a:fld id="{D1C2FE12-02FD-40D2-9E73-08CF8D46514A}" type="datetimeFigureOut">
               <a:rPr lang="en-US" smtClean="0"/>
-              <a:t>1/27/2016</a:t>
+              <a:t>1/28/16</a:t>
             </a:fld>
             <a:endParaRPr lang="en-US"/>
           </a:p>
@@ -598,7 +599,7 @@
           <a:p>
             <a:fld id="{D1C2FE12-02FD-40D2-9E73-08CF8D46514A}" type="datetimeFigureOut">
               <a:rPr lang="en-US" smtClean="0"/>
-              <a:t>1/27/2016</a:t>
+              <a:t>1/28/16</a:t>
             </a:fld>
             <a:endParaRPr lang="en-US"/>
           </a:p>
@@ -768,7 +769,7 @@
           <a:p>
             <a:fld id="{D1C2FE12-02FD-40D2-9E73-08CF8D46514A}" type="datetimeFigureOut">
               <a:rPr lang="en-US" smtClean="0"/>
-              <a:t>1/27/2016</a:t>
+              <a:t>1/28/16</a:t>
             </a:fld>
             <a:endParaRPr lang="en-US"/>
           </a:p>
@@ -1014,7 +1015,7 @@
           <a:p>
             <a:fld id="{D1C2FE12-02FD-40D2-9E73-08CF8D46514A}" type="datetimeFigureOut">
               <a:rPr lang="en-US" smtClean="0"/>
-              <a:t>1/27/2016</a:t>
+              <a:t>1/28/16</a:t>
             </a:fld>
             <a:endParaRPr lang="en-US"/>
           </a:p>
@@ -1246,7 +1247,7 @@
           <a:p>
             <a:fld id="{D1C2FE12-02FD-40D2-9E73-08CF8D46514A}" type="datetimeFigureOut">
               <a:rPr lang="en-US" smtClean="0"/>
-              <a:t>1/27/2016</a:t>
+              <a:t>1/28/16</a:t>
             </a:fld>
             <a:endParaRPr lang="en-US"/>
           </a:p>
@@ -1613,7 +1614,7 @@
           <a:p>
             <a:fld id="{D1C2FE12-02FD-40D2-9E73-08CF8D46514A}" type="datetimeFigureOut">
               <a:rPr lang="en-US" smtClean="0"/>
-              <a:t>1/27/2016</a:t>
+              <a:t>1/28/16</a:t>
             </a:fld>
             <a:endParaRPr lang="en-US"/>
           </a:p>
@@ -1731,7 +1732,7 @@
           <a:p>
             <a:fld id="{D1C2FE12-02FD-40D2-9E73-08CF8D46514A}" type="datetimeFigureOut">
               <a:rPr lang="en-US" smtClean="0"/>
-              <a:t>1/27/2016</a:t>
+              <a:t>1/28/16</a:t>
             </a:fld>
             <a:endParaRPr lang="en-US"/>
           </a:p>
@@ -1826,7 +1827,7 @@
           <a:p>
             <a:fld id="{D1C2FE12-02FD-40D2-9E73-08CF8D46514A}" type="datetimeFigureOut">
               <a:rPr lang="en-US" smtClean="0"/>
-              <a:t>1/27/2016</a:t>
+              <a:t>1/28/16</a:t>
             </a:fld>
             <a:endParaRPr lang="en-US"/>
           </a:p>
@@ -2103,7 +2104,7 @@
           <a:p>
             <a:fld id="{D1C2FE12-02FD-40D2-9E73-08CF8D46514A}" type="datetimeFigureOut">
               <a:rPr lang="en-US" smtClean="0"/>
-              <a:t>1/27/2016</a:t>
+              <a:t>1/28/16</a:t>
             </a:fld>
             <a:endParaRPr lang="en-US"/>
           </a:p>
@@ -2356,7 +2357,7 @@
           <a:p>
             <a:fld id="{D1C2FE12-02FD-40D2-9E73-08CF8D46514A}" type="datetimeFigureOut">
               <a:rPr lang="en-US" smtClean="0"/>
-              <a:t>1/27/2016</a:t>
+              <a:t>1/28/16</a:t>
             </a:fld>
             <a:endParaRPr lang="en-US"/>
           </a:p>
@@ -2569,7 +2570,7 @@
           <a:p>
             <a:fld id="{D1C2FE12-02FD-40D2-9E73-08CF8D46514A}" type="datetimeFigureOut">
               <a:rPr lang="en-US" smtClean="0"/>
-              <a:t>1/27/2016</a:t>
+              <a:t>1/28/16</a:t>
             </a:fld>
             <a:endParaRPr lang="en-US"/>
           </a:p>
@@ -5966,10 +5967,10 @@
         </p:nvGrpSpPr>
         <p:grpSpPr>
           <a:xfrm>
-            <a:off x="2116442" y="1140737"/>
-            <a:ext cx="3932411" cy="4578546"/>
-            <a:chOff x="2116442" y="1140737"/>
-            <a:chExt cx="3932411" cy="4578546"/>
+            <a:off x="2125355" y="1140737"/>
+            <a:ext cx="3992216" cy="4578546"/>
+            <a:chOff x="2125355" y="1140737"/>
+            <a:chExt cx="3992216" cy="4578546"/>
           </a:xfrm>
         </p:grpSpPr>
         <p:grpSp>
@@ -5980,10 +5981,10 @@
           </p:nvGrpSpPr>
           <p:grpSpPr>
             <a:xfrm>
-              <a:off x="2116442" y="1140737"/>
-              <a:ext cx="3783184" cy="4578546"/>
-              <a:chOff x="2116442" y="1140737"/>
-              <a:chExt cx="3783184" cy="4578546"/>
+              <a:off x="2125355" y="1140737"/>
+              <a:ext cx="3776677" cy="4578546"/>
+              <a:chOff x="2125355" y="1140737"/>
+              <a:chExt cx="3776677" cy="4578546"/>
             </a:xfrm>
           </p:grpSpPr>
           <p:grpSp>
@@ -5994,10 +5995,10 @@
             </p:nvGrpSpPr>
             <p:grpSpPr>
               <a:xfrm>
-                <a:off x="2116442" y="1140737"/>
-                <a:ext cx="3783184" cy="3911714"/>
-                <a:chOff x="2116442" y="1140737"/>
-                <a:chExt cx="3783184" cy="3911714"/>
+                <a:off x="2125355" y="1140737"/>
+                <a:ext cx="3776677" cy="3911714"/>
+                <a:chOff x="2125355" y="1140737"/>
+                <a:chExt cx="3776677" cy="3911714"/>
               </a:xfrm>
             </p:grpSpPr>
             <p:grpSp>
@@ -6008,10 +6009,10 @@
               </p:nvGrpSpPr>
               <p:grpSpPr>
                 <a:xfrm>
-                  <a:off x="2577494" y="1702053"/>
-                  <a:ext cx="721672" cy="561314"/>
-                  <a:chOff x="1998073" y="1140737"/>
-                  <a:chExt cx="721672" cy="561314"/>
+                  <a:off x="2584515" y="1702053"/>
+                  <a:ext cx="707630" cy="561314"/>
+                  <a:chOff x="2005094" y="1140737"/>
+                  <a:chExt cx="707630" cy="561314"/>
                 </a:xfrm>
               </p:grpSpPr>
               <p:sp>
@@ -6070,8 +6071,8 @@
                 </p:nvSpPr>
                 <p:spPr>
                   <a:xfrm>
-                    <a:off x="1998073" y="1282894"/>
-                    <a:ext cx="721672" cy="307777"/>
+                    <a:off x="2005094" y="1282894"/>
+                    <a:ext cx="707630" cy="307777"/>
                   </a:xfrm>
                   <a:prstGeom prst="rect">
                     <a:avLst/>
@@ -6087,7 +6088,7 @@
                     <a:pPr algn="ctr"/>
                     <a:r>
                       <a:rPr lang="en-US" sz="1400" dirty="0" smtClean="0"/>
-                      <a:t>(1,1) W</a:t>
+                      <a:t>(W,1,1)</a:t>
                     </a:r>
                     <a:endParaRPr lang="en-US" sz="1400" dirty="0"/>
                   </a:p>
@@ -6196,10 +6197,10 @@
               </p:nvGrpSpPr>
               <p:grpSpPr>
                 <a:xfrm>
-                  <a:off x="3512436" y="1702053"/>
-                  <a:ext cx="644727" cy="561314"/>
-                  <a:chOff x="2036545" y="1140737"/>
-                  <a:chExt cx="644727" cy="561314"/>
+                  <a:off x="3510031" y="1702053"/>
+                  <a:ext cx="649537" cy="561314"/>
+                  <a:chOff x="2034140" y="1140737"/>
+                  <a:chExt cx="649537" cy="561314"/>
                 </a:xfrm>
               </p:grpSpPr>
               <p:sp>
@@ -6258,8 +6259,8 @@
                 </p:nvSpPr>
                 <p:spPr>
                   <a:xfrm>
-                    <a:off x="2036545" y="1282894"/>
-                    <a:ext cx="644727" cy="307777"/>
+                    <a:off x="2034140" y="1282894"/>
+                    <a:ext cx="649537" cy="307777"/>
                   </a:xfrm>
                   <a:prstGeom prst="rect">
                     <a:avLst/>
@@ -6275,7 +6276,7 @@
                     <a:pPr algn="ctr"/>
                     <a:r>
                       <a:rPr lang="en-US" sz="1400" dirty="0" smtClean="0"/>
-                      <a:t>(1,1) Z</a:t>
+                      <a:t>(Z,1,1)</a:t>
                     </a:r>
                     <a:endParaRPr lang="en-US" sz="1400" dirty="0"/>
                   </a:p>
@@ -6290,10 +6291,10 @@
               </p:nvGrpSpPr>
               <p:grpSpPr>
                 <a:xfrm>
-                  <a:off x="4378858" y="1702052"/>
-                  <a:ext cx="649537" cy="561314"/>
-                  <a:chOff x="2034140" y="1140737"/>
-                  <a:chExt cx="649537" cy="561314"/>
+                  <a:off x="4387483" y="1702052"/>
+                  <a:ext cx="632288" cy="561314"/>
+                  <a:chOff x="2042765" y="1140737"/>
+                  <a:chExt cx="632288" cy="561314"/>
                 </a:xfrm>
               </p:grpSpPr>
               <p:sp>
@@ -6352,8 +6353,8 @@
                 </p:nvSpPr>
                 <p:spPr>
                   <a:xfrm>
-                    <a:off x="2034140" y="1282894"/>
-                    <a:ext cx="649537" cy="307777"/>
+                    <a:off x="2042765" y="1282894"/>
+                    <a:ext cx="632288" cy="307777"/>
                   </a:xfrm>
                   <a:prstGeom prst="rect">
                     <a:avLst/>
@@ -6369,7 +6370,7 @@
                     <a:pPr algn="ctr"/>
                     <a:r>
                       <a:rPr lang="en-US" sz="1400" dirty="0" smtClean="0"/>
-                      <a:t>(1,1) Y</a:t>
+                      <a:t>(Y,1,1)</a:t>
                     </a:r>
                     <a:endParaRPr lang="en-US" sz="1400" dirty="0"/>
                   </a:p>
@@ -6384,10 +6385,10 @@
               </p:nvGrpSpPr>
               <p:grpSpPr>
                 <a:xfrm>
-                  <a:off x="5245281" y="1702051"/>
-                  <a:ext cx="654345" cy="561314"/>
-                  <a:chOff x="2031736" y="1140737"/>
-                  <a:chExt cx="654345" cy="561314"/>
+                  <a:off x="5242877" y="1702051"/>
+                  <a:ext cx="659155" cy="561314"/>
+                  <a:chOff x="2029332" y="1140737"/>
+                  <a:chExt cx="659155" cy="561314"/>
                 </a:xfrm>
               </p:grpSpPr>
               <p:sp>
@@ -6446,8 +6447,8 @@
                 </p:nvSpPr>
                 <p:spPr>
                   <a:xfrm>
-                    <a:off x="2031736" y="1282894"/>
-                    <a:ext cx="654345" cy="307777"/>
+                    <a:off x="2029332" y="1282894"/>
+                    <a:ext cx="659155" cy="307777"/>
                   </a:xfrm>
                   <a:prstGeom prst="rect">
                     <a:avLst/>
@@ -6463,7 +6464,7 @@
                     <a:pPr algn="ctr"/>
                     <a:r>
                       <a:rPr lang="en-US" sz="1400" dirty="0" smtClean="0"/>
-                      <a:t>(1,1) X</a:t>
+                      <a:t>(X,1,1)</a:t>
                     </a:r>
                     <a:endParaRPr lang="en-US" sz="1400" dirty="0"/>
                   </a:p>
@@ -6478,10 +6479,10 @@
               </p:nvGrpSpPr>
               <p:grpSpPr>
                 <a:xfrm>
-                  <a:off x="2116442" y="2429248"/>
-                  <a:ext cx="683200" cy="561314"/>
-                  <a:chOff x="2017309" y="1140737"/>
-                  <a:chExt cx="683200" cy="561314"/>
+                  <a:off x="2125355" y="2429248"/>
+                  <a:ext cx="665374" cy="561314"/>
+                  <a:chOff x="2026222" y="1140737"/>
+                  <a:chExt cx="665374" cy="561314"/>
                 </a:xfrm>
               </p:grpSpPr>
               <p:sp>
@@ -6540,8 +6541,8 @@
                 </p:nvSpPr>
                 <p:spPr>
                   <a:xfrm>
-                    <a:off x="2017309" y="1282894"/>
-                    <a:ext cx="683200" cy="307777"/>
+                    <a:off x="2026222" y="1282894"/>
+                    <a:ext cx="665374" cy="307777"/>
                   </a:xfrm>
                   <a:prstGeom prst="rect">
                     <a:avLst/>
@@ -6557,7 +6558,23 @@
                     <a:pPr algn="ctr"/>
                     <a:r>
                       <a:rPr lang="en-US" sz="1400" dirty="0" smtClean="0"/>
-                      <a:t>(--,2) A</a:t>
+                      <a:t>(A,</a:t>
+                    </a:r>
+                    <a:r>
+                      <a:rPr lang="en-US" sz="1400" dirty="0" smtClean="0"/>
+                      <a:t>–</a:t>
+                    </a:r>
+                    <a:r>
+                      <a:rPr lang="en-US" sz="1400" dirty="0" smtClean="0"/>
+                      <a:t>,</a:t>
+                    </a:r>
+                    <a:r>
+                      <a:rPr lang="en-US" sz="1400" dirty="0" smtClean="0"/>
+                      <a:t>2</a:t>
+                    </a:r>
+                    <a:r>
+                      <a:rPr lang="en-US" sz="1400" dirty="0" smtClean="0"/>
+                      <a:t>)</a:t>
                     </a:r>
                     <a:endParaRPr lang="en-US" sz="1400" dirty="0"/>
                   </a:p>
@@ -6572,10 +6589,10 @@
               </p:nvGrpSpPr>
               <p:grpSpPr>
                 <a:xfrm>
-                  <a:off x="2992190" y="2460781"/>
-                  <a:ext cx="676788" cy="561314"/>
-                  <a:chOff x="2020515" y="1140737"/>
-                  <a:chExt cx="676788" cy="561314"/>
+                  <a:off x="3002898" y="2460781"/>
+                  <a:ext cx="655372" cy="561314"/>
+                  <a:chOff x="2031223" y="1140737"/>
+                  <a:chExt cx="655372" cy="561314"/>
                 </a:xfrm>
               </p:grpSpPr>
               <p:sp>
@@ -6634,8 +6651,8 @@
                 </p:nvSpPr>
                 <p:spPr>
                   <a:xfrm>
-                    <a:off x="2020515" y="1282894"/>
-                    <a:ext cx="676788" cy="307777"/>
+                    <a:off x="2031223" y="1282894"/>
+                    <a:ext cx="655372" cy="307777"/>
                   </a:xfrm>
                   <a:prstGeom prst="rect">
                     <a:avLst/>
@@ -6651,7 +6668,23 @@
                     <a:pPr algn="ctr"/>
                     <a:r>
                       <a:rPr lang="en-US" sz="1400" dirty="0" smtClean="0"/>
-                      <a:t>(--,2) B</a:t>
+                      <a:t>(B,</a:t>
+                    </a:r>
+                    <a:r>
+                      <a:rPr lang="en-US" sz="1400" dirty="0" smtClean="0"/>
+                      <a:t>–</a:t>
+                    </a:r>
+                    <a:r>
+                      <a:rPr lang="en-US" sz="1400" dirty="0" smtClean="0"/>
+                      <a:t>,</a:t>
+                    </a:r>
+                    <a:r>
+                      <a:rPr lang="en-US" sz="1400" dirty="0" smtClean="0"/>
+                      <a:t>2</a:t>
+                    </a:r>
+                    <a:r>
+                      <a:rPr lang="en-US" sz="1400" dirty="0" smtClean="0"/>
+                      <a:t>)</a:t>
                     </a:r>
                     <a:endParaRPr lang="en-US" sz="1400" dirty="0"/>
                   </a:p>
@@ -6666,10 +6699,10 @@
               </p:nvGrpSpPr>
               <p:grpSpPr>
                 <a:xfrm>
-                  <a:off x="3910194" y="2460781"/>
-                  <a:ext cx="667170" cy="561314"/>
-                  <a:chOff x="2025324" y="1140737"/>
-                  <a:chExt cx="667170" cy="561314"/>
+                  <a:off x="3919748" y="2460781"/>
+                  <a:ext cx="648063" cy="561314"/>
+                  <a:chOff x="2034878" y="1140737"/>
+                  <a:chExt cx="648063" cy="561314"/>
                 </a:xfrm>
               </p:grpSpPr>
               <p:sp>
@@ -6728,8 +6761,8 @@
                 </p:nvSpPr>
                 <p:spPr>
                   <a:xfrm>
-                    <a:off x="2025324" y="1282894"/>
-                    <a:ext cx="667170" cy="307777"/>
+                    <a:off x="2034878" y="1282894"/>
+                    <a:ext cx="648063" cy="307777"/>
                   </a:xfrm>
                   <a:prstGeom prst="rect">
                     <a:avLst/>
@@ -6745,7 +6778,15 @@
                     <a:pPr algn="ctr"/>
                     <a:r>
                       <a:rPr lang="en-US" sz="1400" dirty="0" smtClean="0"/>
-                      <a:t>(--,2) E</a:t>
+                      <a:t>(E,</a:t>
+                    </a:r>
+                    <a:r>
+                      <a:rPr lang="en-US" sz="1400" dirty="0" smtClean="0"/>
+                      <a:t>–</a:t>
+                    </a:r>
+                    <a:r>
+                      <a:rPr lang="en-US" sz="1400" dirty="0" smtClean="0"/>
+                      <a:t>,2)</a:t>
                     </a:r>
                     <a:endParaRPr lang="en-US" sz="1400" dirty="0"/>
                   </a:p>
@@ -6760,10 +6801,10 @@
               </p:nvGrpSpPr>
               <p:grpSpPr>
                 <a:xfrm>
-                  <a:off x="4791946" y="2483732"/>
-                  <a:ext cx="671979" cy="561314"/>
-                  <a:chOff x="2022920" y="1140737"/>
-                  <a:chExt cx="671979" cy="561314"/>
+                  <a:off x="4791882" y="2483732"/>
+                  <a:ext cx="672107" cy="561314"/>
+                  <a:chOff x="2022856" y="1140737"/>
+                  <a:chExt cx="672107" cy="561314"/>
                 </a:xfrm>
               </p:grpSpPr>
               <p:sp>
@@ -6822,8 +6863,8 @@
                 </p:nvSpPr>
                 <p:spPr>
                   <a:xfrm>
-                    <a:off x="2022920" y="1282894"/>
-                    <a:ext cx="671979" cy="307777"/>
+                    <a:off x="2022856" y="1282894"/>
+                    <a:ext cx="672107" cy="307777"/>
                   </a:xfrm>
                   <a:prstGeom prst="rect">
                     <a:avLst/>
@@ -6839,7 +6880,7 @@
                     <a:pPr algn="ctr"/>
                     <a:r>
                       <a:rPr lang="en-US" sz="1400" dirty="0" smtClean="0"/>
-                      <a:t>(2,2) D</a:t>
+                      <a:t>(D,2,2)</a:t>
                     </a:r>
                     <a:endParaRPr lang="en-US" sz="1400" dirty="0"/>
                   </a:p>
@@ -6854,10 +6895,10 @@
               </p:nvGrpSpPr>
               <p:grpSpPr>
                 <a:xfrm>
-                  <a:off x="4799159" y="3223596"/>
-                  <a:ext cx="657551" cy="561314"/>
-                  <a:chOff x="2030133" y="1140737"/>
-                  <a:chExt cx="657551" cy="561314"/>
+                  <a:off x="4797108" y="3223596"/>
+                  <a:ext cx="661655" cy="561314"/>
+                  <a:chOff x="2028082" y="1140737"/>
+                  <a:chExt cx="661655" cy="561314"/>
                 </a:xfrm>
               </p:grpSpPr>
               <p:sp>
@@ -6916,8 +6957,8 @@
                 </p:nvSpPr>
                 <p:spPr>
                   <a:xfrm>
-                    <a:off x="2030133" y="1282894"/>
-                    <a:ext cx="657551" cy="307777"/>
+                    <a:off x="2028082" y="1282894"/>
+                    <a:ext cx="661655" cy="307777"/>
                   </a:xfrm>
                   <a:prstGeom prst="rect">
                     <a:avLst/>
@@ -6933,7 +6974,7 @@
                     <a:pPr algn="ctr"/>
                     <a:r>
                       <a:rPr lang="en-US" sz="1400" dirty="0" smtClean="0"/>
-                      <a:t>(3,2) C</a:t>
+                      <a:t>(C,3,2)</a:t>
                     </a:r>
                     <a:endParaRPr lang="en-US" sz="1400" dirty="0"/>
                   </a:p>
@@ -6948,10 +6989,10 @@
               </p:nvGrpSpPr>
               <p:grpSpPr>
                 <a:xfrm>
-                  <a:off x="5219988" y="3859430"/>
-                  <a:ext cx="665567" cy="561314"/>
-                  <a:chOff x="1772125" y="1013737"/>
-                  <a:chExt cx="665567" cy="561314"/>
+                  <a:off x="5216942" y="3859430"/>
+                  <a:ext cx="671658" cy="561314"/>
+                  <a:chOff x="1769079" y="1013737"/>
+                  <a:chExt cx="671658" cy="561314"/>
                 </a:xfrm>
               </p:grpSpPr>
               <p:sp>
@@ -7010,8 +7051,8 @@
                 </p:nvSpPr>
                 <p:spPr>
                   <a:xfrm>
-                    <a:off x="1772125" y="1155894"/>
-                    <a:ext cx="665567" cy="307777"/>
+                    <a:off x="1769079" y="1155894"/>
+                    <a:ext cx="671658" cy="307777"/>
                   </a:xfrm>
                   <a:prstGeom prst="rect">
                     <a:avLst/>
@@ -7027,7 +7068,7 @@
                     <a:pPr algn="ctr"/>
                     <a:r>
                       <a:rPr lang="en-US" sz="1400" dirty="0" smtClean="0"/>
-                      <a:t>(4,2) A</a:t>
+                      <a:t>(A,4,2)</a:t>
                     </a:r>
                     <a:endParaRPr lang="en-US" sz="1400" dirty="0"/>
                   </a:p>
@@ -7042,10 +7083,10 @@
               </p:nvGrpSpPr>
               <p:grpSpPr>
                 <a:xfrm>
-                  <a:off x="3910587" y="3223595"/>
-                  <a:ext cx="689611" cy="561314"/>
-                  <a:chOff x="2014104" y="1140737"/>
-                  <a:chExt cx="689611" cy="561314"/>
+                  <a:off x="3922481" y="3223595"/>
+                  <a:ext cx="665823" cy="561314"/>
+                  <a:chOff x="2025998" y="1140737"/>
+                  <a:chExt cx="665823" cy="561314"/>
                 </a:xfrm>
               </p:grpSpPr>
               <p:sp>
@@ -7104,8 +7145,8 @@
                 </p:nvSpPr>
                 <p:spPr>
                   <a:xfrm>
-                    <a:off x="2014104" y="1282894"/>
-                    <a:ext cx="689611" cy="307777"/>
+                    <a:off x="2025998" y="1282894"/>
+                    <a:ext cx="665823" cy="307777"/>
                   </a:xfrm>
                   <a:prstGeom prst="rect">
                     <a:avLst/>
@@ -7121,7 +7162,15 @@
                     <a:pPr algn="ctr"/>
                     <a:r>
                       <a:rPr lang="en-US" sz="1400" dirty="0" smtClean="0"/>
-                      <a:t>(--,2) D</a:t>
+                      <a:t>(D,</a:t>
+                    </a:r>
+                    <a:r>
+                      <a:rPr lang="en-US" sz="1400" dirty="0" smtClean="0"/>
+                      <a:t>–</a:t>
+                    </a:r>
+                    <a:r>
+                      <a:rPr lang="en-US" sz="1400" dirty="0" smtClean="0"/>
+                      <a:t>,2)</a:t>
                     </a:r>
                     <a:endParaRPr lang="en-US" sz="1400" dirty="0"/>
                   </a:p>
@@ -7136,10 +7185,10 @@
               </p:nvGrpSpPr>
               <p:grpSpPr>
                 <a:xfrm>
-                  <a:off x="3916998" y="3858230"/>
-                  <a:ext cx="676788" cy="561314"/>
-                  <a:chOff x="2020515" y="1013737"/>
-                  <a:chExt cx="676788" cy="561314"/>
+                  <a:off x="3927705" y="3858230"/>
+                  <a:ext cx="655372" cy="561314"/>
+                  <a:chOff x="2031222" y="1013737"/>
+                  <a:chExt cx="655372" cy="561314"/>
                 </a:xfrm>
               </p:grpSpPr>
               <p:sp>
@@ -7198,8 +7247,8 @@
                 </p:nvSpPr>
                 <p:spPr>
                   <a:xfrm>
-                    <a:off x="2020515" y="1155894"/>
-                    <a:ext cx="676788" cy="307777"/>
+                    <a:off x="2031222" y="1155894"/>
+                    <a:ext cx="655372" cy="307777"/>
                   </a:xfrm>
                   <a:prstGeom prst="rect">
                     <a:avLst/>
@@ -7215,7 +7264,23 @@
                     <a:pPr algn="ctr"/>
                     <a:r>
                       <a:rPr lang="en-US" sz="1400" dirty="0" smtClean="0"/>
-                      <a:t>(--,3) B</a:t>
+                      <a:t>(B,</a:t>
+                    </a:r>
+                    <a:r>
+                      <a:rPr lang="en-US" sz="1400" dirty="0" smtClean="0"/>
+                      <a:t>–</a:t>
+                    </a:r>
+                    <a:r>
+                      <a:rPr lang="en-US" sz="1400" dirty="0" smtClean="0"/>
+                      <a:t>,</a:t>
+                    </a:r>
+                    <a:r>
+                      <a:rPr lang="en-US" sz="1400" dirty="0" smtClean="0"/>
+                      <a:t>3</a:t>
+                    </a:r>
+                    <a:r>
+                      <a:rPr lang="en-US" sz="1400" dirty="0" smtClean="0"/>
+                      <a:t>)</a:t>
                     </a:r>
                     <a:endParaRPr lang="en-US" sz="1400" dirty="0"/>
                   </a:p>
@@ -7230,10 +7295,10 @@
               </p:nvGrpSpPr>
               <p:grpSpPr>
                 <a:xfrm>
-                  <a:off x="3004605" y="3223595"/>
-                  <a:ext cx="675185" cy="561314"/>
-                  <a:chOff x="2021317" y="1140737"/>
-                  <a:chExt cx="675185" cy="561314"/>
+                  <a:off x="3014511" y="3223595"/>
+                  <a:ext cx="655372" cy="561314"/>
+                  <a:chOff x="2031223" y="1140737"/>
+                  <a:chExt cx="655372" cy="561314"/>
                 </a:xfrm>
               </p:grpSpPr>
               <p:sp>
@@ -7292,8 +7357,8 @@
                 </p:nvSpPr>
                 <p:spPr>
                   <a:xfrm>
-                    <a:off x="2021317" y="1282894"/>
-                    <a:ext cx="675185" cy="307777"/>
+                    <a:off x="2031223" y="1282894"/>
+                    <a:ext cx="655372" cy="307777"/>
                   </a:xfrm>
                   <a:prstGeom prst="rect">
                     <a:avLst/>
@@ -7309,7 +7374,15 @@
                     <a:pPr algn="ctr"/>
                     <a:r>
                       <a:rPr lang="en-US" sz="1400" dirty="0" smtClean="0"/>
-                      <a:t>(--,2) C</a:t>
+                      <a:t>(C,</a:t>
+                    </a:r>
+                    <a:r>
+                      <a:rPr lang="en-US" sz="1400" dirty="0" smtClean="0"/>
+                      <a:t>–</a:t>
+                    </a:r>
+                    <a:r>
+                      <a:rPr lang="en-US" sz="1400" dirty="0" smtClean="0"/>
+                      <a:t>,2)</a:t>
                     </a:r>
                     <a:endParaRPr lang="en-US" sz="1400" dirty="0"/>
                   </a:p>
@@ -7324,10 +7397,10 @@
               </p:nvGrpSpPr>
               <p:grpSpPr>
                 <a:xfrm>
-                  <a:off x="4133399" y="4491137"/>
-                  <a:ext cx="739305" cy="561314"/>
-                  <a:chOff x="2243256" y="886737"/>
-                  <a:chExt cx="739305" cy="561314"/>
+                  <a:off x="4152379" y="4491137"/>
+                  <a:ext cx="701346" cy="561314"/>
+                  <a:chOff x="2262236" y="886737"/>
+                  <a:chExt cx="701346" cy="561314"/>
                 </a:xfrm>
               </p:grpSpPr>
               <p:sp>
@@ -7386,8 +7459,8 @@
                 </p:nvSpPr>
                 <p:spPr>
                   <a:xfrm>
-                    <a:off x="2243256" y="1028894"/>
-                    <a:ext cx="739305" cy="307777"/>
+                    <a:off x="2262236" y="1028894"/>
+                    <a:ext cx="701346" cy="307777"/>
                   </a:xfrm>
                   <a:prstGeom prst="rect">
                     <a:avLst/>
@@ -7403,7 +7476,23 @@
                     <a:pPr algn="ctr"/>
                     <a:r>
                       <a:rPr lang="en-US" sz="1400" dirty="0" smtClean="0"/>
-                      <a:t>(--,4) W</a:t>
+                      <a:t>(W,</a:t>
+                    </a:r>
+                    <a:r>
+                      <a:rPr lang="en-US" sz="1400" dirty="0" smtClean="0"/>
+                      <a:t>–</a:t>
+                    </a:r>
+                    <a:r>
+                      <a:rPr lang="en-US" sz="1400" dirty="0" smtClean="0"/>
+                      <a:t>,</a:t>
+                    </a:r>
+                    <a:r>
+                      <a:rPr lang="en-US" sz="1400" dirty="0" smtClean="0"/>
+                      <a:t>4</a:t>
+                    </a:r>
+                    <a:r>
+                      <a:rPr lang="en-US" sz="1400" dirty="0" smtClean="0"/>
+                      <a:t>)</a:t>
                     </a:r>
                     <a:endParaRPr lang="en-US" sz="1400" dirty="0"/>
                   </a:p>
@@ -7418,10 +7507,10 @@
               </p:nvGrpSpPr>
               <p:grpSpPr>
                 <a:xfrm>
-                  <a:off x="4929119" y="4491137"/>
-                  <a:ext cx="739305" cy="561314"/>
-                  <a:chOff x="1481256" y="908219"/>
-                  <a:chExt cx="739305" cy="561314"/>
+                  <a:off x="4948099" y="4491137"/>
+                  <a:ext cx="701346" cy="561314"/>
+                  <a:chOff x="1500236" y="908219"/>
+                  <a:chExt cx="701346" cy="561314"/>
                 </a:xfrm>
               </p:grpSpPr>
               <p:sp>
@@ -7480,8 +7569,8 @@
                 </p:nvSpPr>
                 <p:spPr>
                   <a:xfrm>
-                    <a:off x="1481256" y="1028894"/>
-                    <a:ext cx="739305" cy="307777"/>
+                    <a:off x="1500236" y="1028894"/>
+                    <a:ext cx="701346" cy="307777"/>
                   </a:xfrm>
                   <a:prstGeom prst="rect">
                     <a:avLst/>
@@ -7497,7 +7586,15 @@
                     <a:pPr algn="ctr"/>
                     <a:r>
                       <a:rPr lang="en-US" sz="1400" dirty="0" smtClean="0"/>
-                      <a:t>(5,--) W</a:t>
+                      <a:t>(W,5,</a:t>
+                    </a:r>
+                    <a:r>
+                      <a:rPr lang="en-US" sz="1400" dirty="0" smtClean="0"/>
+                      <a:t>–</a:t>
+                    </a:r>
+                    <a:r>
+                      <a:rPr lang="en-US" sz="1400" dirty="0" smtClean="0"/>
+                      <a:t>)</a:t>
                     </a:r>
                     <a:endParaRPr lang="en-US" sz="1400" dirty="0"/>
                   </a:p>
@@ -8475,7 +8572,7 @@
             </p:nvSpPr>
             <p:spPr>
               <a:xfrm>
-                <a:off x="3722684" y="5023869"/>
+                <a:off x="3661110" y="4994953"/>
                 <a:ext cx="934102" cy="338554"/>
               </a:xfrm>
               <a:prstGeom prst="rect">
@@ -8600,15 +8697,14 @@
             <p:nvCxnSpPr>
               <p:cNvPr id="94" name="Straight Arrow Connector 93"/>
               <p:cNvCxnSpPr>
-                <a:stCxn id="53" idx="3"/>
-                <a:endCxn id="81" idx="0"/>
+                <a:endCxn id="81" idx="7"/>
               </p:cNvCxnSpPr>
               <p:nvPr/>
             </p:nvCxnSpPr>
             <p:spPr>
               <a:xfrm flipH="1">
-                <a:off x="4885755" y="4970248"/>
-                <a:ext cx="204619" cy="187721"/>
+                <a:off x="5094153" y="5040535"/>
+                <a:ext cx="82628" cy="199637"/>
               </a:xfrm>
               <a:prstGeom prst="straightConnector1">
                 <a:avLst/>
@@ -8638,16 +8734,13 @@
           <p:cxnSp>
             <p:nvCxnSpPr>
               <p:cNvPr id="97" name="Straight Arrow Connector 96"/>
-              <p:cNvCxnSpPr>
-                <a:stCxn id="50" idx="5"/>
-                <a:endCxn id="81" idx="0"/>
-              </p:cNvCxnSpPr>
+              <p:cNvCxnSpPr/>
               <p:nvPr/>
             </p:nvCxnSpPr>
             <p:spPr>
               <a:xfrm>
-                <a:off x="4711451" y="4970248"/>
-                <a:ext cx="174304" cy="187721"/>
+                <a:off x="4596323" y="5036201"/>
+                <a:ext cx="81033" cy="192469"/>
               </a:xfrm>
               <a:prstGeom prst="straightConnector1">
                 <a:avLst/>
@@ -8683,7 +8776,7 @@
           </p:nvSpPr>
           <p:spPr>
             <a:xfrm>
-              <a:off x="5114751" y="5018670"/>
+              <a:off x="5183469" y="4989754"/>
               <a:ext cx="934102" cy="338554"/>
             </a:xfrm>
             <a:prstGeom prst="rect">
@@ -8748,6 +8841,2881 @@
           <a:chExt cx="0" cy="0"/>
         </a:xfrm>
       </p:grpSpPr>
+      <p:grpSp>
+        <p:nvGrpSpPr>
+          <p:cNvPr id="4" name="Group 3"/>
+          <p:cNvGrpSpPr/>
+          <p:nvPr/>
+        </p:nvGrpSpPr>
+        <p:grpSpPr>
+          <a:xfrm>
+            <a:off x="2125355" y="1140737"/>
+            <a:ext cx="3992216" cy="4578546"/>
+            <a:chOff x="2125355" y="1140737"/>
+            <a:chExt cx="3992216" cy="4578546"/>
+          </a:xfrm>
+        </p:grpSpPr>
+        <p:grpSp>
+          <p:nvGrpSpPr>
+            <p:cNvPr id="5" name="Group 4"/>
+            <p:cNvGrpSpPr/>
+            <p:nvPr/>
+          </p:nvGrpSpPr>
+          <p:grpSpPr>
+            <a:xfrm>
+              <a:off x="2125355" y="1140737"/>
+              <a:ext cx="3776677" cy="4578546"/>
+              <a:chOff x="2125355" y="1140737"/>
+              <a:chExt cx="3776677" cy="4578546"/>
+            </a:xfrm>
+          </p:grpSpPr>
+          <p:grpSp>
+            <p:nvGrpSpPr>
+              <p:cNvPr id="7" name="Group 6"/>
+              <p:cNvGrpSpPr/>
+              <p:nvPr/>
+            </p:nvGrpSpPr>
+            <p:grpSpPr>
+              <a:xfrm>
+                <a:off x="2125355" y="1140737"/>
+                <a:ext cx="3776677" cy="3911714"/>
+                <a:chOff x="2125355" y="1140737"/>
+                <a:chExt cx="3776677" cy="3911714"/>
+              </a:xfrm>
+            </p:grpSpPr>
+            <p:grpSp>
+              <p:nvGrpSpPr>
+                <p:cNvPr id="14" name="Group 13"/>
+                <p:cNvGrpSpPr/>
+                <p:nvPr/>
+              </p:nvGrpSpPr>
+              <p:grpSpPr>
+                <a:xfrm>
+                  <a:off x="2584515" y="1702053"/>
+                  <a:ext cx="707630" cy="561314"/>
+                  <a:chOff x="2005094" y="1140737"/>
+                  <a:chExt cx="707630" cy="561314"/>
+                </a:xfrm>
+              </p:grpSpPr>
+              <p:sp>
+                <p:nvSpPr>
+                  <p:cNvPr id="85" name="Oval 84"/>
+                  <p:cNvSpPr/>
+                  <p:nvPr/>
+                </p:nvSpPr>
+                <p:spPr>
+                  <a:xfrm>
+                    <a:off x="2064189" y="1140737"/>
+                    <a:ext cx="589441" cy="561314"/>
+                  </a:xfrm>
+                  <a:prstGeom prst="ellipse">
+                    <a:avLst/>
+                  </a:prstGeom>
+                  <a:solidFill>
+                    <a:srgbClr val="FFCCCC"/>
+                  </a:solidFill>
+                  <a:ln w="9525">
+                    <a:solidFill>
+                      <a:schemeClr val="tx1"/>
+                    </a:solidFill>
+                  </a:ln>
+                </p:spPr>
+                <p:style>
+                  <a:lnRef idx="2">
+                    <a:schemeClr val="accent1">
+                      <a:shade val="50000"/>
+                    </a:schemeClr>
+                  </a:lnRef>
+                  <a:fillRef idx="1">
+                    <a:schemeClr val="accent1"/>
+                  </a:fillRef>
+                  <a:effectRef idx="0">
+                    <a:schemeClr val="accent1"/>
+                  </a:effectRef>
+                  <a:fontRef idx="minor">
+                    <a:schemeClr val="lt1"/>
+                  </a:fontRef>
+                </p:style>
+                <p:txBody>
+                  <a:bodyPr rtlCol="0" anchor="ctr"/>
+                  <a:lstStyle/>
+                  <a:p>
+                    <a:pPr algn="ctr"/>
+                    <a:endParaRPr lang="en-US" sz="2000"/>
+                  </a:p>
+                </p:txBody>
+              </p:sp>
+              <p:sp>
+                <p:nvSpPr>
+                  <p:cNvPr id="86" name="TextBox 85"/>
+                  <p:cNvSpPr txBox="1"/>
+                  <p:nvPr/>
+                </p:nvSpPr>
+                <p:spPr>
+                  <a:xfrm>
+                    <a:off x="2005094" y="1282894"/>
+                    <a:ext cx="707630" cy="307777"/>
+                  </a:xfrm>
+                  <a:prstGeom prst="rect">
+                    <a:avLst/>
+                  </a:prstGeom>
+                  <a:noFill/>
+                </p:spPr>
+                <p:txBody>
+                  <a:bodyPr wrap="none" rtlCol="0">
+                    <a:spAutoFit/>
+                  </a:bodyPr>
+                  <a:lstStyle/>
+                  <a:p>
+                    <a:pPr algn="ctr"/>
+                    <a:r>
+                      <a:rPr lang="en-US" sz="1400" dirty="0" smtClean="0"/>
+                      <a:t>(W,1,1)</a:t>
+                    </a:r>
+                    <a:endParaRPr lang="en-US" sz="1400" dirty="0"/>
+                  </a:p>
+                </p:txBody>
+              </p:sp>
+            </p:grpSp>
+            <p:grpSp>
+              <p:nvGrpSpPr>
+                <p:cNvPr id="15" name="Group 14"/>
+                <p:cNvGrpSpPr/>
+                <p:nvPr/>
+              </p:nvGrpSpPr>
+              <p:grpSpPr>
+                <a:xfrm>
+                  <a:off x="3960672" y="1140737"/>
+                  <a:ext cx="589441" cy="561314"/>
+                  <a:chOff x="2064189" y="1394737"/>
+                  <a:chExt cx="589441" cy="561314"/>
+                </a:xfrm>
+              </p:grpSpPr>
+              <p:sp>
+                <p:nvSpPr>
+                  <p:cNvPr id="83" name="Oval 82"/>
+                  <p:cNvSpPr/>
+                  <p:nvPr/>
+                </p:nvSpPr>
+                <p:spPr>
+                  <a:xfrm>
+                    <a:off x="2064189" y="1394737"/>
+                    <a:ext cx="589441" cy="561314"/>
+                  </a:xfrm>
+                  <a:prstGeom prst="ellipse">
+                    <a:avLst/>
+                  </a:prstGeom>
+                  <a:solidFill>
+                    <a:schemeClr val="bg1"/>
+                  </a:solidFill>
+                  <a:ln w="9525">
+                    <a:solidFill>
+                      <a:schemeClr val="tx1"/>
+                    </a:solidFill>
+                  </a:ln>
+                </p:spPr>
+                <p:style>
+                  <a:lnRef idx="2">
+                    <a:schemeClr val="accent1">
+                      <a:shade val="50000"/>
+                    </a:schemeClr>
+                  </a:lnRef>
+                  <a:fillRef idx="1">
+                    <a:schemeClr val="accent1"/>
+                  </a:fillRef>
+                  <a:effectRef idx="0">
+                    <a:schemeClr val="accent1"/>
+                  </a:effectRef>
+                  <a:fontRef idx="minor">
+                    <a:schemeClr val="lt1"/>
+                  </a:fontRef>
+                </p:style>
+                <p:txBody>
+                  <a:bodyPr rtlCol="0" anchor="ctr"/>
+                  <a:lstStyle/>
+                  <a:p>
+                    <a:pPr algn="ctr"/>
+                    <a:endParaRPr lang="en-US" sz="2000"/>
+                  </a:p>
+                </p:txBody>
+              </p:sp>
+              <p:sp>
+                <p:nvSpPr>
+                  <p:cNvPr id="84" name="TextBox 83"/>
+                  <p:cNvSpPr txBox="1"/>
+                  <p:nvPr/>
+                </p:nvSpPr>
+                <p:spPr>
+                  <a:xfrm>
+                    <a:off x="2089060" y="1536894"/>
+                    <a:ext cx="539699" cy="307777"/>
+                  </a:xfrm>
+                  <a:prstGeom prst="rect">
+                    <a:avLst/>
+                  </a:prstGeom>
+                  <a:noFill/>
+                </p:spPr>
+                <p:txBody>
+                  <a:bodyPr wrap="none" rtlCol="0">
+                    <a:spAutoFit/>
+                  </a:bodyPr>
+                  <a:lstStyle/>
+                  <a:p>
+                    <a:pPr algn="ctr"/>
+                    <a:r>
+                      <a:rPr lang="en-US" sz="1400" i="1" dirty="0" smtClean="0"/>
+                      <a:t>Start</a:t>
+                    </a:r>
+                    <a:endParaRPr lang="en-US" sz="1400" i="1" dirty="0"/>
+                  </a:p>
+                </p:txBody>
+              </p:sp>
+            </p:grpSp>
+            <p:grpSp>
+              <p:nvGrpSpPr>
+                <p:cNvPr id="16" name="Group 15"/>
+                <p:cNvGrpSpPr/>
+                <p:nvPr/>
+              </p:nvGrpSpPr>
+              <p:grpSpPr>
+                <a:xfrm>
+                  <a:off x="3510031" y="1702053"/>
+                  <a:ext cx="649537" cy="561314"/>
+                  <a:chOff x="2034140" y="1140737"/>
+                  <a:chExt cx="649537" cy="561314"/>
+                </a:xfrm>
+              </p:grpSpPr>
+              <p:sp>
+                <p:nvSpPr>
+                  <p:cNvPr id="81" name="Oval 80"/>
+                  <p:cNvSpPr/>
+                  <p:nvPr/>
+                </p:nvSpPr>
+                <p:spPr>
+                  <a:xfrm>
+                    <a:off x="2064189" y="1140737"/>
+                    <a:ext cx="589441" cy="561314"/>
+                  </a:xfrm>
+                  <a:prstGeom prst="ellipse">
+                    <a:avLst/>
+                  </a:prstGeom>
+                  <a:solidFill>
+                    <a:schemeClr val="bg1"/>
+                  </a:solidFill>
+                  <a:ln w="9525">
+                    <a:solidFill>
+                      <a:schemeClr val="tx1"/>
+                    </a:solidFill>
+                  </a:ln>
+                </p:spPr>
+                <p:style>
+                  <a:lnRef idx="2">
+                    <a:schemeClr val="accent1">
+                      <a:shade val="50000"/>
+                    </a:schemeClr>
+                  </a:lnRef>
+                  <a:fillRef idx="1">
+                    <a:schemeClr val="accent1"/>
+                  </a:fillRef>
+                  <a:effectRef idx="0">
+                    <a:schemeClr val="accent1"/>
+                  </a:effectRef>
+                  <a:fontRef idx="minor">
+                    <a:schemeClr val="lt1"/>
+                  </a:fontRef>
+                </p:style>
+                <p:txBody>
+                  <a:bodyPr rtlCol="0" anchor="ctr"/>
+                  <a:lstStyle/>
+                  <a:p>
+                    <a:pPr algn="ctr"/>
+                    <a:endParaRPr lang="en-US" sz="2000"/>
+                  </a:p>
+                </p:txBody>
+              </p:sp>
+              <p:sp>
+                <p:nvSpPr>
+                  <p:cNvPr id="82" name="TextBox 81"/>
+                  <p:cNvSpPr txBox="1"/>
+                  <p:nvPr/>
+                </p:nvSpPr>
+                <p:spPr>
+                  <a:xfrm>
+                    <a:off x="2034140" y="1282894"/>
+                    <a:ext cx="649537" cy="307777"/>
+                  </a:xfrm>
+                  <a:prstGeom prst="rect">
+                    <a:avLst/>
+                  </a:prstGeom>
+                  <a:noFill/>
+                </p:spPr>
+                <p:txBody>
+                  <a:bodyPr wrap="none" rtlCol="0">
+                    <a:spAutoFit/>
+                  </a:bodyPr>
+                  <a:lstStyle/>
+                  <a:p>
+                    <a:pPr algn="ctr"/>
+                    <a:r>
+                      <a:rPr lang="en-US" sz="1400" dirty="0" smtClean="0"/>
+                      <a:t>(Z,1,1)</a:t>
+                    </a:r>
+                    <a:endParaRPr lang="en-US" sz="1400" dirty="0"/>
+                  </a:p>
+                </p:txBody>
+              </p:sp>
+            </p:grpSp>
+            <p:grpSp>
+              <p:nvGrpSpPr>
+                <p:cNvPr id="17" name="Group 16"/>
+                <p:cNvGrpSpPr/>
+                <p:nvPr/>
+              </p:nvGrpSpPr>
+              <p:grpSpPr>
+                <a:xfrm>
+                  <a:off x="4387483" y="1702052"/>
+                  <a:ext cx="632288" cy="561314"/>
+                  <a:chOff x="2042765" y="1140737"/>
+                  <a:chExt cx="632288" cy="561314"/>
+                </a:xfrm>
+              </p:grpSpPr>
+              <p:sp>
+                <p:nvSpPr>
+                  <p:cNvPr id="79" name="Oval 78"/>
+                  <p:cNvSpPr/>
+                  <p:nvPr/>
+                </p:nvSpPr>
+                <p:spPr>
+                  <a:xfrm>
+                    <a:off x="2064189" y="1140737"/>
+                    <a:ext cx="589441" cy="561314"/>
+                  </a:xfrm>
+                  <a:prstGeom prst="ellipse">
+                    <a:avLst/>
+                  </a:prstGeom>
+                  <a:solidFill>
+                    <a:schemeClr val="bg1"/>
+                  </a:solidFill>
+                  <a:ln w="9525">
+                    <a:solidFill>
+                      <a:schemeClr val="tx1"/>
+                    </a:solidFill>
+                  </a:ln>
+                </p:spPr>
+                <p:style>
+                  <a:lnRef idx="2">
+                    <a:schemeClr val="accent1">
+                      <a:shade val="50000"/>
+                    </a:schemeClr>
+                  </a:lnRef>
+                  <a:fillRef idx="1">
+                    <a:schemeClr val="accent1"/>
+                  </a:fillRef>
+                  <a:effectRef idx="0">
+                    <a:schemeClr val="accent1"/>
+                  </a:effectRef>
+                  <a:fontRef idx="minor">
+                    <a:schemeClr val="lt1"/>
+                  </a:fontRef>
+                </p:style>
+                <p:txBody>
+                  <a:bodyPr rtlCol="0" anchor="ctr"/>
+                  <a:lstStyle/>
+                  <a:p>
+                    <a:pPr algn="ctr"/>
+                    <a:endParaRPr lang="en-US" sz="2000"/>
+                  </a:p>
+                </p:txBody>
+              </p:sp>
+              <p:sp>
+                <p:nvSpPr>
+                  <p:cNvPr id="80" name="TextBox 79"/>
+                  <p:cNvSpPr txBox="1"/>
+                  <p:nvPr/>
+                </p:nvSpPr>
+                <p:spPr>
+                  <a:xfrm>
+                    <a:off x="2042765" y="1282894"/>
+                    <a:ext cx="632288" cy="307777"/>
+                  </a:xfrm>
+                  <a:prstGeom prst="rect">
+                    <a:avLst/>
+                  </a:prstGeom>
+                  <a:noFill/>
+                </p:spPr>
+                <p:txBody>
+                  <a:bodyPr wrap="none" rtlCol="0">
+                    <a:spAutoFit/>
+                  </a:bodyPr>
+                  <a:lstStyle/>
+                  <a:p>
+                    <a:pPr algn="ctr"/>
+                    <a:r>
+                      <a:rPr lang="en-US" sz="1400" dirty="0" smtClean="0"/>
+                      <a:t>(Y,1,1)</a:t>
+                    </a:r>
+                    <a:endParaRPr lang="en-US" sz="1400" dirty="0"/>
+                  </a:p>
+                </p:txBody>
+              </p:sp>
+            </p:grpSp>
+            <p:grpSp>
+              <p:nvGrpSpPr>
+                <p:cNvPr id="18" name="Group 17"/>
+                <p:cNvGrpSpPr/>
+                <p:nvPr/>
+              </p:nvGrpSpPr>
+              <p:grpSpPr>
+                <a:xfrm>
+                  <a:off x="5242877" y="1702051"/>
+                  <a:ext cx="659155" cy="561314"/>
+                  <a:chOff x="2029332" y="1140737"/>
+                  <a:chExt cx="659155" cy="561314"/>
+                </a:xfrm>
+              </p:grpSpPr>
+              <p:sp>
+                <p:nvSpPr>
+                  <p:cNvPr id="77" name="Oval 76"/>
+                  <p:cNvSpPr/>
+                  <p:nvPr/>
+                </p:nvSpPr>
+                <p:spPr>
+                  <a:xfrm>
+                    <a:off x="2064189" y="1140737"/>
+                    <a:ext cx="589441" cy="561314"/>
+                  </a:xfrm>
+                  <a:prstGeom prst="ellipse">
+                    <a:avLst/>
+                  </a:prstGeom>
+                  <a:solidFill>
+                    <a:schemeClr val="bg1"/>
+                  </a:solidFill>
+                  <a:ln w="9525">
+                    <a:solidFill>
+                      <a:schemeClr val="tx1"/>
+                    </a:solidFill>
+                  </a:ln>
+                </p:spPr>
+                <p:style>
+                  <a:lnRef idx="2">
+                    <a:schemeClr val="accent1">
+                      <a:shade val="50000"/>
+                    </a:schemeClr>
+                  </a:lnRef>
+                  <a:fillRef idx="1">
+                    <a:schemeClr val="accent1"/>
+                  </a:fillRef>
+                  <a:effectRef idx="0">
+                    <a:schemeClr val="accent1"/>
+                  </a:effectRef>
+                  <a:fontRef idx="minor">
+                    <a:schemeClr val="lt1"/>
+                  </a:fontRef>
+                </p:style>
+                <p:txBody>
+                  <a:bodyPr rtlCol="0" anchor="ctr"/>
+                  <a:lstStyle/>
+                  <a:p>
+                    <a:pPr algn="ctr"/>
+                    <a:endParaRPr lang="en-US" sz="2000"/>
+                  </a:p>
+                </p:txBody>
+              </p:sp>
+              <p:sp>
+                <p:nvSpPr>
+                  <p:cNvPr id="78" name="TextBox 77"/>
+                  <p:cNvSpPr txBox="1"/>
+                  <p:nvPr/>
+                </p:nvSpPr>
+                <p:spPr>
+                  <a:xfrm>
+                    <a:off x="2029332" y="1282894"/>
+                    <a:ext cx="659155" cy="307777"/>
+                  </a:xfrm>
+                  <a:prstGeom prst="rect">
+                    <a:avLst/>
+                  </a:prstGeom>
+                  <a:noFill/>
+                </p:spPr>
+                <p:txBody>
+                  <a:bodyPr wrap="none" rtlCol="0">
+                    <a:spAutoFit/>
+                  </a:bodyPr>
+                  <a:lstStyle/>
+                  <a:p>
+                    <a:pPr algn="ctr"/>
+                    <a:r>
+                      <a:rPr lang="en-US" sz="1400" dirty="0" smtClean="0"/>
+                      <a:t>(X,1,1)</a:t>
+                    </a:r>
+                    <a:endParaRPr lang="en-US" sz="1400" dirty="0"/>
+                  </a:p>
+                </p:txBody>
+              </p:sp>
+            </p:grpSp>
+            <p:grpSp>
+              <p:nvGrpSpPr>
+                <p:cNvPr id="19" name="Group 18"/>
+                <p:cNvGrpSpPr/>
+                <p:nvPr/>
+              </p:nvGrpSpPr>
+              <p:grpSpPr>
+                <a:xfrm>
+                  <a:off x="2125355" y="2429248"/>
+                  <a:ext cx="665374" cy="561314"/>
+                  <a:chOff x="2026222" y="1140737"/>
+                  <a:chExt cx="665374" cy="561314"/>
+                </a:xfrm>
+              </p:grpSpPr>
+              <p:sp>
+                <p:nvSpPr>
+                  <p:cNvPr id="75" name="Oval 74"/>
+                  <p:cNvSpPr/>
+                  <p:nvPr/>
+                </p:nvSpPr>
+                <p:spPr>
+                  <a:xfrm>
+                    <a:off x="2064189" y="1140737"/>
+                    <a:ext cx="589441" cy="561314"/>
+                  </a:xfrm>
+                  <a:prstGeom prst="ellipse">
+                    <a:avLst/>
+                  </a:prstGeom>
+                  <a:solidFill>
+                    <a:srgbClr val="FFCCCC"/>
+                  </a:solidFill>
+                  <a:ln w="9525">
+                    <a:solidFill>
+                      <a:schemeClr val="tx1"/>
+                    </a:solidFill>
+                  </a:ln>
+                </p:spPr>
+                <p:style>
+                  <a:lnRef idx="2">
+                    <a:schemeClr val="accent1">
+                      <a:shade val="50000"/>
+                    </a:schemeClr>
+                  </a:lnRef>
+                  <a:fillRef idx="1">
+                    <a:schemeClr val="accent1"/>
+                  </a:fillRef>
+                  <a:effectRef idx="0">
+                    <a:schemeClr val="accent1"/>
+                  </a:effectRef>
+                  <a:fontRef idx="minor">
+                    <a:schemeClr val="lt1"/>
+                  </a:fontRef>
+                </p:style>
+                <p:txBody>
+                  <a:bodyPr rtlCol="0" anchor="ctr"/>
+                  <a:lstStyle/>
+                  <a:p>
+                    <a:pPr algn="ctr"/>
+                    <a:endParaRPr lang="en-US" sz="2000"/>
+                  </a:p>
+                </p:txBody>
+              </p:sp>
+              <p:sp>
+                <p:nvSpPr>
+                  <p:cNvPr id="76" name="TextBox 75"/>
+                  <p:cNvSpPr txBox="1"/>
+                  <p:nvPr/>
+                </p:nvSpPr>
+                <p:spPr>
+                  <a:xfrm>
+                    <a:off x="2026222" y="1282894"/>
+                    <a:ext cx="665374" cy="307777"/>
+                  </a:xfrm>
+                  <a:prstGeom prst="rect">
+                    <a:avLst/>
+                  </a:prstGeom>
+                  <a:noFill/>
+                </p:spPr>
+                <p:txBody>
+                  <a:bodyPr wrap="none" rtlCol="0">
+                    <a:spAutoFit/>
+                  </a:bodyPr>
+                  <a:lstStyle/>
+                  <a:p>
+                    <a:pPr algn="ctr"/>
+                    <a:r>
+                      <a:rPr lang="en-US" sz="1400" dirty="0" smtClean="0"/>
+                      <a:t>(A,</a:t>
+                    </a:r>
+                    <a:r>
+                      <a:rPr lang="en-US" sz="1400" dirty="0" smtClean="0"/>
+                      <a:t>–</a:t>
+                    </a:r>
+                    <a:r>
+                      <a:rPr lang="en-US" sz="1400" dirty="0" smtClean="0"/>
+                      <a:t>,</a:t>
+                    </a:r>
+                    <a:r>
+                      <a:rPr lang="en-US" sz="1400" dirty="0" smtClean="0"/>
+                      <a:t>2</a:t>
+                    </a:r>
+                    <a:r>
+                      <a:rPr lang="en-US" sz="1400" dirty="0" smtClean="0"/>
+                      <a:t>)</a:t>
+                    </a:r>
+                    <a:endParaRPr lang="en-US" sz="1400" dirty="0"/>
+                  </a:p>
+                </p:txBody>
+              </p:sp>
+            </p:grpSp>
+            <p:grpSp>
+              <p:nvGrpSpPr>
+                <p:cNvPr id="20" name="Group 19"/>
+                <p:cNvGrpSpPr/>
+                <p:nvPr/>
+              </p:nvGrpSpPr>
+              <p:grpSpPr>
+                <a:xfrm>
+                  <a:off x="3002898" y="2460781"/>
+                  <a:ext cx="655372" cy="561314"/>
+                  <a:chOff x="2031223" y="1140737"/>
+                  <a:chExt cx="655372" cy="561314"/>
+                </a:xfrm>
+              </p:grpSpPr>
+              <p:sp>
+                <p:nvSpPr>
+                  <p:cNvPr id="73" name="Oval 72"/>
+                  <p:cNvSpPr/>
+                  <p:nvPr/>
+                </p:nvSpPr>
+                <p:spPr>
+                  <a:xfrm>
+                    <a:off x="2064189" y="1140737"/>
+                    <a:ext cx="589441" cy="561314"/>
+                  </a:xfrm>
+                  <a:prstGeom prst="ellipse">
+                    <a:avLst/>
+                  </a:prstGeom>
+                  <a:solidFill>
+                    <a:srgbClr val="FFCCCC"/>
+                  </a:solidFill>
+                  <a:ln w="9525">
+                    <a:solidFill>
+                      <a:schemeClr val="tx1"/>
+                    </a:solidFill>
+                  </a:ln>
+                </p:spPr>
+                <p:style>
+                  <a:lnRef idx="2">
+                    <a:schemeClr val="accent1">
+                      <a:shade val="50000"/>
+                    </a:schemeClr>
+                  </a:lnRef>
+                  <a:fillRef idx="1">
+                    <a:schemeClr val="accent1"/>
+                  </a:fillRef>
+                  <a:effectRef idx="0">
+                    <a:schemeClr val="accent1"/>
+                  </a:effectRef>
+                  <a:fontRef idx="minor">
+                    <a:schemeClr val="lt1"/>
+                  </a:fontRef>
+                </p:style>
+                <p:txBody>
+                  <a:bodyPr rtlCol="0" anchor="ctr"/>
+                  <a:lstStyle/>
+                  <a:p>
+                    <a:pPr algn="ctr"/>
+                    <a:endParaRPr lang="en-US" sz="2000"/>
+                  </a:p>
+                </p:txBody>
+              </p:sp>
+              <p:sp>
+                <p:nvSpPr>
+                  <p:cNvPr id="74" name="TextBox 73"/>
+                  <p:cNvSpPr txBox="1"/>
+                  <p:nvPr/>
+                </p:nvSpPr>
+                <p:spPr>
+                  <a:xfrm>
+                    <a:off x="2031223" y="1282894"/>
+                    <a:ext cx="655372" cy="307777"/>
+                  </a:xfrm>
+                  <a:prstGeom prst="rect">
+                    <a:avLst/>
+                  </a:prstGeom>
+                  <a:noFill/>
+                </p:spPr>
+                <p:txBody>
+                  <a:bodyPr wrap="none" rtlCol="0">
+                    <a:spAutoFit/>
+                  </a:bodyPr>
+                  <a:lstStyle/>
+                  <a:p>
+                    <a:pPr algn="ctr"/>
+                    <a:r>
+                      <a:rPr lang="en-US" sz="1400" dirty="0" smtClean="0"/>
+                      <a:t>(B,</a:t>
+                    </a:r>
+                    <a:r>
+                      <a:rPr lang="en-US" sz="1400" dirty="0" smtClean="0"/>
+                      <a:t>–</a:t>
+                    </a:r>
+                    <a:r>
+                      <a:rPr lang="en-US" sz="1400" dirty="0" smtClean="0"/>
+                      <a:t>,</a:t>
+                    </a:r>
+                    <a:r>
+                      <a:rPr lang="en-US" sz="1400" dirty="0" smtClean="0"/>
+                      <a:t>2</a:t>
+                    </a:r>
+                    <a:r>
+                      <a:rPr lang="en-US" sz="1400" dirty="0" smtClean="0"/>
+                      <a:t>)</a:t>
+                    </a:r>
+                    <a:endParaRPr lang="en-US" sz="1400" dirty="0"/>
+                  </a:p>
+                </p:txBody>
+              </p:sp>
+            </p:grpSp>
+            <p:grpSp>
+              <p:nvGrpSpPr>
+                <p:cNvPr id="21" name="Group 20"/>
+                <p:cNvGrpSpPr/>
+                <p:nvPr/>
+              </p:nvGrpSpPr>
+              <p:grpSpPr>
+                <a:xfrm>
+                  <a:off x="3919748" y="2460781"/>
+                  <a:ext cx="648063" cy="561314"/>
+                  <a:chOff x="2034878" y="1140737"/>
+                  <a:chExt cx="648063" cy="561314"/>
+                </a:xfrm>
+              </p:grpSpPr>
+              <p:sp>
+                <p:nvSpPr>
+                  <p:cNvPr id="71" name="Oval 70"/>
+                  <p:cNvSpPr/>
+                  <p:nvPr/>
+                </p:nvSpPr>
+                <p:spPr>
+                  <a:xfrm>
+                    <a:off x="2064189" y="1140737"/>
+                    <a:ext cx="589441" cy="561314"/>
+                  </a:xfrm>
+                  <a:prstGeom prst="ellipse">
+                    <a:avLst/>
+                  </a:prstGeom>
+                  <a:solidFill>
+                    <a:schemeClr val="bg1"/>
+                  </a:solidFill>
+                  <a:ln w="9525">
+                    <a:solidFill>
+                      <a:schemeClr val="tx1"/>
+                    </a:solidFill>
+                  </a:ln>
+                </p:spPr>
+                <p:style>
+                  <a:lnRef idx="2">
+                    <a:schemeClr val="accent1">
+                      <a:shade val="50000"/>
+                    </a:schemeClr>
+                  </a:lnRef>
+                  <a:fillRef idx="1">
+                    <a:schemeClr val="accent1"/>
+                  </a:fillRef>
+                  <a:effectRef idx="0">
+                    <a:schemeClr val="accent1"/>
+                  </a:effectRef>
+                  <a:fontRef idx="minor">
+                    <a:schemeClr val="lt1"/>
+                  </a:fontRef>
+                </p:style>
+                <p:txBody>
+                  <a:bodyPr rtlCol="0" anchor="ctr"/>
+                  <a:lstStyle/>
+                  <a:p>
+                    <a:pPr algn="ctr"/>
+                    <a:endParaRPr lang="en-US" sz="2000"/>
+                  </a:p>
+                </p:txBody>
+              </p:sp>
+              <p:sp>
+                <p:nvSpPr>
+                  <p:cNvPr id="72" name="TextBox 71"/>
+                  <p:cNvSpPr txBox="1"/>
+                  <p:nvPr/>
+                </p:nvSpPr>
+                <p:spPr>
+                  <a:xfrm>
+                    <a:off x="2034878" y="1282894"/>
+                    <a:ext cx="648063" cy="307777"/>
+                  </a:xfrm>
+                  <a:prstGeom prst="rect">
+                    <a:avLst/>
+                  </a:prstGeom>
+                  <a:noFill/>
+                </p:spPr>
+                <p:txBody>
+                  <a:bodyPr wrap="none" rtlCol="0">
+                    <a:spAutoFit/>
+                  </a:bodyPr>
+                  <a:lstStyle/>
+                  <a:p>
+                    <a:pPr algn="ctr"/>
+                    <a:r>
+                      <a:rPr lang="en-US" sz="1400" dirty="0" smtClean="0"/>
+                      <a:t>(E,</a:t>
+                    </a:r>
+                    <a:r>
+                      <a:rPr lang="en-US" sz="1400" dirty="0" smtClean="0"/>
+                      <a:t>–</a:t>
+                    </a:r>
+                    <a:r>
+                      <a:rPr lang="en-US" sz="1400" dirty="0" smtClean="0"/>
+                      <a:t>,2)</a:t>
+                    </a:r>
+                    <a:endParaRPr lang="en-US" sz="1400" dirty="0"/>
+                  </a:p>
+                </p:txBody>
+              </p:sp>
+            </p:grpSp>
+            <p:grpSp>
+              <p:nvGrpSpPr>
+                <p:cNvPr id="22" name="Group 21"/>
+                <p:cNvGrpSpPr/>
+                <p:nvPr/>
+              </p:nvGrpSpPr>
+              <p:grpSpPr>
+                <a:xfrm>
+                  <a:off x="4791882" y="2483732"/>
+                  <a:ext cx="672107" cy="561314"/>
+                  <a:chOff x="2022856" y="1140737"/>
+                  <a:chExt cx="672107" cy="561314"/>
+                </a:xfrm>
+              </p:grpSpPr>
+              <p:sp>
+                <p:nvSpPr>
+                  <p:cNvPr id="69" name="Oval 68"/>
+                  <p:cNvSpPr/>
+                  <p:nvPr/>
+                </p:nvSpPr>
+                <p:spPr>
+                  <a:xfrm>
+                    <a:off x="2064189" y="1140737"/>
+                    <a:ext cx="589441" cy="561314"/>
+                  </a:xfrm>
+                  <a:prstGeom prst="ellipse">
+                    <a:avLst/>
+                  </a:prstGeom>
+                  <a:solidFill>
+                    <a:schemeClr val="bg1"/>
+                  </a:solidFill>
+                  <a:ln w="9525">
+                    <a:solidFill>
+                      <a:schemeClr val="tx1"/>
+                    </a:solidFill>
+                  </a:ln>
+                </p:spPr>
+                <p:style>
+                  <a:lnRef idx="2">
+                    <a:schemeClr val="accent1">
+                      <a:shade val="50000"/>
+                    </a:schemeClr>
+                  </a:lnRef>
+                  <a:fillRef idx="1">
+                    <a:schemeClr val="accent1"/>
+                  </a:fillRef>
+                  <a:effectRef idx="0">
+                    <a:schemeClr val="accent1"/>
+                  </a:effectRef>
+                  <a:fontRef idx="minor">
+                    <a:schemeClr val="lt1"/>
+                  </a:fontRef>
+                </p:style>
+                <p:txBody>
+                  <a:bodyPr rtlCol="0" anchor="ctr"/>
+                  <a:lstStyle/>
+                  <a:p>
+                    <a:pPr algn="ctr"/>
+                    <a:endParaRPr lang="en-US" sz="2000"/>
+                  </a:p>
+                </p:txBody>
+              </p:sp>
+              <p:sp>
+                <p:nvSpPr>
+                  <p:cNvPr id="70" name="TextBox 69"/>
+                  <p:cNvSpPr txBox="1"/>
+                  <p:nvPr/>
+                </p:nvSpPr>
+                <p:spPr>
+                  <a:xfrm>
+                    <a:off x="2022856" y="1282894"/>
+                    <a:ext cx="672107" cy="307777"/>
+                  </a:xfrm>
+                  <a:prstGeom prst="rect">
+                    <a:avLst/>
+                  </a:prstGeom>
+                  <a:noFill/>
+                </p:spPr>
+                <p:txBody>
+                  <a:bodyPr wrap="none" rtlCol="0">
+                    <a:spAutoFit/>
+                  </a:bodyPr>
+                  <a:lstStyle/>
+                  <a:p>
+                    <a:pPr algn="ctr"/>
+                    <a:r>
+                      <a:rPr lang="en-US" sz="1400" dirty="0" smtClean="0"/>
+                      <a:t>(D,2,2)</a:t>
+                    </a:r>
+                    <a:endParaRPr lang="en-US" sz="1400" dirty="0"/>
+                  </a:p>
+                </p:txBody>
+              </p:sp>
+            </p:grpSp>
+            <p:grpSp>
+              <p:nvGrpSpPr>
+                <p:cNvPr id="23" name="Group 22"/>
+                <p:cNvGrpSpPr/>
+                <p:nvPr/>
+              </p:nvGrpSpPr>
+              <p:grpSpPr>
+                <a:xfrm>
+                  <a:off x="4797108" y="3223596"/>
+                  <a:ext cx="661655" cy="561314"/>
+                  <a:chOff x="2028082" y="1140737"/>
+                  <a:chExt cx="661655" cy="561314"/>
+                </a:xfrm>
+              </p:grpSpPr>
+              <p:sp>
+                <p:nvSpPr>
+                  <p:cNvPr id="67" name="Oval 66"/>
+                  <p:cNvSpPr/>
+                  <p:nvPr/>
+                </p:nvSpPr>
+                <p:spPr>
+                  <a:xfrm>
+                    <a:off x="2064189" y="1140737"/>
+                    <a:ext cx="589441" cy="561314"/>
+                  </a:xfrm>
+                  <a:prstGeom prst="ellipse">
+                    <a:avLst/>
+                  </a:prstGeom>
+                  <a:solidFill>
+                    <a:schemeClr val="bg1"/>
+                  </a:solidFill>
+                  <a:ln w="9525">
+                    <a:solidFill>
+                      <a:schemeClr val="tx1"/>
+                    </a:solidFill>
+                  </a:ln>
+                </p:spPr>
+                <p:style>
+                  <a:lnRef idx="2">
+                    <a:schemeClr val="accent1">
+                      <a:shade val="50000"/>
+                    </a:schemeClr>
+                  </a:lnRef>
+                  <a:fillRef idx="1">
+                    <a:schemeClr val="accent1"/>
+                  </a:fillRef>
+                  <a:effectRef idx="0">
+                    <a:schemeClr val="accent1"/>
+                  </a:effectRef>
+                  <a:fontRef idx="minor">
+                    <a:schemeClr val="lt1"/>
+                  </a:fontRef>
+                </p:style>
+                <p:txBody>
+                  <a:bodyPr rtlCol="0" anchor="ctr"/>
+                  <a:lstStyle/>
+                  <a:p>
+                    <a:pPr algn="ctr"/>
+                    <a:endParaRPr lang="en-US" sz="2000"/>
+                  </a:p>
+                </p:txBody>
+              </p:sp>
+              <p:sp>
+                <p:nvSpPr>
+                  <p:cNvPr id="68" name="TextBox 67"/>
+                  <p:cNvSpPr txBox="1"/>
+                  <p:nvPr/>
+                </p:nvSpPr>
+                <p:spPr>
+                  <a:xfrm>
+                    <a:off x="2028082" y="1282894"/>
+                    <a:ext cx="661655" cy="307777"/>
+                  </a:xfrm>
+                  <a:prstGeom prst="rect">
+                    <a:avLst/>
+                  </a:prstGeom>
+                  <a:noFill/>
+                </p:spPr>
+                <p:txBody>
+                  <a:bodyPr wrap="none" rtlCol="0">
+                    <a:spAutoFit/>
+                  </a:bodyPr>
+                  <a:lstStyle/>
+                  <a:p>
+                    <a:pPr algn="ctr"/>
+                    <a:r>
+                      <a:rPr lang="en-US" sz="1400" dirty="0" smtClean="0"/>
+                      <a:t>(C,3,2)</a:t>
+                    </a:r>
+                    <a:endParaRPr lang="en-US" sz="1400" dirty="0"/>
+                  </a:p>
+                </p:txBody>
+              </p:sp>
+            </p:grpSp>
+            <p:grpSp>
+              <p:nvGrpSpPr>
+                <p:cNvPr id="24" name="Group 23"/>
+                <p:cNvGrpSpPr/>
+                <p:nvPr/>
+              </p:nvGrpSpPr>
+              <p:grpSpPr>
+                <a:xfrm>
+                  <a:off x="5216942" y="3859430"/>
+                  <a:ext cx="671658" cy="561314"/>
+                  <a:chOff x="1769079" y="1013737"/>
+                  <a:chExt cx="671658" cy="561314"/>
+                </a:xfrm>
+              </p:grpSpPr>
+              <p:sp>
+                <p:nvSpPr>
+                  <p:cNvPr id="65" name="Oval 64"/>
+                  <p:cNvSpPr/>
+                  <p:nvPr/>
+                </p:nvSpPr>
+                <p:spPr>
+                  <a:xfrm>
+                    <a:off x="1810189" y="1013737"/>
+                    <a:ext cx="589441" cy="561314"/>
+                  </a:xfrm>
+                  <a:prstGeom prst="ellipse">
+                    <a:avLst/>
+                  </a:prstGeom>
+                  <a:solidFill>
+                    <a:schemeClr val="bg1"/>
+                  </a:solidFill>
+                  <a:ln w="9525">
+                    <a:solidFill>
+                      <a:schemeClr val="tx1"/>
+                    </a:solidFill>
+                  </a:ln>
+                </p:spPr>
+                <p:style>
+                  <a:lnRef idx="2">
+                    <a:schemeClr val="accent1">
+                      <a:shade val="50000"/>
+                    </a:schemeClr>
+                  </a:lnRef>
+                  <a:fillRef idx="1">
+                    <a:schemeClr val="accent1"/>
+                  </a:fillRef>
+                  <a:effectRef idx="0">
+                    <a:schemeClr val="accent1"/>
+                  </a:effectRef>
+                  <a:fontRef idx="minor">
+                    <a:schemeClr val="lt1"/>
+                  </a:fontRef>
+                </p:style>
+                <p:txBody>
+                  <a:bodyPr rtlCol="0" anchor="ctr"/>
+                  <a:lstStyle/>
+                  <a:p>
+                    <a:pPr algn="ctr"/>
+                    <a:endParaRPr lang="en-US" sz="2000"/>
+                  </a:p>
+                </p:txBody>
+              </p:sp>
+              <p:sp>
+                <p:nvSpPr>
+                  <p:cNvPr id="66" name="TextBox 65"/>
+                  <p:cNvSpPr txBox="1"/>
+                  <p:nvPr/>
+                </p:nvSpPr>
+                <p:spPr>
+                  <a:xfrm>
+                    <a:off x="1769079" y="1155894"/>
+                    <a:ext cx="671658" cy="307777"/>
+                  </a:xfrm>
+                  <a:prstGeom prst="rect">
+                    <a:avLst/>
+                  </a:prstGeom>
+                  <a:noFill/>
+                </p:spPr>
+                <p:txBody>
+                  <a:bodyPr wrap="none" rtlCol="0">
+                    <a:spAutoFit/>
+                  </a:bodyPr>
+                  <a:lstStyle/>
+                  <a:p>
+                    <a:pPr algn="ctr"/>
+                    <a:r>
+                      <a:rPr lang="en-US" sz="1400" dirty="0" smtClean="0"/>
+                      <a:t>(A,4,2)</a:t>
+                    </a:r>
+                    <a:endParaRPr lang="en-US" sz="1400" dirty="0"/>
+                  </a:p>
+                </p:txBody>
+              </p:sp>
+            </p:grpSp>
+            <p:grpSp>
+              <p:nvGrpSpPr>
+                <p:cNvPr id="25" name="Group 24"/>
+                <p:cNvGrpSpPr/>
+                <p:nvPr/>
+              </p:nvGrpSpPr>
+              <p:grpSpPr>
+                <a:xfrm>
+                  <a:off x="3922481" y="3223595"/>
+                  <a:ext cx="665823" cy="561314"/>
+                  <a:chOff x="2025998" y="1140737"/>
+                  <a:chExt cx="665823" cy="561314"/>
+                </a:xfrm>
+              </p:grpSpPr>
+              <p:sp>
+                <p:nvSpPr>
+                  <p:cNvPr id="63" name="Oval 62"/>
+                  <p:cNvSpPr/>
+                  <p:nvPr/>
+                </p:nvSpPr>
+                <p:spPr>
+                  <a:xfrm>
+                    <a:off x="2064189" y="1140737"/>
+                    <a:ext cx="589441" cy="561314"/>
+                  </a:xfrm>
+                  <a:prstGeom prst="ellipse">
+                    <a:avLst/>
+                  </a:prstGeom>
+                  <a:solidFill>
+                    <a:srgbClr val="FFCCCC"/>
+                  </a:solidFill>
+                  <a:ln w="9525">
+                    <a:solidFill>
+                      <a:schemeClr val="tx1"/>
+                    </a:solidFill>
+                  </a:ln>
+                </p:spPr>
+                <p:style>
+                  <a:lnRef idx="2">
+                    <a:schemeClr val="accent1">
+                      <a:shade val="50000"/>
+                    </a:schemeClr>
+                  </a:lnRef>
+                  <a:fillRef idx="1">
+                    <a:schemeClr val="accent1"/>
+                  </a:fillRef>
+                  <a:effectRef idx="0">
+                    <a:schemeClr val="accent1"/>
+                  </a:effectRef>
+                  <a:fontRef idx="minor">
+                    <a:schemeClr val="lt1"/>
+                  </a:fontRef>
+                </p:style>
+                <p:txBody>
+                  <a:bodyPr rtlCol="0" anchor="ctr"/>
+                  <a:lstStyle/>
+                  <a:p>
+                    <a:pPr algn="ctr"/>
+                    <a:endParaRPr lang="en-US" sz="2000"/>
+                  </a:p>
+                </p:txBody>
+              </p:sp>
+              <p:sp>
+                <p:nvSpPr>
+                  <p:cNvPr id="64" name="TextBox 63"/>
+                  <p:cNvSpPr txBox="1"/>
+                  <p:nvPr/>
+                </p:nvSpPr>
+                <p:spPr>
+                  <a:xfrm>
+                    <a:off x="2025998" y="1282894"/>
+                    <a:ext cx="665823" cy="307777"/>
+                  </a:xfrm>
+                  <a:prstGeom prst="rect">
+                    <a:avLst/>
+                  </a:prstGeom>
+                  <a:noFill/>
+                </p:spPr>
+                <p:txBody>
+                  <a:bodyPr wrap="none" rtlCol="0">
+                    <a:spAutoFit/>
+                  </a:bodyPr>
+                  <a:lstStyle/>
+                  <a:p>
+                    <a:pPr algn="ctr"/>
+                    <a:r>
+                      <a:rPr lang="en-US" sz="1400" dirty="0" smtClean="0"/>
+                      <a:t>(D,</a:t>
+                    </a:r>
+                    <a:r>
+                      <a:rPr lang="en-US" sz="1400" dirty="0" smtClean="0"/>
+                      <a:t>–</a:t>
+                    </a:r>
+                    <a:r>
+                      <a:rPr lang="en-US" sz="1400" dirty="0" smtClean="0"/>
+                      <a:t>,2)</a:t>
+                    </a:r>
+                    <a:endParaRPr lang="en-US" sz="1400" dirty="0"/>
+                  </a:p>
+                </p:txBody>
+              </p:sp>
+            </p:grpSp>
+            <p:grpSp>
+              <p:nvGrpSpPr>
+                <p:cNvPr id="26" name="Group 25"/>
+                <p:cNvGrpSpPr/>
+                <p:nvPr/>
+              </p:nvGrpSpPr>
+              <p:grpSpPr>
+                <a:xfrm>
+                  <a:off x="3927705" y="3858230"/>
+                  <a:ext cx="655372" cy="561314"/>
+                  <a:chOff x="2031222" y="1013737"/>
+                  <a:chExt cx="655372" cy="561314"/>
+                </a:xfrm>
+              </p:grpSpPr>
+              <p:sp>
+                <p:nvSpPr>
+                  <p:cNvPr id="61" name="Oval 60"/>
+                  <p:cNvSpPr/>
+                  <p:nvPr/>
+                </p:nvSpPr>
+                <p:spPr>
+                  <a:xfrm>
+                    <a:off x="2064189" y="1013737"/>
+                    <a:ext cx="589441" cy="561314"/>
+                  </a:xfrm>
+                  <a:prstGeom prst="ellipse">
+                    <a:avLst/>
+                  </a:prstGeom>
+                  <a:solidFill>
+                    <a:schemeClr val="bg1"/>
+                  </a:solidFill>
+                  <a:ln w="9525">
+                    <a:solidFill>
+                      <a:schemeClr val="tx1"/>
+                    </a:solidFill>
+                  </a:ln>
+                </p:spPr>
+                <p:style>
+                  <a:lnRef idx="2">
+                    <a:schemeClr val="accent1">
+                      <a:shade val="50000"/>
+                    </a:schemeClr>
+                  </a:lnRef>
+                  <a:fillRef idx="1">
+                    <a:schemeClr val="accent1"/>
+                  </a:fillRef>
+                  <a:effectRef idx="0">
+                    <a:schemeClr val="accent1"/>
+                  </a:effectRef>
+                  <a:fontRef idx="minor">
+                    <a:schemeClr val="lt1"/>
+                  </a:fontRef>
+                </p:style>
+                <p:txBody>
+                  <a:bodyPr rtlCol="0" anchor="ctr"/>
+                  <a:lstStyle/>
+                  <a:p>
+                    <a:pPr algn="ctr"/>
+                    <a:endParaRPr lang="en-US" sz="2000"/>
+                  </a:p>
+                </p:txBody>
+              </p:sp>
+              <p:sp>
+                <p:nvSpPr>
+                  <p:cNvPr id="62" name="TextBox 61"/>
+                  <p:cNvSpPr txBox="1"/>
+                  <p:nvPr/>
+                </p:nvSpPr>
+                <p:spPr>
+                  <a:xfrm>
+                    <a:off x="2031222" y="1155894"/>
+                    <a:ext cx="655372" cy="307777"/>
+                  </a:xfrm>
+                  <a:prstGeom prst="rect">
+                    <a:avLst/>
+                  </a:prstGeom>
+                  <a:noFill/>
+                </p:spPr>
+                <p:txBody>
+                  <a:bodyPr wrap="none" rtlCol="0">
+                    <a:spAutoFit/>
+                  </a:bodyPr>
+                  <a:lstStyle/>
+                  <a:p>
+                    <a:pPr algn="ctr"/>
+                    <a:r>
+                      <a:rPr lang="en-US" sz="1400" dirty="0" smtClean="0"/>
+                      <a:t>(B,</a:t>
+                    </a:r>
+                    <a:r>
+                      <a:rPr lang="en-US" sz="1400" dirty="0" smtClean="0"/>
+                      <a:t>–</a:t>
+                    </a:r>
+                    <a:r>
+                      <a:rPr lang="en-US" sz="1400" dirty="0" smtClean="0"/>
+                      <a:t>,</a:t>
+                    </a:r>
+                    <a:r>
+                      <a:rPr lang="en-US" sz="1400" dirty="0" smtClean="0"/>
+                      <a:t>3</a:t>
+                    </a:r>
+                    <a:r>
+                      <a:rPr lang="en-US" sz="1400" dirty="0" smtClean="0"/>
+                      <a:t>)</a:t>
+                    </a:r>
+                    <a:endParaRPr lang="en-US" sz="1400" dirty="0"/>
+                  </a:p>
+                </p:txBody>
+              </p:sp>
+            </p:grpSp>
+            <p:grpSp>
+              <p:nvGrpSpPr>
+                <p:cNvPr id="27" name="Group 26"/>
+                <p:cNvGrpSpPr/>
+                <p:nvPr/>
+              </p:nvGrpSpPr>
+              <p:grpSpPr>
+                <a:xfrm>
+                  <a:off x="3014511" y="3223595"/>
+                  <a:ext cx="655372" cy="561314"/>
+                  <a:chOff x="2031223" y="1140737"/>
+                  <a:chExt cx="655372" cy="561314"/>
+                </a:xfrm>
+              </p:grpSpPr>
+              <p:sp>
+                <p:nvSpPr>
+                  <p:cNvPr id="59" name="Oval 58"/>
+                  <p:cNvSpPr/>
+                  <p:nvPr/>
+                </p:nvSpPr>
+                <p:spPr>
+                  <a:xfrm>
+                    <a:off x="2064189" y="1140737"/>
+                    <a:ext cx="589441" cy="561314"/>
+                  </a:xfrm>
+                  <a:prstGeom prst="ellipse">
+                    <a:avLst/>
+                  </a:prstGeom>
+                  <a:solidFill>
+                    <a:schemeClr val="bg1"/>
+                  </a:solidFill>
+                  <a:ln w="9525">
+                    <a:solidFill>
+                      <a:schemeClr val="tx1"/>
+                    </a:solidFill>
+                  </a:ln>
+                </p:spPr>
+                <p:style>
+                  <a:lnRef idx="2">
+                    <a:schemeClr val="accent1">
+                      <a:shade val="50000"/>
+                    </a:schemeClr>
+                  </a:lnRef>
+                  <a:fillRef idx="1">
+                    <a:schemeClr val="accent1"/>
+                  </a:fillRef>
+                  <a:effectRef idx="0">
+                    <a:schemeClr val="accent1"/>
+                  </a:effectRef>
+                  <a:fontRef idx="minor">
+                    <a:schemeClr val="lt1"/>
+                  </a:fontRef>
+                </p:style>
+                <p:txBody>
+                  <a:bodyPr rtlCol="0" anchor="ctr"/>
+                  <a:lstStyle/>
+                  <a:p>
+                    <a:pPr algn="ctr"/>
+                    <a:endParaRPr lang="en-US" sz="2000"/>
+                  </a:p>
+                </p:txBody>
+              </p:sp>
+              <p:sp>
+                <p:nvSpPr>
+                  <p:cNvPr id="60" name="TextBox 59"/>
+                  <p:cNvSpPr txBox="1"/>
+                  <p:nvPr/>
+                </p:nvSpPr>
+                <p:spPr>
+                  <a:xfrm>
+                    <a:off x="2031223" y="1282894"/>
+                    <a:ext cx="655372" cy="307777"/>
+                  </a:xfrm>
+                  <a:prstGeom prst="rect">
+                    <a:avLst/>
+                  </a:prstGeom>
+                  <a:noFill/>
+                </p:spPr>
+                <p:txBody>
+                  <a:bodyPr wrap="none" rtlCol="0">
+                    <a:spAutoFit/>
+                  </a:bodyPr>
+                  <a:lstStyle/>
+                  <a:p>
+                    <a:pPr algn="ctr"/>
+                    <a:r>
+                      <a:rPr lang="en-US" sz="1400" dirty="0" smtClean="0"/>
+                      <a:t>(C,</a:t>
+                    </a:r>
+                    <a:r>
+                      <a:rPr lang="en-US" sz="1400" dirty="0" smtClean="0"/>
+                      <a:t>–</a:t>
+                    </a:r>
+                    <a:r>
+                      <a:rPr lang="en-US" sz="1400" dirty="0" smtClean="0"/>
+                      <a:t>,2)</a:t>
+                    </a:r>
+                    <a:endParaRPr lang="en-US" sz="1400" dirty="0"/>
+                  </a:p>
+                </p:txBody>
+              </p:sp>
+            </p:grpSp>
+            <p:grpSp>
+              <p:nvGrpSpPr>
+                <p:cNvPr id="28" name="Group 27"/>
+                <p:cNvGrpSpPr/>
+                <p:nvPr/>
+              </p:nvGrpSpPr>
+              <p:grpSpPr>
+                <a:xfrm>
+                  <a:off x="4152379" y="4491137"/>
+                  <a:ext cx="701346" cy="561314"/>
+                  <a:chOff x="2262236" y="886737"/>
+                  <a:chExt cx="701346" cy="561314"/>
+                </a:xfrm>
+              </p:grpSpPr>
+              <p:sp>
+                <p:nvSpPr>
+                  <p:cNvPr id="57" name="Oval 56"/>
+                  <p:cNvSpPr/>
+                  <p:nvPr/>
+                </p:nvSpPr>
+                <p:spPr>
+                  <a:xfrm>
+                    <a:off x="2318189" y="886737"/>
+                    <a:ext cx="589441" cy="561314"/>
+                  </a:xfrm>
+                  <a:prstGeom prst="ellipse">
+                    <a:avLst/>
+                  </a:prstGeom>
+                  <a:solidFill>
+                    <a:schemeClr val="bg1"/>
+                  </a:solidFill>
+                  <a:ln w="9525">
+                    <a:solidFill>
+                      <a:schemeClr val="tx1"/>
+                    </a:solidFill>
+                  </a:ln>
+                </p:spPr>
+                <p:style>
+                  <a:lnRef idx="2">
+                    <a:schemeClr val="accent1">
+                      <a:shade val="50000"/>
+                    </a:schemeClr>
+                  </a:lnRef>
+                  <a:fillRef idx="1">
+                    <a:schemeClr val="accent1"/>
+                  </a:fillRef>
+                  <a:effectRef idx="0">
+                    <a:schemeClr val="accent1"/>
+                  </a:effectRef>
+                  <a:fontRef idx="minor">
+                    <a:schemeClr val="lt1"/>
+                  </a:fontRef>
+                </p:style>
+                <p:txBody>
+                  <a:bodyPr rtlCol="0" anchor="ctr"/>
+                  <a:lstStyle/>
+                  <a:p>
+                    <a:pPr algn="ctr"/>
+                    <a:endParaRPr lang="en-US" sz="2000"/>
+                  </a:p>
+                </p:txBody>
+              </p:sp>
+              <p:sp>
+                <p:nvSpPr>
+                  <p:cNvPr id="58" name="TextBox 57"/>
+                  <p:cNvSpPr txBox="1"/>
+                  <p:nvPr/>
+                </p:nvSpPr>
+                <p:spPr>
+                  <a:xfrm>
+                    <a:off x="2262236" y="1028894"/>
+                    <a:ext cx="701346" cy="307777"/>
+                  </a:xfrm>
+                  <a:prstGeom prst="rect">
+                    <a:avLst/>
+                  </a:prstGeom>
+                  <a:noFill/>
+                </p:spPr>
+                <p:txBody>
+                  <a:bodyPr wrap="none" rtlCol="0">
+                    <a:spAutoFit/>
+                  </a:bodyPr>
+                  <a:lstStyle/>
+                  <a:p>
+                    <a:pPr algn="ctr"/>
+                    <a:r>
+                      <a:rPr lang="en-US" sz="1400" dirty="0" smtClean="0"/>
+                      <a:t>(W,</a:t>
+                    </a:r>
+                    <a:r>
+                      <a:rPr lang="en-US" sz="1400" dirty="0" smtClean="0"/>
+                      <a:t>–</a:t>
+                    </a:r>
+                    <a:r>
+                      <a:rPr lang="en-US" sz="1400" dirty="0" smtClean="0"/>
+                      <a:t>,</a:t>
+                    </a:r>
+                    <a:r>
+                      <a:rPr lang="en-US" sz="1400" dirty="0" smtClean="0"/>
+                      <a:t>4</a:t>
+                    </a:r>
+                    <a:r>
+                      <a:rPr lang="en-US" sz="1400" dirty="0" smtClean="0"/>
+                      <a:t>)</a:t>
+                    </a:r>
+                    <a:endParaRPr lang="en-US" sz="1400" dirty="0"/>
+                  </a:p>
+                </p:txBody>
+              </p:sp>
+            </p:grpSp>
+            <p:grpSp>
+              <p:nvGrpSpPr>
+                <p:cNvPr id="29" name="Group 28"/>
+                <p:cNvGrpSpPr/>
+                <p:nvPr/>
+              </p:nvGrpSpPr>
+              <p:grpSpPr>
+                <a:xfrm>
+                  <a:off x="4948099" y="4491137"/>
+                  <a:ext cx="701346" cy="561314"/>
+                  <a:chOff x="1500236" y="908219"/>
+                  <a:chExt cx="701346" cy="561314"/>
+                </a:xfrm>
+              </p:grpSpPr>
+              <p:sp>
+                <p:nvSpPr>
+                  <p:cNvPr id="55" name="Oval 54"/>
+                  <p:cNvSpPr/>
+                  <p:nvPr/>
+                </p:nvSpPr>
+                <p:spPr>
+                  <a:xfrm>
+                    <a:off x="1556189" y="908219"/>
+                    <a:ext cx="589441" cy="561314"/>
+                  </a:xfrm>
+                  <a:prstGeom prst="ellipse">
+                    <a:avLst/>
+                  </a:prstGeom>
+                  <a:solidFill>
+                    <a:schemeClr val="bg1"/>
+                  </a:solidFill>
+                  <a:ln w="9525">
+                    <a:solidFill>
+                      <a:schemeClr val="tx1"/>
+                    </a:solidFill>
+                  </a:ln>
+                </p:spPr>
+                <p:style>
+                  <a:lnRef idx="2">
+                    <a:schemeClr val="accent1">
+                      <a:shade val="50000"/>
+                    </a:schemeClr>
+                  </a:lnRef>
+                  <a:fillRef idx="1">
+                    <a:schemeClr val="accent1"/>
+                  </a:fillRef>
+                  <a:effectRef idx="0">
+                    <a:schemeClr val="accent1"/>
+                  </a:effectRef>
+                  <a:fontRef idx="minor">
+                    <a:schemeClr val="lt1"/>
+                  </a:fontRef>
+                </p:style>
+                <p:txBody>
+                  <a:bodyPr rtlCol="0" anchor="ctr"/>
+                  <a:lstStyle/>
+                  <a:p>
+                    <a:pPr algn="ctr"/>
+                    <a:endParaRPr lang="en-US" sz="2000"/>
+                  </a:p>
+                </p:txBody>
+              </p:sp>
+              <p:sp>
+                <p:nvSpPr>
+                  <p:cNvPr id="56" name="TextBox 55"/>
+                  <p:cNvSpPr txBox="1"/>
+                  <p:nvPr/>
+                </p:nvSpPr>
+                <p:spPr>
+                  <a:xfrm>
+                    <a:off x="1500236" y="1028894"/>
+                    <a:ext cx="701346" cy="307777"/>
+                  </a:xfrm>
+                  <a:prstGeom prst="rect">
+                    <a:avLst/>
+                  </a:prstGeom>
+                  <a:noFill/>
+                </p:spPr>
+                <p:txBody>
+                  <a:bodyPr wrap="none" rtlCol="0">
+                    <a:spAutoFit/>
+                  </a:bodyPr>
+                  <a:lstStyle/>
+                  <a:p>
+                    <a:pPr algn="ctr"/>
+                    <a:r>
+                      <a:rPr lang="en-US" sz="1400" dirty="0" smtClean="0"/>
+                      <a:t>(W,5,</a:t>
+                    </a:r>
+                    <a:r>
+                      <a:rPr lang="en-US" sz="1400" dirty="0" smtClean="0"/>
+                      <a:t>–</a:t>
+                    </a:r>
+                    <a:r>
+                      <a:rPr lang="en-US" sz="1400" dirty="0" smtClean="0"/>
+                      <a:t>)</a:t>
+                    </a:r>
+                    <a:endParaRPr lang="en-US" sz="1400" dirty="0"/>
+                  </a:p>
+                </p:txBody>
+              </p:sp>
+            </p:grpSp>
+            <p:cxnSp>
+              <p:nvCxnSpPr>
+                <p:cNvPr id="30" name="Straight Arrow Connector 29"/>
+                <p:cNvCxnSpPr>
+                  <a:stCxn id="13" idx="2"/>
+                  <a:endCxn id="6" idx="7"/>
+                </p:cNvCxnSpPr>
+                <p:nvPr/>
+              </p:nvCxnSpPr>
+              <p:spPr>
+                <a:xfrm flipH="1">
+                  <a:off x="3146729" y="1421394"/>
+                  <a:ext cx="813943" cy="362862"/>
+                </a:xfrm>
+                <a:prstGeom prst="straightConnector1">
+                  <a:avLst/>
+                </a:prstGeom>
+                <a:ln>
+                  <a:solidFill>
+                    <a:schemeClr val="tx1"/>
+                  </a:solidFill>
+                  <a:tailEnd type="stealth"/>
+                </a:ln>
+              </p:spPr>
+              <p:style>
+                <a:lnRef idx="1">
+                  <a:schemeClr val="accent1"/>
+                </a:lnRef>
+                <a:fillRef idx="0">
+                  <a:schemeClr val="accent1"/>
+                </a:fillRef>
+                <a:effectRef idx="0">
+                  <a:schemeClr val="accent1"/>
+                </a:effectRef>
+                <a:fontRef idx="minor">
+                  <a:schemeClr val="tx1"/>
+                </a:fontRef>
+              </p:style>
+            </p:cxnSp>
+            <p:cxnSp>
+              <p:nvCxnSpPr>
+                <p:cNvPr id="31" name="Straight Arrow Connector 30"/>
+                <p:cNvCxnSpPr>
+                  <a:stCxn id="13" idx="3"/>
+                  <a:endCxn id="16" idx="0"/>
+                </p:cNvCxnSpPr>
+                <p:nvPr/>
+              </p:nvCxnSpPr>
+              <p:spPr>
+                <a:xfrm flipH="1">
+                  <a:off x="3834801" y="1619848"/>
+                  <a:ext cx="212193" cy="82205"/>
+                </a:xfrm>
+                <a:prstGeom prst="straightConnector1">
+                  <a:avLst/>
+                </a:prstGeom>
+                <a:ln>
+                  <a:solidFill>
+                    <a:schemeClr val="tx1"/>
+                  </a:solidFill>
+                  <a:tailEnd type="stealth"/>
+                </a:ln>
+              </p:spPr>
+              <p:style>
+                <a:lnRef idx="1">
+                  <a:schemeClr val="accent1"/>
+                </a:lnRef>
+                <a:fillRef idx="0">
+                  <a:schemeClr val="accent1"/>
+                </a:fillRef>
+                <a:effectRef idx="0">
+                  <a:schemeClr val="accent1"/>
+                </a:effectRef>
+                <a:fontRef idx="minor">
+                  <a:schemeClr val="tx1"/>
+                </a:fontRef>
+              </p:style>
+            </p:cxnSp>
+            <p:cxnSp>
+              <p:nvCxnSpPr>
+                <p:cNvPr id="32" name="Straight Arrow Connector 31"/>
+                <p:cNvCxnSpPr>
+                  <a:stCxn id="13" idx="5"/>
+                  <a:endCxn id="19" idx="0"/>
+                </p:cNvCxnSpPr>
+                <p:nvPr/>
+              </p:nvCxnSpPr>
+              <p:spPr>
+                <a:xfrm>
+                  <a:off x="4463791" y="1619848"/>
+                  <a:ext cx="239837" cy="82204"/>
+                </a:xfrm>
+                <a:prstGeom prst="straightConnector1">
+                  <a:avLst/>
+                </a:prstGeom>
+                <a:ln>
+                  <a:solidFill>
+                    <a:schemeClr val="tx1"/>
+                  </a:solidFill>
+                  <a:tailEnd type="stealth"/>
+                </a:ln>
+              </p:spPr>
+              <p:style>
+                <a:lnRef idx="1">
+                  <a:schemeClr val="accent1"/>
+                </a:lnRef>
+                <a:fillRef idx="0">
+                  <a:schemeClr val="accent1"/>
+                </a:fillRef>
+                <a:effectRef idx="0">
+                  <a:schemeClr val="accent1"/>
+                </a:effectRef>
+                <a:fontRef idx="minor">
+                  <a:schemeClr val="tx1"/>
+                </a:fontRef>
+              </p:style>
+            </p:cxnSp>
+            <p:cxnSp>
+              <p:nvCxnSpPr>
+                <p:cNvPr id="33" name="Straight Arrow Connector 32"/>
+                <p:cNvCxnSpPr>
+                  <a:stCxn id="13" idx="6"/>
+                  <a:endCxn id="22" idx="1"/>
+                </p:cNvCxnSpPr>
+                <p:nvPr/>
+              </p:nvCxnSpPr>
+              <p:spPr>
+                <a:xfrm>
+                  <a:off x="4550113" y="1421394"/>
+                  <a:ext cx="813943" cy="362860"/>
+                </a:xfrm>
+                <a:prstGeom prst="straightConnector1">
+                  <a:avLst/>
+                </a:prstGeom>
+                <a:ln>
+                  <a:solidFill>
+                    <a:schemeClr val="tx1"/>
+                  </a:solidFill>
+                  <a:tailEnd type="stealth"/>
+                </a:ln>
+              </p:spPr>
+              <p:style>
+                <a:lnRef idx="1">
+                  <a:schemeClr val="accent1"/>
+                </a:lnRef>
+                <a:fillRef idx="0">
+                  <a:schemeClr val="accent1"/>
+                </a:fillRef>
+                <a:effectRef idx="0">
+                  <a:schemeClr val="accent1"/>
+                </a:effectRef>
+                <a:fontRef idx="minor">
+                  <a:schemeClr val="tx1"/>
+                </a:fontRef>
+              </p:style>
+            </p:cxnSp>
+            <p:cxnSp>
+              <p:nvCxnSpPr>
+                <p:cNvPr id="34" name="Straight Arrow Connector 33"/>
+                <p:cNvCxnSpPr>
+                  <a:stCxn id="6" idx="3"/>
+                  <a:endCxn id="25" idx="0"/>
+                </p:cNvCxnSpPr>
+                <p:nvPr/>
+              </p:nvCxnSpPr>
+              <p:spPr>
+                <a:xfrm flipH="1">
+                  <a:off x="2458043" y="2181164"/>
+                  <a:ext cx="271889" cy="248084"/>
+                </a:xfrm>
+                <a:prstGeom prst="straightConnector1">
+                  <a:avLst/>
+                </a:prstGeom>
+                <a:ln>
+                  <a:solidFill>
+                    <a:schemeClr val="tx1"/>
+                  </a:solidFill>
+                  <a:prstDash val="lgDash"/>
+                  <a:tailEnd type="stealth"/>
+                </a:ln>
+              </p:spPr>
+              <p:style>
+                <a:lnRef idx="1">
+                  <a:schemeClr val="accent1"/>
+                </a:lnRef>
+                <a:fillRef idx="0">
+                  <a:schemeClr val="accent1"/>
+                </a:fillRef>
+                <a:effectRef idx="0">
+                  <a:schemeClr val="accent1"/>
+                </a:effectRef>
+                <a:fontRef idx="minor">
+                  <a:schemeClr val="tx1"/>
+                </a:fontRef>
+              </p:style>
+            </p:cxnSp>
+            <p:cxnSp>
+              <p:nvCxnSpPr>
+                <p:cNvPr id="35" name="Straight Arrow Connector 34"/>
+                <p:cNvCxnSpPr>
+                  <a:stCxn id="6" idx="5"/>
+                  <a:endCxn id="28" idx="0"/>
+                </p:cNvCxnSpPr>
+                <p:nvPr/>
+              </p:nvCxnSpPr>
+              <p:spPr>
+                <a:xfrm>
+                  <a:off x="3146729" y="2181164"/>
+                  <a:ext cx="183856" cy="279617"/>
+                </a:xfrm>
+                <a:prstGeom prst="straightConnector1">
+                  <a:avLst/>
+                </a:prstGeom>
+                <a:ln>
+                  <a:solidFill>
+                    <a:schemeClr val="tx1"/>
+                  </a:solidFill>
+                  <a:prstDash val="lgDash"/>
+                  <a:tailEnd type="stealth"/>
+                </a:ln>
+              </p:spPr>
+              <p:style>
+                <a:lnRef idx="1">
+                  <a:schemeClr val="accent1"/>
+                </a:lnRef>
+                <a:fillRef idx="0">
+                  <a:schemeClr val="accent1"/>
+                </a:fillRef>
+                <a:effectRef idx="0">
+                  <a:schemeClr val="accent1"/>
+                </a:effectRef>
+                <a:fontRef idx="minor">
+                  <a:schemeClr val="tx1"/>
+                </a:fontRef>
+              </p:style>
+            </p:cxnSp>
+            <p:cxnSp>
+              <p:nvCxnSpPr>
+                <p:cNvPr id="36" name="Straight Arrow Connector 35"/>
+                <p:cNvCxnSpPr/>
+                <p:nvPr/>
+              </p:nvCxnSpPr>
+              <p:spPr>
+                <a:xfrm>
+                  <a:off x="2709985" y="2908359"/>
+                  <a:ext cx="407260" cy="361154"/>
+                </a:xfrm>
+                <a:prstGeom prst="straightConnector1">
+                  <a:avLst/>
+                </a:prstGeom>
+                <a:ln>
+                  <a:solidFill>
+                    <a:schemeClr val="tx1"/>
+                  </a:solidFill>
+                  <a:prstDash val="lgDash"/>
+                  <a:tailEnd type="stealth"/>
+                </a:ln>
+              </p:spPr>
+              <p:style>
+                <a:lnRef idx="1">
+                  <a:schemeClr val="accent1"/>
+                </a:lnRef>
+                <a:fillRef idx="0">
+                  <a:schemeClr val="accent1"/>
+                </a:fillRef>
+                <a:effectRef idx="0">
+                  <a:schemeClr val="accent1"/>
+                </a:effectRef>
+                <a:fontRef idx="minor">
+                  <a:schemeClr val="tx1"/>
+                </a:fontRef>
+              </p:style>
+            </p:cxnSp>
+            <p:cxnSp>
+              <p:nvCxnSpPr>
+                <p:cNvPr id="37" name="Straight Arrow Connector 36"/>
+                <p:cNvCxnSpPr>
+                  <a:stCxn id="28" idx="4"/>
+                  <a:endCxn id="49" idx="0"/>
+                </p:cNvCxnSpPr>
+                <p:nvPr/>
+              </p:nvCxnSpPr>
+              <p:spPr>
+                <a:xfrm>
+                  <a:off x="3330585" y="3022095"/>
+                  <a:ext cx="11613" cy="201500"/>
+                </a:xfrm>
+                <a:prstGeom prst="straightConnector1">
+                  <a:avLst/>
+                </a:prstGeom>
+                <a:ln>
+                  <a:solidFill>
+                    <a:schemeClr val="tx1"/>
+                  </a:solidFill>
+                  <a:prstDash val="sysDash"/>
+                  <a:tailEnd type="stealth"/>
+                </a:ln>
+              </p:spPr>
+              <p:style>
+                <a:lnRef idx="1">
+                  <a:schemeClr val="accent1"/>
+                </a:lnRef>
+                <a:fillRef idx="0">
+                  <a:schemeClr val="accent1"/>
+                </a:fillRef>
+                <a:effectRef idx="0">
+                  <a:schemeClr val="accent1"/>
+                </a:effectRef>
+                <a:fontRef idx="minor">
+                  <a:schemeClr val="tx1"/>
+                </a:fontRef>
+              </p:style>
+            </p:cxnSp>
+            <p:cxnSp>
+              <p:nvCxnSpPr>
+                <p:cNvPr id="38" name="Straight Arrow Connector 37"/>
+                <p:cNvCxnSpPr>
+                  <a:stCxn id="22" idx="4"/>
+                  <a:endCxn id="34" idx="7"/>
+                </p:cNvCxnSpPr>
+                <p:nvPr/>
+              </p:nvCxnSpPr>
+              <p:spPr>
+                <a:xfrm flipH="1">
+                  <a:off x="5336334" y="2263365"/>
+                  <a:ext cx="236121" cy="302570"/>
+                </a:xfrm>
+                <a:prstGeom prst="straightConnector1">
+                  <a:avLst/>
+                </a:prstGeom>
+                <a:ln>
+                  <a:solidFill>
+                    <a:schemeClr val="tx1"/>
+                  </a:solidFill>
+                  <a:tailEnd type="stealth"/>
+                </a:ln>
+              </p:spPr>
+              <p:style>
+                <a:lnRef idx="1">
+                  <a:schemeClr val="accent1"/>
+                </a:lnRef>
+                <a:fillRef idx="0">
+                  <a:schemeClr val="accent1"/>
+                </a:fillRef>
+                <a:effectRef idx="0">
+                  <a:schemeClr val="accent1"/>
+                </a:effectRef>
+                <a:fontRef idx="minor">
+                  <a:schemeClr val="tx1"/>
+                </a:fontRef>
+              </p:style>
+            </p:cxnSp>
+            <p:cxnSp>
+              <p:nvCxnSpPr>
+                <p:cNvPr id="39" name="Straight Arrow Connector 38"/>
+                <p:cNvCxnSpPr>
+                  <a:stCxn id="19" idx="4"/>
+                  <a:endCxn id="34" idx="1"/>
+                </p:cNvCxnSpPr>
+                <p:nvPr/>
+              </p:nvCxnSpPr>
+              <p:spPr>
+                <a:xfrm>
+                  <a:off x="4703628" y="2263366"/>
+                  <a:ext cx="215909" cy="302569"/>
+                </a:xfrm>
+                <a:prstGeom prst="straightConnector1">
+                  <a:avLst/>
+                </a:prstGeom>
+                <a:ln>
+                  <a:solidFill>
+                    <a:schemeClr val="tx1"/>
+                  </a:solidFill>
+                  <a:tailEnd type="stealth"/>
+                </a:ln>
+              </p:spPr>
+              <p:style>
+                <a:lnRef idx="1">
+                  <a:schemeClr val="accent1"/>
+                </a:lnRef>
+                <a:fillRef idx="0">
+                  <a:schemeClr val="accent1"/>
+                </a:fillRef>
+                <a:effectRef idx="0">
+                  <a:schemeClr val="accent1"/>
+                </a:effectRef>
+                <a:fontRef idx="minor">
+                  <a:schemeClr val="tx1"/>
+                </a:fontRef>
+              </p:style>
+            </p:cxnSp>
+            <p:cxnSp>
+              <p:nvCxnSpPr>
+                <p:cNvPr id="40" name="Straight Arrow Connector 39"/>
+                <p:cNvCxnSpPr>
+                  <a:stCxn id="34" idx="4"/>
+                  <a:endCxn id="37" idx="0"/>
+                </p:cNvCxnSpPr>
+                <p:nvPr/>
+              </p:nvCxnSpPr>
+              <p:spPr>
+                <a:xfrm>
+                  <a:off x="5127936" y="3045046"/>
+                  <a:ext cx="0" cy="178550"/>
+                </a:xfrm>
+                <a:prstGeom prst="straightConnector1">
+                  <a:avLst/>
+                </a:prstGeom>
+                <a:ln>
+                  <a:solidFill>
+                    <a:schemeClr val="tx1"/>
+                  </a:solidFill>
+                  <a:tailEnd type="stealth"/>
+                </a:ln>
+              </p:spPr>
+              <p:style>
+                <a:lnRef idx="1">
+                  <a:schemeClr val="accent1"/>
+                </a:lnRef>
+                <a:fillRef idx="0">
+                  <a:schemeClr val="accent1"/>
+                </a:fillRef>
+                <a:effectRef idx="0">
+                  <a:schemeClr val="accent1"/>
+                </a:effectRef>
+                <a:fontRef idx="minor">
+                  <a:schemeClr val="tx1"/>
+                </a:fontRef>
+              </p:style>
+            </p:cxnSp>
+            <p:cxnSp>
+              <p:nvCxnSpPr>
+                <p:cNvPr id="41" name="Straight Arrow Connector 40"/>
+                <p:cNvCxnSpPr>
+                  <a:stCxn id="37" idx="5"/>
+                  <a:endCxn id="40" idx="0"/>
+                </p:cNvCxnSpPr>
+                <p:nvPr/>
+              </p:nvCxnSpPr>
+              <p:spPr>
+                <a:xfrm>
+                  <a:off x="5336334" y="3702707"/>
+                  <a:ext cx="216439" cy="156723"/>
+                </a:xfrm>
+                <a:prstGeom prst="straightConnector1">
+                  <a:avLst/>
+                </a:prstGeom>
+                <a:ln>
+                  <a:solidFill>
+                    <a:schemeClr val="tx1"/>
+                  </a:solidFill>
+                  <a:tailEnd type="stealth"/>
+                </a:ln>
+              </p:spPr>
+              <p:style>
+                <a:lnRef idx="1">
+                  <a:schemeClr val="accent1"/>
+                </a:lnRef>
+                <a:fillRef idx="0">
+                  <a:schemeClr val="accent1"/>
+                </a:fillRef>
+                <a:effectRef idx="0">
+                  <a:schemeClr val="accent1"/>
+                </a:effectRef>
+                <a:fontRef idx="minor">
+                  <a:schemeClr val="tx1"/>
+                </a:fontRef>
+              </p:style>
+            </p:cxnSp>
+            <p:cxnSp>
+              <p:nvCxnSpPr>
+                <p:cNvPr id="42" name="Straight Arrow Connector 41"/>
+                <p:cNvCxnSpPr>
+                  <a:stCxn id="37" idx="3"/>
+                  <a:endCxn id="46" idx="7"/>
+                </p:cNvCxnSpPr>
+                <p:nvPr/>
+              </p:nvCxnSpPr>
+              <p:spPr>
+                <a:xfrm flipH="1">
+                  <a:off x="4463791" y="3702707"/>
+                  <a:ext cx="455746" cy="237726"/>
+                </a:xfrm>
+                <a:prstGeom prst="straightConnector1">
+                  <a:avLst/>
+                </a:prstGeom>
+                <a:ln>
+                  <a:solidFill>
+                    <a:schemeClr val="tx1"/>
+                  </a:solidFill>
+                  <a:tailEnd type="stealth"/>
+                </a:ln>
+              </p:spPr>
+              <p:style>
+                <a:lnRef idx="1">
+                  <a:schemeClr val="accent1"/>
+                </a:lnRef>
+                <a:fillRef idx="0">
+                  <a:schemeClr val="accent1"/>
+                </a:fillRef>
+                <a:effectRef idx="0">
+                  <a:schemeClr val="accent1"/>
+                </a:effectRef>
+                <a:fontRef idx="minor">
+                  <a:schemeClr val="tx1"/>
+                </a:fontRef>
+              </p:style>
+            </p:cxnSp>
+            <p:cxnSp>
+              <p:nvCxnSpPr>
+                <p:cNvPr id="43" name="Straight Arrow Connector 42"/>
+                <p:cNvCxnSpPr>
+                  <a:stCxn id="40" idx="4"/>
+                  <a:endCxn id="55" idx="7"/>
+                </p:cNvCxnSpPr>
+                <p:nvPr/>
+              </p:nvCxnSpPr>
+              <p:spPr>
+                <a:xfrm flipH="1">
+                  <a:off x="5507171" y="4420744"/>
+                  <a:ext cx="45602" cy="152596"/>
+                </a:xfrm>
+                <a:prstGeom prst="straightConnector1">
+                  <a:avLst/>
+                </a:prstGeom>
+                <a:ln>
+                  <a:solidFill>
+                    <a:schemeClr val="tx1"/>
+                  </a:solidFill>
+                  <a:tailEnd type="stealth"/>
+                </a:ln>
+              </p:spPr>
+              <p:style>
+                <a:lnRef idx="1">
+                  <a:schemeClr val="accent1"/>
+                </a:lnRef>
+                <a:fillRef idx="0">
+                  <a:schemeClr val="accent1"/>
+                </a:fillRef>
+                <a:effectRef idx="0">
+                  <a:schemeClr val="accent1"/>
+                </a:effectRef>
+                <a:fontRef idx="minor">
+                  <a:schemeClr val="tx1"/>
+                </a:fontRef>
+              </p:style>
+            </p:cxnSp>
+            <p:cxnSp>
+              <p:nvCxnSpPr>
+                <p:cNvPr id="44" name="Straight Arrow Connector 43"/>
+                <p:cNvCxnSpPr>
+                  <a:stCxn id="46" idx="4"/>
+                  <a:endCxn id="52" idx="1"/>
+                </p:cNvCxnSpPr>
+                <p:nvPr/>
+              </p:nvCxnSpPr>
+              <p:spPr>
+                <a:xfrm>
+                  <a:off x="4255393" y="4419544"/>
+                  <a:ext cx="39261" cy="153796"/>
+                </a:xfrm>
+                <a:prstGeom prst="straightConnector1">
+                  <a:avLst/>
+                </a:prstGeom>
+                <a:ln>
+                  <a:solidFill>
+                    <a:schemeClr val="tx1"/>
+                  </a:solidFill>
+                  <a:tailEnd type="stealth"/>
+                </a:ln>
+              </p:spPr>
+              <p:style>
+                <a:lnRef idx="1">
+                  <a:schemeClr val="accent1"/>
+                </a:lnRef>
+                <a:fillRef idx="0">
+                  <a:schemeClr val="accent1"/>
+                </a:fillRef>
+                <a:effectRef idx="0">
+                  <a:schemeClr val="accent1"/>
+                </a:effectRef>
+                <a:fontRef idx="minor">
+                  <a:schemeClr val="tx1"/>
+                </a:fontRef>
+              </p:style>
+            </p:cxnSp>
+            <p:cxnSp>
+              <p:nvCxnSpPr>
+                <p:cNvPr id="45" name="Straight Arrow Connector 44"/>
+                <p:cNvCxnSpPr>
+                  <a:stCxn id="37" idx="2"/>
+                  <a:endCxn id="43" idx="6"/>
+                </p:cNvCxnSpPr>
+                <p:nvPr/>
+              </p:nvCxnSpPr>
+              <p:spPr>
+                <a:xfrm flipH="1" flipV="1">
+                  <a:off x="4550113" y="3504252"/>
+                  <a:ext cx="283102" cy="1"/>
+                </a:xfrm>
+                <a:prstGeom prst="straightConnector1">
+                  <a:avLst/>
+                </a:prstGeom>
+                <a:ln>
+                  <a:solidFill>
+                    <a:schemeClr val="tx1"/>
+                  </a:solidFill>
+                  <a:prstDash val="lgDash"/>
+                  <a:tailEnd type="stealth"/>
+                </a:ln>
+              </p:spPr>
+              <p:style>
+                <a:lnRef idx="1">
+                  <a:schemeClr val="accent1"/>
+                </a:lnRef>
+                <a:fillRef idx="0">
+                  <a:schemeClr val="accent1"/>
+                </a:fillRef>
+                <a:effectRef idx="0">
+                  <a:schemeClr val="accent1"/>
+                </a:effectRef>
+                <a:fontRef idx="minor">
+                  <a:schemeClr val="tx1"/>
+                </a:fontRef>
+              </p:style>
+            </p:cxnSp>
+            <p:cxnSp>
+              <p:nvCxnSpPr>
+                <p:cNvPr id="46" name="Straight Arrow Connector 45"/>
+                <p:cNvCxnSpPr>
+                  <a:stCxn id="37" idx="1"/>
+                  <a:endCxn id="31" idx="5"/>
+                </p:cNvCxnSpPr>
+                <p:nvPr/>
+              </p:nvCxnSpPr>
+              <p:spPr>
+                <a:xfrm flipH="1" flipV="1">
+                  <a:off x="4452178" y="2939892"/>
+                  <a:ext cx="467359" cy="365907"/>
+                </a:xfrm>
+                <a:prstGeom prst="straightConnector1">
+                  <a:avLst/>
+                </a:prstGeom>
+                <a:ln>
+                  <a:solidFill>
+                    <a:schemeClr val="tx1"/>
+                  </a:solidFill>
+                  <a:prstDash val="lgDash"/>
+                  <a:tailEnd type="stealth"/>
+                </a:ln>
+              </p:spPr>
+              <p:style>
+                <a:lnRef idx="1">
+                  <a:schemeClr val="accent1"/>
+                </a:lnRef>
+                <a:fillRef idx="0">
+                  <a:schemeClr val="accent1"/>
+                </a:fillRef>
+                <a:effectRef idx="0">
+                  <a:schemeClr val="accent1"/>
+                </a:effectRef>
+                <a:fontRef idx="minor">
+                  <a:schemeClr val="tx1"/>
+                </a:fontRef>
+              </p:style>
+            </p:cxnSp>
+            <p:cxnSp>
+              <p:nvCxnSpPr>
+                <p:cNvPr id="47" name="Straight Arrow Connector 46"/>
+                <p:cNvCxnSpPr/>
+                <p:nvPr/>
+              </p:nvCxnSpPr>
+              <p:spPr>
+                <a:xfrm>
+                  <a:off x="3648531" y="3449822"/>
+                  <a:ext cx="312141" cy="0"/>
+                </a:xfrm>
+                <a:prstGeom prst="straightConnector1">
+                  <a:avLst/>
+                </a:prstGeom>
+                <a:ln>
+                  <a:solidFill>
+                    <a:schemeClr val="tx1"/>
+                  </a:solidFill>
+                  <a:prstDash val="lgDash"/>
+                  <a:tailEnd type="stealth"/>
+                </a:ln>
+              </p:spPr>
+              <p:style>
+                <a:lnRef idx="1">
+                  <a:schemeClr val="accent1"/>
+                </a:lnRef>
+                <a:fillRef idx="0">
+                  <a:schemeClr val="accent1"/>
+                </a:fillRef>
+                <a:effectRef idx="0">
+                  <a:schemeClr val="accent1"/>
+                </a:effectRef>
+                <a:fontRef idx="minor">
+                  <a:schemeClr val="tx1"/>
+                </a:fontRef>
+              </p:style>
+            </p:cxnSp>
+            <p:cxnSp>
+              <p:nvCxnSpPr>
+                <p:cNvPr id="48" name="Straight Arrow Connector 47"/>
+                <p:cNvCxnSpPr/>
+                <p:nvPr/>
+              </p:nvCxnSpPr>
+              <p:spPr>
+                <a:xfrm>
+                  <a:off x="3583254" y="3724478"/>
+                  <a:ext cx="374799" cy="284942"/>
+                </a:xfrm>
+                <a:prstGeom prst="straightConnector1">
+                  <a:avLst/>
+                </a:prstGeom>
+                <a:ln>
+                  <a:solidFill>
+                    <a:schemeClr val="tx1"/>
+                  </a:solidFill>
+                  <a:tailEnd type="stealth"/>
+                </a:ln>
+              </p:spPr>
+              <p:style>
+                <a:lnRef idx="1">
+                  <a:schemeClr val="accent1"/>
+                </a:lnRef>
+                <a:fillRef idx="0">
+                  <a:schemeClr val="accent1"/>
+                </a:fillRef>
+                <a:effectRef idx="0">
+                  <a:schemeClr val="accent1"/>
+                </a:effectRef>
+                <a:fontRef idx="minor">
+                  <a:schemeClr val="tx1"/>
+                </a:fontRef>
+              </p:style>
+            </p:cxnSp>
+            <p:cxnSp>
+              <p:nvCxnSpPr>
+                <p:cNvPr id="49" name="Straight Arrow Connector 48"/>
+                <p:cNvCxnSpPr/>
+                <p:nvPr/>
+              </p:nvCxnSpPr>
+              <p:spPr>
+                <a:xfrm flipV="1">
+                  <a:off x="3612281" y="3005207"/>
+                  <a:ext cx="484785" cy="365906"/>
+                </a:xfrm>
+                <a:prstGeom prst="straightConnector1">
+                  <a:avLst/>
+                </a:prstGeom>
+                <a:ln>
+                  <a:solidFill>
+                    <a:schemeClr val="tx1"/>
+                  </a:solidFill>
+                  <a:prstDash val="lgDash"/>
+                  <a:tailEnd type="stealth"/>
+                </a:ln>
+              </p:spPr>
+              <p:style>
+                <a:lnRef idx="1">
+                  <a:schemeClr val="accent1"/>
+                </a:lnRef>
+                <a:fillRef idx="0">
+                  <a:schemeClr val="accent1"/>
+                </a:fillRef>
+                <a:effectRef idx="0">
+                  <a:schemeClr val="accent1"/>
+                </a:effectRef>
+                <a:fontRef idx="minor">
+                  <a:schemeClr val="tx1"/>
+                </a:fontRef>
+              </p:style>
+            </p:cxnSp>
+            <p:cxnSp>
+              <p:nvCxnSpPr>
+                <p:cNvPr id="50" name="Straight Arrow Connector 49"/>
+                <p:cNvCxnSpPr/>
+                <p:nvPr/>
+              </p:nvCxnSpPr>
+              <p:spPr>
+                <a:xfrm flipH="1">
+                  <a:off x="3510681" y="2903607"/>
+                  <a:ext cx="484785" cy="365906"/>
+                </a:xfrm>
+                <a:prstGeom prst="straightConnector1">
+                  <a:avLst/>
+                </a:prstGeom>
+                <a:ln>
+                  <a:solidFill>
+                    <a:schemeClr val="tx1"/>
+                  </a:solidFill>
+                  <a:tailEnd type="stealth"/>
+                </a:ln>
+              </p:spPr>
+              <p:style>
+                <a:lnRef idx="1">
+                  <a:schemeClr val="accent1"/>
+                </a:lnRef>
+                <a:fillRef idx="0">
+                  <a:schemeClr val="accent1"/>
+                </a:fillRef>
+                <a:effectRef idx="0">
+                  <a:schemeClr val="accent1"/>
+                </a:effectRef>
+                <a:fontRef idx="minor">
+                  <a:schemeClr val="tx1"/>
+                </a:fontRef>
+              </p:style>
+            </p:cxnSp>
+            <p:cxnSp>
+              <p:nvCxnSpPr>
+                <p:cNvPr id="51" name="Straight Arrow Connector 50"/>
+                <p:cNvCxnSpPr/>
+                <p:nvPr/>
+              </p:nvCxnSpPr>
+              <p:spPr>
+                <a:xfrm flipH="1">
+                  <a:off x="3637645" y="3558681"/>
+                  <a:ext cx="312141" cy="0"/>
+                </a:xfrm>
+                <a:prstGeom prst="straightConnector1">
+                  <a:avLst/>
+                </a:prstGeom>
+                <a:ln>
+                  <a:solidFill>
+                    <a:schemeClr val="tx1"/>
+                  </a:solidFill>
+                  <a:prstDash val="lgDash"/>
+                  <a:tailEnd type="stealth"/>
+                </a:ln>
+              </p:spPr>
+              <p:style>
+                <a:lnRef idx="1">
+                  <a:schemeClr val="accent1"/>
+                </a:lnRef>
+                <a:fillRef idx="0">
+                  <a:schemeClr val="accent1"/>
+                </a:fillRef>
+                <a:effectRef idx="0">
+                  <a:schemeClr val="accent1"/>
+                </a:effectRef>
+                <a:fontRef idx="minor">
+                  <a:schemeClr val="tx1"/>
+                </a:fontRef>
+              </p:style>
+            </p:cxnSp>
+            <p:cxnSp>
+              <p:nvCxnSpPr>
+                <p:cNvPr id="52" name="Straight Arrow Connector 51"/>
+                <p:cNvCxnSpPr/>
+                <p:nvPr/>
+              </p:nvCxnSpPr>
+              <p:spPr>
+                <a:xfrm flipH="1" flipV="1">
+                  <a:off x="3475119" y="3801319"/>
+                  <a:ext cx="444870" cy="338884"/>
+                </a:xfrm>
+                <a:prstGeom prst="straightConnector1">
+                  <a:avLst/>
+                </a:prstGeom>
+                <a:ln>
+                  <a:solidFill>
+                    <a:schemeClr val="tx1"/>
+                  </a:solidFill>
+                  <a:prstDash val="lgDash"/>
+                  <a:tailEnd type="stealth"/>
+                </a:ln>
+              </p:spPr>
+              <p:style>
+                <a:lnRef idx="1">
+                  <a:schemeClr val="accent1"/>
+                </a:lnRef>
+                <a:fillRef idx="0">
+                  <a:schemeClr val="accent1"/>
+                </a:fillRef>
+                <a:effectRef idx="0">
+                  <a:schemeClr val="accent1"/>
+                </a:effectRef>
+                <a:fontRef idx="minor">
+                  <a:schemeClr val="tx1"/>
+                </a:fontRef>
+              </p:style>
+            </p:cxnSp>
+            <p:cxnSp>
+              <p:nvCxnSpPr>
+                <p:cNvPr id="53" name="Straight Arrow Connector 52"/>
+                <p:cNvCxnSpPr/>
+                <p:nvPr/>
+              </p:nvCxnSpPr>
+              <p:spPr>
+                <a:xfrm flipH="1" flipV="1">
+                  <a:off x="2621601" y="2979730"/>
+                  <a:ext cx="407260" cy="361154"/>
+                </a:xfrm>
+                <a:prstGeom prst="straightConnector1">
+                  <a:avLst/>
+                </a:prstGeom>
+                <a:ln>
+                  <a:solidFill>
+                    <a:schemeClr val="tx1"/>
+                  </a:solidFill>
+                  <a:prstDash val="lgDash"/>
+                  <a:tailEnd type="stealth"/>
+                </a:ln>
+              </p:spPr>
+              <p:style>
+                <a:lnRef idx="1">
+                  <a:schemeClr val="accent1"/>
+                </a:lnRef>
+                <a:fillRef idx="0">
+                  <a:schemeClr val="accent1"/>
+                </a:fillRef>
+                <a:effectRef idx="0">
+                  <a:schemeClr val="accent1"/>
+                </a:effectRef>
+                <a:fontRef idx="minor">
+                  <a:schemeClr val="tx1"/>
+                </a:fontRef>
+              </p:style>
+            </p:cxnSp>
+            <p:cxnSp>
+              <p:nvCxnSpPr>
+                <p:cNvPr id="54" name="Straight Arrow Connector 53"/>
+                <p:cNvCxnSpPr>
+                  <a:stCxn id="16" idx="4"/>
+                  <a:endCxn id="31" idx="1"/>
+                </p:cNvCxnSpPr>
+                <p:nvPr/>
+              </p:nvCxnSpPr>
+              <p:spPr>
+                <a:xfrm>
+                  <a:off x="3834801" y="2263367"/>
+                  <a:ext cx="200580" cy="279617"/>
+                </a:xfrm>
+                <a:prstGeom prst="straightConnector1">
+                  <a:avLst/>
+                </a:prstGeom>
+                <a:ln>
+                  <a:solidFill>
+                    <a:schemeClr val="tx1"/>
+                  </a:solidFill>
+                  <a:tailEnd type="stealth"/>
+                </a:ln>
+              </p:spPr>
+              <p:style>
+                <a:lnRef idx="1">
+                  <a:schemeClr val="accent1"/>
+                </a:lnRef>
+                <a:fillRef idx="0">
+                  <a:schemeClr val="accent1"/>
+                </a:fillRef>
+                <a:effectRef idx="0">
+                  <a:schemeClr val="accent1"/>
+                </a:effectRef>
+                <a:fontRef idx="minor">
+                  <a:schemeClr val="tx1"/>
+                </a:fontRef>
+              </p:style>
+            </p:cxnSp>
+          </p:grpSp>
+          <p:sp>
+            <p:nvSpPr>
+              <p:cNvPr id="8" name="TextBox 7"/>
+              <p:cNvSpPr txBox="1"/>
+              <p:nvPr/>
+            </p:nvSpPr>
+            <p:spPr>
+              <a:xfrm>
+                <a:off x="3661110" y="4994953"/>
+                <a:ext cx="934102" cy="338554"/>
+              </a:xfrm>
+              <a:prstGeom prst="rect">
+                <a:avLst/>
+              </a:prstGeom>
+              <a:noFill/>
+            </p:spPr>
+            <p:txBody>
+              <a:bodyPr wrap="none" rtlCol="0">
+                <a:spAutoFit/>
+              </a:bodyPr>
+              <a:lstStyle/>
+              <a:p>
+                <a:pPr algn="ctr"/>
+                <a:r>
+                  <a:rPr lang="en-US" sz="1600" dirty="0" err="1" smtClean="0"/>
+                  <a:t>Prefs</a:t>
+                </a:r>
+                <a:r>
+                  <a:rPr lang="en-US" sz="1600" dirty="0" smtClean="0"/>
+                  <a:t>: {2}</a:t>
+                </a:r>
+                <a:endParaRPr lang="en-US" sz="1600" dirty="0"/>
+              </a:p>
+            </p:txBody>
+          </p:sp>
+          <p:grpSp>
+            <p:nvGrpSpPr>
+              <p:cNvPr id="9" name="Group 8"/>
+              <p:cNvGrpSpPr/>
+              <p:nvPr/>
+            </p:nvGrpSpPr>
+            <p:grpSpPr>
+              <a:xfrm>
+                <a:off x="4591034" y="5157969"/>
+                <a:ext cx="589441" cy="561314"/>
+                <a:chOff x="4591034" y="5157969"/>
+                <a:chExt cx="589441" cy="561314"/>
+              </a:xfrm>
+            </p:grpSpPr>
+            <p:sp>
+              <p:nvSpPr>
+                <p:cNvPr id="12" name="Oval 11"/>
+                <p:cNvSpPr/>
+                <p:nvPr/>
+              </p:nvSpPr>
+              <p:spPr>
+                <a:xfrm>
+                  <a:off x="4591034" y="5157969"/>
+                  <a:ext cx="589441" cy="561314"/>
+                </a:xfrm>
+                <a:prstGeom prst="ellipse">
+                  <a:avLst/>
+                </a:prstGeom>
+                <a:solidFill>
+                  <a:schemeClr val="bg1"/>
+                </a:solidFill>
+                <a:ln w="9525">
+                  <a:solidFill>
+                    <a:schemeClr val="tx1"/>
+                  </a:solidFill>
+                </a:ln>
+              </p:spPr>
+              <p:style>
+                <a:lnRef idx="2">
+                  <a:schemeClr val="accent1">
+                    <a:shade val="50000"/>
+                  </a:schemeClr>
+                </a:lnRef>
+                <a:fillRef idx="1">
+                  <a:schemeClr val="accent1"/>
+                </a:fillRef>
+                <a:effectRef idx="0">
+                  <a:schemeClr val="accent1"/>
+                </a:effectRef>
+                <a:fontRef idx="minor">
+                  <a:schemeClr val="lt1"/>
+                </a:fontRef>
+              </p:style>
+              <p:txBody>
+                <a:bodyPr rtlCol="0" anchor="ctr"/>
+                <a:lstStyle/>
+                <a:p>
+                  <a:pPr algn="ctr"/>
+                  <a:endParaRPr lang="en-US" sz="2000"/>
+                </a:p>
+              </p:txBody>
+            </p:sp>
+            <p:sp>
+              <p:nvSpPr>
+                <p:cNvPr id="13" name="TextBox 12"/>
+                <p:cNvSpPr txBox="1"/>
+                <p:nvPr/>
+              </p:nvSpPr>
+              <p:spPr>
+                <a:xfrm>
+                  <a:off x="4664545" y="5300126"/>
+                  <a:ext cx="455573" cy="307777"/>
+                </a:xfrm>
+                <a:prstGeom prst="rect">
+                  <a:avLst/>
+                </a:prstGeom>
+                <a:noFill/>
+              </p:spPr>
+              <p:txBody>
+                <a:bodyPr wrap="none" rtlCol="0">
+                  <a:spAutoFit/>
+                </a:bodyPr>
+                <a:lstStyle/>
+                <a:p>
+                  <a:pPr algn="ctr"/>
+                  <a:r>
+                    <a:rPr lang="en-US" sz="1400" i="1" dirty="0" smtClean="0"/>
+                    <a:t>end</a:t>
+                  </a:r>
+                  <a:endParaRPr lang="en-US" sz="1400" i="1" dirty="0"/>
+                </a:p>
+              </p:txBody>
+            </p:sp>
+          </p:grpSp>
+          <p:cxnSp>
+            <p:nvCxnSpPr>
+              <p:cNvPr id="10" name="Straight Arrow Connector 9"/>
+              <p:cNvCxnSpPr>
+                <a:endCxn id="83" idx="7"/>
+              </p:cNvCxnSpPr>
+              <p:nvPr/>
+            </p:nvCxnSpPr>
+            <p:spPr>
+              <a:xfrm flipH="1">
+                <a:off x="5094153" y="5040535"/>
+                <a:ext cx="82628" cy="199637"/>
+              </a:xfrm>
+              <a:prstGeom prst="straightConnector1">
+                <a:avLst/>
+              </a:prstGeom>
+              <a:ln>
+                <a:solidFill>
+                  <a:schemeClr val="tx1"/>
+                </a:solidFill>
+                <a:tailEnd type="stealth"/>
+              </a:ln>
+            </p:spPr>
+            <p:style>
+              <a:lnRef idx="1">
+                <a:schemeClr val="accent1"/>
+              </a:lnRef>
+              <a:fillRef idx="0">
+                <a:schemeClr val="accent1"/>
+              </a:fillRef>
+              <a:effectRef idx="0">
+                <a:schemeClr val="accent1"/>
+              </a:effectRef>
+              <a:fontRef idx="minor">
+                <a:schemeClr val="tx1"/>
+              </a:fontRef>
+            </p:style>
+          </p:cxnSp>
+          <p:cxnSp>
+            <p:nvCxnSpPr>
+              <p:cNvPr id="11" name="Straight Arrow Connector 10"/>
+              <p:cNvCxnSpPr/>
+              <p:nvPr/>
+            </p:nvCxnSpPr>
+            <p:spPr>
+              <a:xfrm>
+                <a:off x="4596323" y="5036201"/>
+                <a:ext cx="81033" cy="192469"/>
+              </a:xfrm>
+              <a:prstGeom prst="straightConnector1">
+                <a:avLst/>
+              </a:prstGeom>
+              <a:ln>
+                <a:solidFill>
+                  <a:schemeClr val="tx1"/>
+                </a:solidFill>
+                <a:tailEnd type="stealth"/>
+              </a:ln>
+            </p:spPr>
+            <p:style>
+              <a:lnRef idx="1">
+                <a:schemeClr val="accent1"/>
+              </a:lnRef>
+              <a:fillRef idx="0">
+                <a:schemeClr val="accent1"/>
+              </a:fillRef>
+              <a:effectRef idx="0">
+                <a:schemeClr val="accent1"/>
+              </a:effectRef>
+              <a:fontRef idx="minor">
+                <a:schemeClr val="tx1"/>
+              </a:fontRef>
+            </p:style>
+          </p:cxnSp>
+        </p:grpSp>
+        <p:sp>
+          <p:nvSpPr>
+            <p:cNvPr id="6" name="TextBox 5"/>
+            <p:cNvSpPr txBox="1"/>
+            <p:nvPr/>
+          </p:nvSpPr>
+          <p:spPr>
+            <a:xfrm>
+              <a:off x="5183469" y="4989754"/>
+              <a:ext cx="934102" cy="338554"/>
+            </a:xfrm>
+            <a:prstGeom prst="rect">
+              <a:avLst/>
+            </a:prstGeom>
+            <a:noFill/>
+          </p:spPr>
+          <p:txBody>
+            <a:bodyPr wrap="none" rtlCol="0">
+              <a:spAutoFit/>
+            </a:bodyPr>
+            <a:lstStyle/>
+            <a:p>
+              <a:pPr algn="ctr"/>
+              <a:r>
+                <a:rPr lang="en-US" sz="1600" dirty="0" err="1" smtClean="0"/>
+                <a:t>Prefs</a:t>
+              </a:r>
+              <a:r>
+                <a:rPr lang="en-US" sz="1600" dirty="0" smtClean="0"/>
+                <a:t>: {1}</a:t>
+              </a:r>
+              <a:endParaRPr lang="en-US" sz="1600" dirty="0"/>
+            </a:p>
+          </p:txBody>
+        </p:sp>
+      </p:grpSp>
+    </p:spTree>
+    <p:extLst>
+      <p:ext uri="{BB962C8B-B14F-4D97-AF65-F5344CB8AC3E}">
+        <p14:creationId xmlns:p14="http://schemas.microsoft.com/office/powerpoint/2010/main" val="885361643"/>
+      </p:ext>
+    </p:extLst>
+  </p:cSld>
+  <p:clrMapOvr>
+    <a:masterClrMapping/>
+  </p:clrMapOvr>
+</p:sld>
+</file>
+
+<file path=ppt/slides/slide5.xml><?xml version="1.0" encoding="utf-8"?>
+<p:sld xmlns:a="http://schemas.openxmlformats.org/drawingml/2006/main" xmlns:r="http://schemas.openxmlformats.org/officeDocument/2006/relationships" xmlns:p="http://schemas.openxmlformats.org/presentationml/2006/main">
+  <p:cSld>
+    <p:spTree>
+      <p:nvGrpSpPr>
+        <p:cNvPr id="1" name=""/>
+        <p:cNvGrpSpPr/>
+        <p:nvPr/>
+      </p:nvGrpSpPr>
+      <p:grpSpPr>
+        <a:xfrm>
+          <a:off x="0" y="0"/>
+          <a:ext cx="0" cy="0"/>
+          <a:chOff x="0" y="0"/>
+          <a:chExt cx="0" cy="0"/>
+        </a:xfrm>
+      </p:grpSpPr>
       <p:pic>
         <p:nvPicPr>
           <p:cNvPr id="3" name="Picture 2"/>
@@ -8792,7 +11760,7 @@
 </p:sld>
 </file>
 
-<file path=ppt/slides/slide5.xml><?xml version="1.0" encoding="utf-8"?>
+<file path=ppt/slides/slide6.xml><?xml version="1.0" encoding="utf-8"?>
 <p:sld xmlns:a="http://schemas.openxmlformats.org/drawingml/2006/main" xmlns:r="http://schemas.openxmlformats.org/officeDocument/2006/relationships" xmlns:p="http://schemas.openxmlformats.org/presentationml/2006/main">
   <p:cSld>
     <p:spTree>
@@ -9011,7 +11979,7 @@
                           <m:dPr>
                             <m:ctrlPr>
                               <a:rPr lang="en-US" sz="1600" b="0" i="1" smtClean="0">
-                                <a:latin typeface="Cambria Math" panose="02040503050406030204" pitchFamily="18" charset="0"/>
+                                <a:latin typeface="Cambria Math" charset="0"/>
                               </a:rPr>
                             </m:ctrlPr>
                           </m:dPr>
@@ -9139,7 +12107,7 @@
                           <m:dPr>
                             <m:ctrlPr>
                               <a:rPr lang="en-US" sz="1600" b="0" i="1" smtClean="0">
-                                <a:latin typeface="Cambria Math" panose="02040503050406030204" pitchFamily="18" charset="0"/>
+                                <a:latin typeface="Cambria Math" charset="0"/>
                               </a:rPr>
                             </m:ctrlPr>
                           </m:dPr>
@@ -9429,7 +12397,7 @@
                           <m:dPr>
                             <m:ctrlPr>
                               <a:rPr lang="en-US" sz="1600" b="0" i="1" smtClean="0">
-                                <a:latin typeface="Cambria Math" panose="02040503050406030204" pitchFamily="18" charset="0"/>
+                                <a:latin typeface="Cambria Math" charset="0"/>
                               </a:rPr>
                             </m:ctrlPr>
                           </m:dPr>
@@ -9557,7 +12525,7 @@
                           <m:dPr>
                             <m:ctrlPr>
                               <a:rPr lang="en-US" sz="1600" b="0" i="1" smtClean="0">
-                                <a:latin typeface="Cambria Math" panose="02040503050406030204" pitchFamily="18" charset="0"/>
+                                <a:latin typeface="Cambria Math" charset="0"/>
                               </a:rPr>
                             </m:ctrlPr>
                           </m:dPr>
@@ -9745,7 +12713,7 @@
                           <m:dPr>
                             <m:ctrlPr>
                               <a:rPr lang="en-US" sz="1600" i="1" smtClean="0">
-                                <a:latin typeface="Cambria Math" panose="02040503050406030204" pitchFamily="18" charset="0"/>
+                                <a:latin typeface="Cambria Math" charset="0"/>
                               </a:rPr>
                             </m:ctrlPr>
                           </m:dPr>
@@ -9873,7 +12841,7 @@
                           <m:dPr>
                             <m:ctrlPr>
                               <a:rPr lang="en-US" sz="1600" b="0" i="1" smtClean="0">
-                                <a:latin typeface="Cambria Math" panose="02040503050406030204" pitchFamily="18" charset="0"/>
+                                <a:latin typeface="Cambria Math" charset="0"/>
                               </a:rPr>
                             </m:ctrlPr>
                           </m:dPr>
@@ -10163,7 +13131,7 @@
                           <m:dPr>
                             <m:ctrlPr>
                               <a:rPr lang="en-US" sz="1600" b="0" i="1" smtClean="0">
-                                <a:latin typeface="Cambria Math" panose="02040503050406030204" pitchFamily="18" charset="0"/>
+                                <a:latin typeface="Cambria Math" charset="0"/>
                               </a:rPr>
                             </m:ctrlPr>
                           </m:dPr>
@@ -10303,7 +13271,7 @@
                           <m:dPr>
                             <m:ctrlPr>
                               <a:rPr lang="en-US" sz="1600" b="0" i="1" smtClean="0">
-                                <a:latin typeface="Cambria Math" panose="02040503050406030204" pitchFamily="18" charset="0"/>
+                                <a:latin typeface="Cambria Math" charset="0"/>
                               </a:rPr>
                             </m:ctrlPr>
                           </m:dPr>
@@ -10479,7 +13447,7 @@
                           <m:dPr>
                             <m:ctrlPr>
                               <a:rPr lang="en-US" sz="1600" b="0" i="1" smtClean="0">
-                                <a:latin typeface="Cambria Math" panose="02040503050406030204" pitchFamily="18" charset="0"/>
+                                <a:latin typeface="Cambria Math" charset="0"/>
                               </a:rPr>
                             </m:ctrlPr>
                           </m:dPr>
@@ -10607,7 +13575,7 @@
                           <m:dPr>
                             <m:ctrlPr>
                               <a:rPr lang="en-US" sz="1600" b="0" i="1" smtClean="0">
-                                <a:latin typeface="Cambria Math" panose="02040503050406030204" pitchFamily="18" charset="0"/>
+                                <a:latin typeface="Cambria Math" charset="0"/>
                               </a:rPr>
                             </m:ctrlPr>
                           </m:dPr>
@@ -11002,7 +13970,7 @@
                           <m:dPr>
                             <m:ctrlPr>
                               <a:rPr lang="en-US" sz="1600" b="0" i="1" smtClean="0">
-                                <a:latin typeface="Cambria Math" panose="02040503050406030204" pitchFamily="18" charset="0"/>
+                                <a:latin typeface="Cambria Math" charset="0"/>
                               </a:rPr>
                             </m:ctrlPr>
                           </m:dPr>
@@ -11373,7 +14341,7 @@
                           <m:dPr>
                             <m:ctrlPr>
                               <a:rPr lang="en-US" sz="1600" b="0" i="1" smtClean="0">
-                                <a:latin typeface="Cambria Math" panose="02040503050406030204" pitchFamily="18" charset="0"/>
+                                <a:latin typeface="Cambria Math" charset="0"/>
                               </a:rPr>
                             </m:ctrlPr>
                           </m:dPr>
@@ -11477,7 +14445,7 @@
 </p:sld>
 </file>
 
-<file path=ppt/slides/slide6.xml><?xml version="1.0" encoding="utf-8"?>
+<file path=ppt/slides/slide7.xml><?xml version="1.0" encoding="utf-8"?>
 <p:sld xmlns:a="http://schemas.openxmlformats.org/drawingml/2006/main" xmlns:r="http://schemas.openxmlformats.org/officeDocument/2006/relationships" xmlns:p="http://schemas.openxmlformats.org/presentationml/2006/main">
   <p:cSld>
     <p:spTree>

</xml_diff>

<commit_message>
unify syntax across paper
</commit_message>
<xml_diff>
--- a/paper/figures/compilation.pptx
+++ b/paper/figures/compilation.pptx
@@ -8841,2851 +8841,30 @@
           <a:chExt cx="0" cy="0"/>
         </a:xfrm>
       </p:grpSpPr>
-      <p:grpSp>
-        <p:nvGrpSpPr>
-          <p:cNvPr id="4" name="Group 3"/>
-          <p:cNvGrpSpPr/>
+      <p:pic>
+        <p:nvPicPr>
+          <p:cNvPr id="87" name="Picture 86"/>
+          <p:cNvPicPr>
+            <a:picLocks noChangeAspect="1"/>
+          </p:cNvPicPr>
           <p:nvPr/>
-        </p:nvGrpSpPr>
-        <p:grpSpPr>
+        </p:nvPicPr>
+        <p:blipFill>
+          <a:blip r:embed="rId2"/>
+          <a:stretch>
+            <a:fillRect/>
+          </a:stretch>
+        </p:blipFill>
+        <p:spPr>
           <a:xfrm>
-            <a:off x="2125355" y="1140737"/>
-            <a:ext cx="3992216" cy="4578546"/>
-            <a:chOff x="2125355" y="1140737"/>
-            <a:chExt cx="3992216" cy="4578546"/>
+            <a:off x="4089400" y="1136650"/>
+            <a:ext cx="4013200" cy="4584700"/>
           </a:xfrm>
-        </p:grpSpPr>
-        <p:grpSp>
-          <p:nvGrpSpPr>
-            <p:cNvPr id="5" name="Group 4"/>
-            <p:cNvGrpSpPr/>
-            <p:nvPr/>
-          </p:nvGrpSpPr>
-          <p:grpSpPr>
-            <a:xfrm>
-              <a:off x="2125355" y="1140737"/>
-              <a:ext cx="3776677" cy="4578546"/>
-              <a:chOff x="2125355" y="1140737"/>
-              <a:chExt cx="3776677" cy="4578546"/>
-            </a:xfrm>
-          </p:grpSpPr>
-          <p:grpSp>
-            <p:nvGrpSpPr>
-              <p:cNvPr id="7" name="Group 6"/>
-              <p:cNvGrpSpPr/>
-              <p:nvPr/>
-            </p:nvGrpSpPr>
-            <p:grpSpPr>
-              <a:xfrm>
-                <a:off x="2125355" y="1140737"/>
-                <a:ext cx="3776677" cy="3911714"/>
-                <a:chOff x="2125355" y="1140737"/>
-                <a:chExt cx="3776677" cy="3911714"/>
-              </a:xfrm>
-            </p:grpSpPr>
-            <p:grpSp>
-              <p:nvGrpSpPr>
-                <p:cNvPr id="14" name="Group 13"/>
-                <p:cNvGrpSpPr/>
-                <p:nvPr/>
-              </p:nvGrpSpPr>
-              <p:grpSpPr>
-                <a:xfrm>
-                  <a:off x="2584515" y="1702053"/>
-                  <a:ext cx="707630" cy="561314"/>
-                  <a:chOff x="2005094" y="1140737"/>
-                  <a:chExt cx="707630" cy="561314"/>
-                </a:xfrm>
-              </p:grpSpPr>
-              <p:sp>
-                <p:nvSpPr>
-                  <p:cNvPr id="85" name="Oval 84"/>
-                  <p:cNvSpPr/>
-                  <p:nvPr/>
-                </p:nvSpPr>
-                <p:spPr>
-                  <a:xfrm>
-                    <a:off x="2064189" y="1140737"/>
-                    <a:ext cx="589441" cy="561314"/>
-                  </a:xfrm>
-                  <a:prstGeom prst="ellipse">
-                    <a:avLst/>
-                  </a:prstGeom>
-                  <a:solidFill>
-                    <a:srgbClr val="FFCCCC"/>
-                  </a:solidFill>
-                  <a:ln w="9525">
-                    <a:solidFill>
-                      <a:schemeClr val="tx1"/>
-                    </a:solidFill>
-                  </a:ln>
-                </p:spPr>
-                <p:style>
-                  <a:lnRef idx="2">
-                    <a:schemeClr val="accent1">
-                      <a:shade val="50000"/>
-                    </a:schemeClr>
-                  </a:lnRef>
-                  <a:fillRef idx="1">
-                    <a:schemeClr val="accent1"/>
-                  </a:fillRef>
-                  <a:effectRef idx="0">
-                    <a:schemeClr val="accent1"/>
-                  </a:effectRef>
-                  <a:fontRef idx="minor">
-                    <a:schemeClr val="lt1"/>
-                  </a:fontRef>
-                </p:style>
-                <p:txBody>
-                  <a:bodyPr rtlCol="0" anchor="ctr"/>
-                  <a:lstStyle/>
-                  <a:p>
-                    <a:pPr algn="ctr"/>
-                    <a:endParaRPr lang="en-US" sz="2000"/>
-                  </a:p>
-                </p:txBody>
-              </p:sp>
-              <p:sp>
-                <p:nvSpPr>
-                  <p:cNvPr id="86" name="TextBox 85"/>
-                  <p:cNvSpPr txBox="1"/>
-                  <p:nvPr/>
-                </p:nvSpPr>
-                <p:spPr>
-                  <a:xfrm>
-                    <a:off x="2005094" y="1282894"/>
-                    <a:ext cx="707630" cy="307777"/>
-                  </a:xfrm>
-                  <a:prstGeom prst="rect">
-                    <a:avLst/>
-                  </a:prstGeom>
-                  <a:noFill/>
-                </p:spPr>
-                <p:txBody>
-                  <a:bodyPr wrap="none" rtlCol="0">
-                    <a:spAutoFit/>
-                  </a:bodyPr>
-                  <a:lstStyle/>
-                  <a:p>
-                    <a:pPr algn="ctr"/>
-                    <a:r>
-                      <a:rPr lang="en-US" sz="1400" dirty="0" smtClean="0"/>
-                      <a:t>(W,1,1)</a:t>
-                    </a:r>
-                    <a:endParaRPr lang="en-US" sz="1400" dirty="0"/>
-                  </a:p>
-                </p:txBody>
-              </p:sp>
-            </p:grpSp>
-            <p:grpSp>
-              <p:nvGrpSpPr>
-                <p:cNvPr id="15" name="Group 14"/>
-                <p:cNvGrpSpPr/>
-                <p:nvPr/>
-              </p:nvGrpSpPr>
-              <p:grpSpPr>
-                <a:xfrm>
-                  <a:off x="3960672" y="1140737"/>
-                  <a:ext cx="589441" cy="561314"/>
-                  <a:chOff x="2064189" y="1394737"/>
-                  <a:chExt cx="589441" cy="561314"/>
-                </a:xfrm>
-              </p:grpSpPr>
-              <p:sp>
-                <p:nvSpPr>
-                  <p:cNvPr id="83" name="Oval 82"/>
-                  <p:cNvSpPr/>
-                  <p:nvPr/>
-                </p:nvSpPr>
-                <p:spPr>
-                  <a:xfrm>
-                    <a:off x="2064189" y="1394737"/>
-                    <a:ext cx="589441" cy="561314"/>
-                  </a:xfrm>
-                  <a:prstGeom prst="ellipse">
-                    <a:avLst/>
-                  </a:prstGeom>
-                  <a:solidFill>
-                    <a:schemeClr val="bg1"/>
-                  </a:solidFill>
-                  <a:ln w="9525">
-                    <a:solidFill>
-                      <a:schemeClr val="tx1"/>
-                    </a:solidFill>
-                  </a:ln>
-                </p:spPr>
-                <p:style>
-                  <a:lnRef idx="2">
-                    <a:schemeClr val="accent1">
-                      <a:shade val="50000"/>
-                    </a:schemeClr>
-                  </a:lnRef>
-                  <a:fillRef idx="1">
-                    <a:schemeClr val="accent1"/>
-                  </a:fillRef>
-                  <a:effectRef idx="0">
-                    <a:schemeClr val="accent1"/>
-                  </a:effectRef>
-                  <a:fontRef idx="minor">
-                    <a:schemeClr val="lt1"/>
-                  </a:fontRef>
-                </p:style>
-                <p:txBody>
-                  <a:bodyPr rtlCol="0" anchor="ctr"/>
-                  <a:lstStyle/>
-                  <a:p>
-                    <a:pPr algn="ctr"/>
-                    <a:endParaRPr lang="en-US" sz="2000"/>
-                  </a:p>
-                </p:txBody>
-              </p:sp>
-              <p:sp>
-                <p:nvSpPr>
-                  <p:cNvPr id="84" name="TextBox 83"/>
-                  <p:cNvSpPr txBox="1"/>
-                  <p:nvPr/>
-                </p:nvSpPr>
-                <p:spPr>
-                  <a:xfrm>
-                    <a:off x="2089060" y="1536894"/>
-                    <a:ext cx="539699" cy="307777"/>
-                  </a:xfrm>
-                  <a:prstGeom prst="rect">
-                    <a:avLst/>
-                  </a:prstGeom>
-                  <a:noFill/>
-                </p:spPr>
-                <p:txBody>
-                  <a:bodyPr wrap="none" rtlCol="0">
-                    <a:spAutoFit/>
-                  </a:bodyPr>
-                  <a:lstStyle/>
-                  <a:p>
-                    <a:pPr algn="ctr"/>
-                    <a:r>
-                      <a:rPr lang="en-US" sz="1400" i="1" dirty="0" smtClean="0"/>
-                      <a:t>Start</a:t>
-                    </a:r>
-                    <a:endParaRPr lang="en-US" sz="1400" i="1" dirty="0"/>
-                  </a:p>
-                </p:txBody>
-              </p:sp>
-            </p:grpSp>
-            <p:grpSp>
-              <p:nvGrpSpPr>
-                <p:cNvPr id="16" name="Group 15"/>
-                <p:cNvGrpSpPr/>
-                <p:nvPr/>
-              </p:nvGrpSpPr>
-              <p:grpSpPr>
-                <a:xfrm>
-                  <a:off x="3510031" y="1702053"/>
-                  <a:ext cx="649537" cy="561314"/>
-                  <a:chOff x="2034140" y="1140737"/>
-                  <a:chExt cx="649537" cy="561314"/>
-                </a:xfrm>
-              </p:grpSpPr>
-              <p:sp>
-                <p:nvSpPr>
-                  <p:cNvPr id="81" name="Oval 80"/>
-                  <p:cNvSpPr/>
-                  <p:nvPr/>
-                </p:nvSpPr>
-                <p:spPr>
-                  <a:xfrm>
-                    <a:off x="2064189" y="1140737"/>
-                    <a:ext cx="589441" cy="561314"/>
-                  </a:xfrm>
-                  <a:prstGeom prst="ellipse">
-                    <a:avLst/>
-                  </a:prstGeom>
-                  <a:solidFill>
-                    <a:schemeClr val="bg1"/>
-                  </a:solidFill>
-                  <a:ln w="9525">
-                    <a:solidFill>
-                      <a:schemeClr val="tx1"/>
-                    </a:solidFill>
-                  </a:ln>
-                </p:spPr>
-                <p:style>
-                  <a:lnRef idx="2">
-                    <a:schemeClr val="accent1">
-                      <a:shade val="50000"/>
-                    </a:schemeClr>
-                  </a:lnRef>
-                  <a:fillRef idx="1">
-                    <a:schemeClr val="accent1"/>
-                  </a:fillRef>
-                  <a:effectRef idx="0">
-                    <a:schemeClr val="accent1"/>
-                  </a:effectRef>
-                  <a:fontRef idx="minor">
-                    <a:schemeClr val="lt1"/>
-                  </a:fontRef>
-                </p:style>
-                <p:txBody>
-                  <a:bodyPr rtlCol="0" anchor="ctr"/>
-                  <a:lstStyle/>
-                  <a:p>
-                    <a:pPr algn="ctr"/>
-                    <a:endParaRPr lang="en-US" sz="2000"/>
-                  </a:p>
-                </p:txBody>
-              </p:sp>
-              <p:sp>
-                <p:nvSpPr>
-                  <p:cNvPr id="82" name="TextBox 81"/>
-                  <p:cNvSpPr txBox="1"/>
-                  <p:nvPr/>
-                </p:nvSpPr>
-                <p:spPr>
-                  <a:xfrm>
-                    <a:off x="2034140" y="1282894"/>
-                    <a:ext cx="649537" cy="307777"/>
-                  </a:xfrm>
-                  <a:prstGeom prst="rect">
-                    <a:avLst/>
-                  </a:prstGeom>
-                  <a:noFill/>
-                </p:spPr>
-                <p:txBody>
-                  <a:bodyPr wrap="none" rtlCol="0">
-                    <a:spAutoFit/>
-                  </a:bodyPr>
-                  <a:lstStyle/>
-                  <a:p>
-                    <a:pPr algn="ctr"/>
-                    <a:r>
-                      <a:rPr lang="en-US" sz="1400" dirty="0" smtClean="0"/>
-                      <a:t>(Z,1,1)</a:t>
-                    </a:r>
-                    <a:endParaRPr lang="en-US" sz="1400" dirty="0"/>
-                  </a:p>
-                </p:txBody>
-              </p:sp>
-            </p:grpSp>
-            <p:grpSp>
-              <p:nvGrpSpPr>
-                <p:cNvPr id="17" name="Group 16"/>
-                <p:cNvGrpSpPr/>
-                <p:nvPr/>
-              </p:nvGrpSpPr>
-              <p:grpSpPr>
-                <a:xfrm>
-                  <a:off x="4387483" y="1702052"/>
-                  <a:ext cx="632288" cy="561314"/>
-                  <a:chOff x="2042765" y="1140737"/>
-                  <a:chExt cx="632288" cy="561314"/>
-                </a:xfrm>
-              </p:grpSpPr>
-              <p:sp>
-                <p:nvSpPr>
-                  <p:cNvPr id="79" name="Oval 78"/>
-                  <p:cNvSpPr/>
-                  <p:nvPr/>
-                </p:nvSpPr>
-                <p:spPr>
-                  <a:xfrm>
-                    <a:off x="2064189" y="1140737"/>
-                    <a:ext cx="589441" cy="561314"/>
-                  </a:xfrm>
-                  <a:prstGeom prst="ellipse">
-                    <a:avLst/>
-                  </a:prstGeom>
-                  <a:solidFill>
-                    <a:schemeClr val="bg1"/>
-                  </a:solidFill>
-                  <a:ln w="9525">
-                    <a:solidFill>
-                      <a:schemeClr val="tx1"/>
-                    </a:solidFill>
-                  </a:ln>
-                </p:spPr>
-                <p:style>
-                  <a:lnRef idx="2">
-                    <a:schemeClr val="accent1">
-                      <a:shade val="50000"/>
-                    </a:schemeClr>
-                  </a:lnRef>
-                  <a:fillRef idx="1">
-                    <a:schemeClr val="accent1"/>
-                  </a:fillRef>
-                  <a:effectRef idx="0">
-                    <a:schemeClr val="accent1"/>
-                  </a:effectRef>
-                  <a:fontRef idx="minor">
-                    <a:schemeClr val="lt1"/>
-                  </a:fontRef>
-                </p:style>
-                <p:txBody>
-                  <a:bodyPr rtlCol="0" anchor="ctr"/>
-                  <a:lstStyle/>
-                  <a:p>
-                    <a:pPr algn="ctr"/>
-                    <a:endParaRPr lang="en-US" sz="2000"/>
-                  </a:p>
-                </p:txBody>
-              </p:sp>
-              <p:sp>
-                <p:nvSpPr>
-                  <p:cNvPr id="80" name="TextBox 79"/>
-                  <p:cNvSpPr txBox="1"/>
-                  <p:nvPr/>
-                </p:nvSpPr>
-                <p:spPr>
-                  <a:xfrm>
-                    <a:off x="2042765" y="1282894"/>
-                    <a:ext cx="632288" cy="307777"/>
-                  </a:xfrm>
-                  <a:prstGeom prst="rect">
-                    <a:avLst/>
-                  </a:prstGeom>
-                  <a:noFill/>
-                </p:spPr>
-                <p:txBody>
-                  <a:bodyPr wrap="none" rtlCol="0">
-                    <a:spAutoFit/>
-                  </a:bodyPr>
-                  <a:lstStyle/>
-                  <a:p>
-                    <a:pPr algn="ctr"/>
-                    <a:r>
-                      <a:rPr lang="en-US" sz="1400" dirty="0" smtClean="0"/>
-                      <a:t>(Y,1,1)</a:t>
-                    </a:r>
-                    <a:endParaRPr lang="en-US" sz="1400" dirty="0"/>
-                  </a:p>
-                </p:txBody>
-              </p:sp>
-            </p:grpSp>
-            <p:grpSp>
-              <p:nvGrpSpPr>
-                <p:cNvPr id="18" name="Group 17"/>
-                <p:cNvGrpSpPr/>
-                <p:nvPr/>
-              </p:nvGrpSpPr>
-              <p:grpSpPr>
-                <a:xfrm>
-                  <a:off x="5242877" y="1702051"/>
-                  <a:ext cx="659155" cy="561314"/>
-                  <a:chOff x="2029332" y="1140737"/>
-                  <a:chExt cx="659155" cy="561314"/>
-                </a:xfrm>
-              </p:grpSpPr>
-              <p:sp>
-                <p:nvSpPr>
-                  <p:cNvPr id="77" name="Oval 76"/>
-                  <p:cNvSpPr/>
-                  <p:nvPr/>
-                </p:nvSpPr>
-                <p:spPr>
-                  <a:xfrm>
-                    <a:off x="2064189" y="1140737"/>
-                    <a:ext cx="589441" cy="561314"/>
-                  </a:xfrm>
-                  <a:prstGeom prst="ellipse">
-                    <a:avLst/>
-                  </a:prstGeom>
-                  <a:solidFill>
-                    <a:schemeClr val="bg1"/>
-                  </a:solidFill>
-                  <a:ln w="9525">
-                    <a:solidFill>
-                      <a:schemeClr val="tx1"/>
-                    </a:solidFill>
-                  </a:ln>
-                </p:spPr>
-                <p:style>
-                  <a:lnRef idx="2">
-                    <a:schemeClr val="accent1">
-                      <a:shade val="50000"/>
-                    </a:schemeClr>
-                  </a:lnRef>
-                  <a:fillRef idx="1">
-                    <a:schemeClr val="accent1"/>
-                  </a:fillRef>
-                  <a:effectRef idx="0">
-                    <a:schemeClr val="accent1"/>
-                  </a:effectRef>
-                  <a:fontRef idx="minor">
-                    <a:schemeClr val="lt1"/>
-                  </a:fontRef>
-                </p:style>
-                <p:txBody>
-                  <a:bodyPr rtlCol="0" anchor="ctr"/>
-                  <a:lstStyle/>
-                  <a:p>
-                    <a:pPr algn="ctr"/>
-                    <a:endParaRPr lang="en-US" sz="2000"/>
-                  </a:p>
-                </p:txBody>
-              </p:sp>
-              <p:sp>
-                <p:nvSpPr>
-                  <p:cNvPr id="78" name="TextBox 77"/>
-                  <p:cNvSpPr txBox="1"/>
-                  <p:nvPr/>
-                </p:nvSpPr>
-                <p:spPr>
-                  <a:xfrm>
-                    <a:off x="2029332" y="1282894"/>
-                    <a:ext cx="659155" cy="307777"/>
-                  </a:xfrm>
-                  <a:prstGeom prst="rect">
-                    <a:avLst/>
-                  </a:prstGeom>
-                  <a:noFill/>
-                </p:spPr>
-                <p:txBody>
-                  <a:bodyPr wrap="none" rtlCol="0">
-                    <a:spAutoFit/>
-                  </a:bodyPr>
-                  <a:lstStyle/>
-                  <a:p>
-                    <a:pPr algn="ctr"/>
-                    <a:r>
-                      <a:rPr lang="en-US" sz="1400" dirty="0" smtClean="0"/>
-                      <a:t>(X,1,1)</a:t>
-                    </a:r>
-                    <a:endParaRPr lang="en-US" sz="1400" dirty="0"/>
-                  </a:p>
-                </p:txBody>
-              </p:sp>
-            </p:grpSp>
-            <p:grpSp>
-              <p:nvGrpSpPr>
-                <p:cNvPr id="19" name="Group 18"/>
-                <p:cNvGrpSpPr/>
-                <p:nvPr/>
-              </p:nvGrpSpPr>
-              <p:grpSpPr>
-                <a:xfrm>
-                  <a:off x="2125355" y="2429248"/>
-                  <a:ext cx="665374" cy="561314"/>
-                  <a:chOff x="2026222" y="1140737"/>
-                  <a:chExt cx="665374" cy="561314"/>
-                </a:xfrm>
-              </p:grpSpPr>
-              <p:sp>
-                <p:nvSpPr>
-                  <p:cNvPr id="75" name="Oval 74"/>
-                  <p:cNvSpPr/>
-                  <p:nvPr/>
-                </p:nvSpPr>
-                <p:spPr>
-                  <a:xfrm>
-                    <a:off x="2064189" y="1140737"/>
-                    <a:ext cx="589441" cy="561314"/>
-                  </a:xfrm>
-                  <a:prstGeom prst="ellipse">
-                    <a:avLst/>
-                  </a:prstGeom>
-                  <a:solidFill>
-                    <a:srgbClr val="FFCCCC"/>
-                  </a:solidFill>
-                  <a:ln w="9525">
-                    <a:solidFill>
-                      <a:schemeClr val="tx1"/>
-                    </a:solidFill>
-                  </a:ln>
-                </p:spPr>
-                <p:style>
-                  <a:lnRef idx="2">
-                    <a:schemeClr val="accent1">
-                      <a:shade val="50000"/>
-                    </a:schemeClr>
-                  </a:lnRef>
-                  <a:fillRef idx="1">
-                    <a:schemeClr val="accent1"/>
-                  </a:fillRef>
-                  <a:effectRef idx="0">
-                    <a:schemeClr val="accent1"/>
-                  </a:effectRef>
-                  <a:fontRef idx="minor">
-                    <a:schemeClr val="lt1"/>
-                  </a:fontRef>
-                </p:style>
-                <p:txBody>
-                  <a:bodyPr rtlCol="0" anchor="ctr"/>
-                  <a:lstStyle/>
-                  <a:p>
-                    <a:pPr algn="ctr"/>
-                    <a:endParaRPr lang="en-US" sz="2000"/>
-                  </a:p>
-                </p:txBody>
-              </p:sp>
-              <p:sp>
-                <p:nvSpPr>
-                  <p:cNvPr id="76" name="TextBox 75"/>
-                  <p:cNvSpPr txBox="1"/>
-                  <p:nvPr/>
-                </p:nvSpPr>
-                <p:spPr>
-                  <a:xfrm>
-                    <a:off x="2026222" y="1282894"/>
-                    <a:ext cx="665374" cy="307777"/>
-                  </a:xfrm>
-                  <a:prstGeom prst="rect">
-                    <a:avLst/>
-                  </a:prstGeom>
-                  <a:noFill/>
-                </p:spPr>
-                <p:txBody>
-                  <a:bodyPr wrap="none" rtlCol="0">
-                    <a:spAutoFit/>
-                  </a:bodyPr>
-                  <a:lstStyle/>
-                  <a:p>
-                    <a:pPr algn="ctr"/>
-                    <a:r>
-                      <a:rPr lang="en-US" sz="1400" dirty="0" smtClean="0"/>
-                      <a:t>(A,</a:t>
-                    </a:r>
-                    <a:r>
-                      <a:rPr lang="en-US" sz="1400" dirty="0" smtClean="0"/>
-                      <a:t>–</a:t>
-                    </a:r>
-                    <a:r>
-                      <a:rPr lang="en-US" sz="1400" dirty="0" smtClean="0"/>
-                      <a:t>,</a:t>
-                    </a:r>
-                    <a:r>
-                      <a:rPr lang="en-US" sz="1400" dirty="0" smtClean="0"/>
-                      <a:t>2</a:t>
-                    </a:r>
-                    <a:r>
-                      <a:rPr lang="en-US" sz="1400" dirty="0" smtClean="0"/>
-                      <a:t>)</a:t>
-                    </a:r>
-                    <a:endParaRPr lang="en-US" sz="1400" dirty="0"/>
-                  </a:p>
-                </p:txBody>
-              </p:sp>
-            </p:grpSp>
-            <p:grpSp>
-              <p:nvGrpSpPr>
-                <p:cNvPr id="20" name="Group 19"/>
-                <p:cNvGrpSpPr/>
-                <p:nvPr/>
-              </p:nvGrpSpPr>
-              <p:grpSpPr>
-                <a:xfrm>
-                  <a:off x="3002898" y="2460781"/>
-                  <a:ext cx="655372" cy="561314"/>
-                  <a:chOff x="2031223" y="1140737"/>
-                  <a:chExt cx="655372" cy="561314"/>
-                </a:xfrm>
-              </p:grpSpPr>
-              <p:sp>
-                <p:nvSpPr>
-                  <p:cNvPr id="73" name="Oval 72"/>
-                  <p:cNvSpPr/>
-                  <p:nvPr/>
-                </p:nvSpPr>
-                <p:spPr>
-                  <a:xfrm>
-                    <a:off x="2064189" y="1140737"/>
-                    <a:ext cx="589441" cy="561314"/>
-                  </a:xfrm>
-                  <a:prstGeom prst="ellipse">
-                    <a:avLst/>
-                  </a:prstGeom>
-                  <a:solidFill>
-                    <a:srgbClr val="FFCCCC"/>
-                  </a:solidFill>
-                  <a:ln w="9525">
-                    <a:solidFill>
-                      <a:schemeClr val="tx1"/>
-                    </a:solidFill>
-                  </a:ln>
-                </p:spPr>
-                <p:style>
-                  <a:lnRef idx="2">
-                    <a:schemeClr val="accent1">
-                      <a:shade val="50000"/>
-                    </a:schemeClr>
-                  </a:lnRef>
-                  <a:fillRef idx="1">
-                    <a:schemeClr val="accent1"/>
-                  </a:fillRef>
-                  <a:effectRef idx="0">
-                    <a:schemeClr val="accent1"/>
-                  </a:effectRef>
-                  <a:fontRef idx="minor">
-                    <a:schemeClr val="lt1"/>
-                  </a:fontRef>
-                </p:style>
-                <p:txBody>
-                  <a:bodyPr rtlCol="0" anchor="ctr"/>
-                  <a:lstStyle/>
-                  <a:p>
-                    <a:pPr algn="ctr"/>
-                    <a:endParaRPr lang="en-US" sz="2000"/>
-                  </a:p>
-                </p:txBody>
-              </p:sp>
-              <p:sp>
-                <p:nvSpPr>
-                  <p:cNvPr id="74" name="TextBox 73"/>
-                  <p:cNvSpPr txBox="1"/>
-                  <p:nvPr/>
-                </p:nvSpPr>
-                <p:spPr>
-                  <a:xfrm>
-                    <a:off x="2031223" y="1282894"/>
-                    <a:ext cx="655372" cy="307777"/>
-                  </a:xfrm>
-                  <a:prstGeom prst="rect">
-                    <a:avLst/>
-                  </a:prstGeom>
-                  <a:noFill/>
-                </p:spPr>
-                <p:txBody>
-                  <a:bodyPr wrap="none" rtlCol="0">
-                    <a:spAutoFit/>
-                  </a:bodyPr>
-                  <a:lstStyle/>
-                  <a:p>
-                    <a:pPr algn="ctr"/>
-                    <a:r>
-                      <a:rPr lang="en-US" sz="1400" dirty="0" smtClean="0"/>
-                      <a:t>(B,</a:t>
-                    </a:r>
-                    <a:r>
-                      <a:rPr lang="en-US" sz="1400" dirty="0" smtClean="0"/>
-                      <a:t>–</a:t>
-                    </a:r>
-                    <a:r>
-                      <a:rPr lang="en-US" sz="1400" dirty="0" smtClean="0"/>
-                      <a:t>,</a:t>
-                    </a:r>
-                    <a:r>
-                      <a:rPr lang="en-US" sz="1400" dirty="0" smtClean="0"/>
-                      <a:t>2</a:t>
-                    </a:r>
-                    <a:r>
-                      <a:rPr lang="en-US" sz="1400" dirty="0" smtClean="0"/>
-                      <a:t>)</a:t>
-                    </a:r>
-                    <a:endParaRPr lang="en-US" sz="1400" dirty="0"/>
-                  </a:p>
-                </p:txBody>
-              </p:sp>
-            </p:grpSp>
-            <p:grpSp>
-              <p:nvGrpSpPr>
-                <p:cNvPr id="21" name="Group 20"/>
-                <p:cNvGrpSpPr/>
-                <p:nvPr/>
-              </p:nvGrpSpPr>
-              <p:grpSpPr>
-                <a:xfrm>
-                  <a:off x="3919748" y="2460781"/>
-                  <a:ext cx="648063" cy="561314"/>
-                  <a:chOff x="2034878" y="1140737"/>
-                  <a:chExt cx="648063" cy="561314"/>
-                </a:xfrm>
-              </p:grpSpPr>
-              <p:sp>
-                <p:nvSpPr>
-                  <p:cNvPr id="71" name="Oval 70"/>
-                  <p:cNvSpPr/>
-                  <p:nvPr/>
-                </p:nvSpPr>
-                <p:spPr>
-                  <a:xfrm>
-                    <a:off x="2064189" y="1140737"/>
-                    <a:ext cx="589441" cy="561314"/>
-                  </a:xfrm>
-                  <a:prstGeom prst="ellipse">
-                    <a:avLst/>
-                  </a:prstGeom>
-                  <a:solidFill>
-                    <a:schemeClr val="bg1"/>
-                  </a:solidFill>
-                  <a:ln w="9525">
-                    <a:solidFill>
-                      <a:schemeClr val="tx1"/>
-                    </a:solidFill>
-                  </a:ln>
-                </p:spPr>
-                <p:style>
-                  <a:lnRef idx="2">
-                    <a:schemeClr val="accent1">
-                      <a:shade val="50000"/>
-                    </a:schemeClr>
-                  </a:lnRef>
-                  <a:fillRef idx="1">
-                    <a:schemeClr val="accent1"/>
-                  </a:fillRef>
-                  <a:effectRef idx="0">
-                    <a:schemeClr val="accent1"/>
-                  </a:effectRef>
-                  <a:fontRef idx="minor">
-                    <a:schemeClr val="lt1"/>
-                  </a:fontRef>
-                </p:style>
-                <p:txBody>
-                  <a:bodyPr rtlCol="0" anchor="ctr"/>
-                  <a:lstStyle/>
-                  <a:p>
-                    <a:pPr algn="ctr"/>
-                    <a:endParaRPr lang="en-US" sz="2000"/>
-                  </a:p>
-                </p:txBody>
-              </p:sp>
-              <p:sp>
-                <p:nvSpPr>
-                  <p:cNvPr id="72" name="TextBox 71"/>
-                  <p:cNvSpPr txBox="1"/>
-                  <p:nvPr/>
-                </p:nvSpPr>
-                <p:spPr>
-                  <a:xfrm>
-                    <a:off x="2034878" y="1282894"/>
-                    <a:ext cx="648063" cy="307777"/>
-                  </a:xfrm>
-                  <a:prstGeom prst="rect">
-                    <a:avLst/>
-                  </a:prstGeom>
-                  <a:noFill/>
-                </p:spPr>
-                <p:txBody>
-                  <a:bodyPr wrap="none" rtlCol="0">
-                    <a:spAutoFit/>
-                  </a:bodyPr>
-                  <a:lstStyle/>
-                  <a:p>
-                    <a:pPr algn="ctr"/>
-                    <a:r>
-                      <a:rPr lang="en-US" sz="1400" dirty="0" smtClean="0"/>
-                      <a:t>(E,</a:t>
-                    </a:r>
-                    <a:r>
-                      <a:rPr lang="en-US" sz="1400" dirty="0" smtClean="0"/>
-                      <a:t>–</a:t>
-                    </a:r>
-                    <a:r>
-                      <a:rPr lang="en-US" sz="1400" dirty="0" smtClean="0"/>
-                      <a:t>,2)</a:t>
-                    </a:r>
-                    <a:endParaRPr lang="en-US" sz="1400" dirty="0"/>
-                  </a:p>
-                </p:txBody>
-              </p:sp>
-            </p:grpSp>
-            <p:grpSp>
-              <p:nvGrpSpPr>
-                <p:cNvPr id="22" name="Group 21"/>
-                <p:cNvGrpSpPr/>
-                <p:nvPr/>
-              </p:nvGrpSpPr>
-              <p:grpSpPr>
-                <a:xfrm>
-                  <a:off x="4791882" y="2483732"/>
-                  <a:ext cx="672107" cy="561314"/>
-                  <a:chOff x="2022856" y="1140737"/>
-                  <a:chExt cx="672107" cy="561314"/>
-                </a:xfrm>
-              </p:grpSpPr>
-              <p:sp>
-                <p:nvSpPr>
-                  <p:cNvPr id="69" name="Oval 68"/>
-                  <p:cNvSpPr/>
-                  <p:nvPr/>
-                </p:nvSpPr>
-                <p:spPr>
-                  <a:xfrm>
-                    <a:off x="2064189" y="1140737"/>
-                    <a:ext cx="589441" cy="561314"/>
-                  </a:xfrm>
-                  <a:prstGeom prst="ellipse">
-                    <a:avLst/>
-                  </a:prstGeom>
-                  <a:solidFill>
-                    <a:schemeClr val="bg1"/>
-                  </a:solidFill>
-                  <a:ln w="9525">
-                    <a:solidFill>
-                      <a:schemeClr val="tx1"/>
-                    </a:solidFill>
-                  </a:ln>
-                </p:spPr>
-                <p:style>
-                  <a:lnRef idx="2">
-                    <a:schemeClr val="accent1">
-                      <a:shade val="50000"/>
-                    </a:schemeClr>
-                  </a:lnRef>
-                  <a:fillRef idx="1">
-                    <a:schemeClr val="accent1"/>
-                  </a:fillRef>
-                  <a:effectRef idx="0">
-                    <a:schemeClr val="accent1"/>
-                  </a:effectRef>
-                  <a:fontRef idx="minor">
-                    <a:schemeClr val="lt1"/>
-                  </a:fontRef>
-                </p:style>
-                <p:txBody>
-                  <a:bodyPr rtlCol="0" anchor="ctr"/>
-                  <a:lstStyle/>
-                  <a:p>
-                    <a:pPr algn="ctr"/>
-                    <a:endParaRPr lang="en-US" sz="2000"/>
-                  </a:p>
-                </p:txBody>
-              </p:sp>
-              <p:sp>
-                <p:nvSpPr>
-                  <p:cNvPr id="70" name="TextBox 69"/>
-                  <p:cNvSpPr txBox="1"/>
-                  <p:nvPr/>
-                </p:nvSpPr>
-                <p:spPr>
-                  <a:xfrm>
-                    <a:off x="2022856" y="1282894"/>
-                    <a:ext cx="672107" cy="307777"/>
-                  </a:xfrm>
-                  <a:prstGeom prst="rect">
-                    <a:avLst/>
-                  </a:prstGeom>
-                  <a:noFill/>
-                </p:spPr>
-                <p:txBody>
-                  <a:bodyPr wrap="none" rtlCol="0">
-                    <a:spAutoFit/>
-                  </a:bodyPr>
-                  <a:lstStyle/>
-                  <a:p>
-                    <a:pPr algn="ctr"/>
-                    <a:r>
-                      <a:rPr lang="en-US" sz="1400" dirty="0" smtClean="0"/>
-                      <a:t>(D,2,2)</a:t>
-                    </a:r>
-                    <a:endParaRPr lang="en-US" sz="1400" dirty="0"/>
-                  </a:p>
-                </p:txBody>
-              </p:sp>
-            </p:grpSp>
-            <p:grpSp>
-              <p:nvGrpSpPr>
-                <p:cNvPr id="23" name="Group 22"/>
-                <p:cNvGrpSpPr/>
-                <p:nvPr/>
-              </p:nvGrpSpPr>
-              <p:grpSpPr>
-                <a:xfrm>
-                  <a:off x="4797108" y="3223596"/>
-                  <a:ext cx="661655" cy="561314"/>
-                  <a:chOff x="2028082" y="1140737"/>
-                  <a:chExt cx="661655" cy="561314"/>
-                </a:xfrm>
-              </p:grpSpPr>
-              <p:sp>
-                <p:nvSpPr>
-                  <p:cNvPr id="67" name="Oval 66"/>
-                  <p:cNvSpPr/>
-                  <p:nvPr/>
-                </p:nvSpPr>
-                <p:spPr>
-                  <a:xfrm>
-                    <a:off x="2064189" y="1140737"/>
-                    <a:ext cx="589441" cy="561314"/>
-                  </a:xfrm>
-                  <a:prstGeom prst="ellipse">
-                    <a:avLst/>
-                  </a:prstGeom>
-                  <a:solidFill>
-                    <a:schemeClr val="bg1"/>
-                  </a:solidFill>
-                  <a:ln w="9525">
-                    <a:solidFill>
-                      <a:schemeClr val="tx1"/>
-                    </a:solidFill>
-                  </a:ln>
-                </p:spPr>
-                <p:style>
-                  <a:lnRef idx="2">
-                    <a:schemeClr val="accent1">
-                      <a:shade val="50000"/>
-                    </a:schemeClr>
-                  </a:lnRef>
-                  <a:fillRef idx="1">
-                    <a:schemeClr val="accent1"/>
-                  </a:fillRef>
-                  <a:effectRef idx="0">
-                    <a:schemeClr val="accent1"/>
-                  </a:effectRef>
-                  <a:fontRef idx="minor">
-                    <a:schemeClr val="lt1"/>
-                  </a:fontRef>
-                </p:style>
-                <p:txBody>
-                  <a:bodyPr rtlCol="0" anchor="ctr"/>
-                  <a:lstStyle/>
-                  <a:p>
-                    <a:pPr algn="ctr"/>
-                    <a:endParaRPr lang="en-US" sz="2000"/>
-                  </a:p>
-                </p:txBody>
-              </p:sp>
-              <p:sp>
-                <p:nvSpPr>
-                  <p:cNvPr id="68" name="TextBox 67"/>
-                  <p:cNvSpPr txBox="1"/>
-                  <p:nvPr/>
-                </p:nvSpPr>
-                <p:spPr>
-                  <a:xfrm>
-                    <a:off x="2028082" y="1282894"/>
-                    <a:ext cx="661655" cy="307777"/>
-                  </a:xfrm>
-                  <a:prstGeom prst="rect">
-                    <a:avLst/>
-                  </a:prstGeom>
-                  <a:noFill/>
-                </p:spPr>
-                <p:txBody>
-                  <a:bodyPr wrap="none" rtlCol="0">
-                    <a:spAutoFit/>
-                  </a:bodyPr>
-                  <a:lstStyle/>
-                  <a:p>
-                    <a:pPr algn="ctr"/>
-                    <a:r>
-                      <a:rPr lang="en-US" sz="1400" dirty="0" smtClean="0"/>
-                      <a:t>(C,3,2)</a:t>
-                    </a:r>
-                    <a:endParaRPr lang="en-US" sz="1400" dirty="0"/>
-                  </a:p>
-                </p:txBody>
-              </p:sp>
-            </p:grpSp>
-            <p:grpSp>
-              <p:nvGrpSpPr>
-                <p:cNvPr id="24" name="Group 23"/>
-                <p:cNvGrpSpPr/>
-                <p:nvPr/>
-              </p:nvGrpSpPr>
-              <p:grpSpPr>
-                <a:xfrm>
-                  <a:off x="5216942" y="3859430"/>
-                  <a:ext cx="671658" cy="561314"/>
-                  <a:chOff x="1769079" y="1013737"/>
-                  <a:chExt cx="671658" cy="561314"/>
-                </a:xfrm>
-              </p:grpSpPr>
-              <p:sp>
-                <p:nvSpPr>
-                  <p:cNvPr id="65" name="Oval 64"/>
-                  <p:cNvSpPr/>
-                  <p:nvPr/>
-                </p:nvSpPr>
-                <p:spPr>
-                  <a:xfrm>
-                    <a:off x="1810189" y="1013737"/>
-                    <a:ext cx="589441" cy="561314"/>
-                  </a:xfrm>
-                  <a:prstGeom prst="ellipse">
-                    <a:avLst/>
-                  </a:prstGeom>
-                  <a:solidFill>
-                    <a:schemeClr val="bg1"/>
-                  </a:solidFill>
-                  <a:ln w="9525">
-                    <a:solidFill>
-                      <a:schemeClr val="tx1"/>
-                    </a:solidFill>
-                  </a:ln>
-                </p:spPr>
-                <p:style>
-                  <a:lnRef idx="2">
-                    <a:schemeClr val="accent1">
-                      <a:shade val="50000"/>
-                    </a:schemeClr>
-                  </a:lnRef>
-                  <a:fillRef idx="1">
-                    <a:schemeClr val="accent1"/>
-                  </a:fillRef>
-                  <a:effectRef idx="0">
-                    <a:schemeClr val="accent1"/>
-                  </a:effectRef>
-                  <a:fontRef idx="minor">
-                    <a:schemeClr val="lt1"/>
-                  </a:fontRef>
-                </p:style>
-                <p:txBody>
-                  <a:bodyPr rtlCol="0" anchor="ctr"/>
-                  <a:lstStyle/>
-                  <a:p>
-                    <a:pPr algn="ctr"/>
-                    <a:endParaRPr lang="en-US" sz="2000"/>
-                  </a:p>
-                </p:txBody>
-              </p:sp>
-              <p:sp>
-                <p:nvSpPr>
-                  <p:cNvPr id="66" name="TextBox 65"/>
-                  <p:cNvSpPr txBox="1"/>
-                  <p:nvPr/>
-                </p:nvSpPr>
-                <p:spPr>
-                  <a:xfrm>
-                    <a:off x="1769079" y="1155894"/>
-                    <a:ext cx="671658" cy="307777"/>
-                  </a:xfrm>
-                  <a:prstGeom prst="rect">
-                    <a:avLst/>
-                  </a:prstGeom>
-                  <a:noFill/>
-                </p:spPr>
-                <p:txBody>
-                  <a:bodyPr wrap="none" rtlCol="0">
-                    <a:spAutoFit/>
-                  </a:bodyPr>
-                  <a:lstStyle/>
-                  <a:p>
-                    <a:pPr algn="ctr"/>
-                    <a:r>
-                      <a:rPr lang="en-US" sz="1400" dirty="0" smtClean="0"/>
-                      <a:t>(A,4,2)</a:t>
-                    </a:r>
-                    <a:endParaRPr lang="en-US" sz="1400" dirty="0"/>
-                  </a:p>
-                </p:txBody>
-              </p:sp>
-            </p:grpSp>
-            <p:grpSp>
-              <p:nvGrpSpPr>
-                <p:cNvPr id="25" name="Group 24"/>
-                <p:cNvGrpSpPr/>
-                <p:nvPr/>
-              </p:nvGrpSpPr>
-              <p:grpSpPr>
-                <a:xfrm>
-                  <a:off x="3922481" y="3223595"/>
-                  <a:ext cx="665823" cy="561314"/>
-                  <a:chOff x="2025998" y="1140737"/>
-                  <a:chExt cx="665823" cy="561314"/>
-                </a:xfrm>
-              </p:grpSpPr>
-              <p:sp>
-                <p:nvSpPr>
-                  <p:cNvPr id="63" name="Oval 62"/>
-                  <p:cNvSpPr/>
-                  <p:nvPr/>
-                </p:nvSpPr>
-                <p:spPr>
-                  <a:xfrm>
-                    <a:off x="2064189" y="1140737"/>
-                    <a:ext cx="589441" cy="561314"/>
-                  </a:xfrm>
-                  <a:prstGeom prst="ellipse">
-                    <a:avLst/>
-                  </a:prstGeom>
-                  <a:solidFill>
-                    <a:srgbClr val="FFCCCC"/>
-                  </a:solidFill>
-                  <a:ln w="9525">
-                    <a:solidFill>
-                      <a:schemeClr val="tx1"/>
-                    </a:solidFill>
-                  </a:ln>
-                </p:spPr>
-                <p:style>
-                  <a:lnRef idx="2">
-                    <a:schemeClr val="accent1">
-                      <a:shade val="50000"/>
-                    </a:schemeClr>
-                  </a:lnRef>
-                  <a:fillRef idx="1">
-                    <a:schemeClr val="accent1"/>
-                  </a:fillRef>
-                  <a:effectRef idx="0">
-                    <a:schemeClr val="accent1"/>
-                  </a:effectRef>
-                  <a:fontRef idx="minor">
-                    <a:schemeClr val="lt1"/>
-                  </a:fontRef>
-                </p:style>
-                <p:txBody>
-                  <a:bodyPr rtlCol="0" anchor="ctr"/>
-                  <a:lstStyle/>
-                  <a:p>
-                    <a:pPr algn="ctr"/>
-                    <a:endParaRPr lang="en-US" sz="2000"/>
-                  </a:p>
-                </p:txBody>
-              </p:sp>
-              <p:sp>
-                <p:nvSpPr>
-                  <p:cNvPr id="64" name="TextBox 63"/>
-                  <p:cNvSpPr txBox="1"/>
-                  <p:nvPr/>
-                </p:nvSpPr>
-                <p:spPr>
-                  <a:xfrm>
-                    <a:off x="2025998" y="1282894"/>
-                    <a:ext cx="665823" cy="307777"/>
-                  </a:xfrm>
-                  <a:prstGeom prst="rect">
-                    <a:avLst/>
-                  </a:prstGeom>
-                  <a:noFill/>
-                </p:spPr>
-                <p:txBody>
-                  <a:bodyPr wrap="none" rtlCol="0">
-                    <a:spAutoFit/>
-                  </a:bodyPr>
-                  <a:lstStyle/>
-                  <a:p>
-                    <a:pPr algn="ctr"/>
-                    <a:r>
-                      <a:rPr lang="en-US" sz="1400" dirty="0" smtClean="0"/>
-                      <a:t>(D,</a:t>
-                    </a:r>
-                    <a:r>
-                      <a:rPr lang="en-US" sz="1400" dirty="0" smtClean="0"/>
-                      <a:t>–</a:t>
-                    </a:r>
-                    <a:r>
-                      <a:rPr lang="en-US" sz="1400" dirty="0" smtClean="0"/>
-                      <a:t>,2)</a:t>
-                    </a:r>
-                    <a:endParaRPr lang="en-US" sz="1400" dirty="0"/>
-                  </a:p>
-                </p:txBody>
-              </p:sp>
-            </p:grpSp>
-            <p:grpSp>
-              <p:nvGrpSpPr>
-                <p:cNvPr id="26" name="Group 25"/>
-                <p:cNvGrpSpPr/>
-                <p:nvPr/>
-              </p:nvGrpSpPr>
-              <p:grpSpPr>
-                <a:xfrm>
-                  <a:off x="3927705" y="3858230"/>
-                  <a:ext cx="655372" cy="561314"/>
-                  <a:chOff x="2031222" y="1013737"/>
-                  <a:chExt cx="655372" cy="561314"/>
-                </a:xfrm>
-              </p:grpSpPr>
-              <p:sp>
-                <p:nvSpPr>
-                  <p:cNvPr id="61" name="Oval 60"/>
-                  <p:cNvSpPr/>
-                  <p:nvPr/>
-                </p:nvSpPr>
-                <p:spPr>
-                  <a:xfrm>
-                    <a:off x="2064189" y="1013737"/>
-                    <a:ext cx="589441" cy="561314"/>
-                  </a:xfrm>
-                  <a:prstGeom prst="ellipse">
-                    <a:avLst/>
-                  </a:prstGeom>
-                  <a:solidFill>
-                    <a:schemeClr val="bg1"/>
-                  </a:solidFill>
-                  <a:ln w="9525">
-                    <a:solidFill>
-                      <a:schemeClr val="tx1"/>
-                    </a:solidFill>
-                  </a:ln>
-                </p:spPr>
-                <p:style>
-                  <a:lnRef idx="2">
-                    <a:schemeClr val="accent1">
-                      <a:shade val="50000"/>
-                    </a:schemeClr>
-                  </a:lnRef>
-                  <a:fillRef idx="1">
-                    <a:schemeClr val="accent1"/>
-                  </a:fillRef>
-                  <a:effectRef idx="0">
-                    <a:schemeClr val="accent1"/>
-                  </a:effectRef>
-                  <a:fontRef idx="minor">
-                    <a:schemeClr val="lt1"/>
-                  </a:fontRef>
-                </p:style>
-                <p:txBody>
-                  <a:bodyPr rtlCol="0" anchor="ctr"/>
-                  <a:lstStyle/>
-                  <a:p>
-                    <a:pPr algn="ctr"/>
-                    <a:endParaRPr lang="en-US" sz="2000"/>
-                  </a:p>
-                </p:txBody>
-              </p:sp>
-              <p:sp>
-                <p:nvSpPr>
-                  <p:cNvPr id="62" name="TextBox 61"/>
-                  <p:cNvSpPr txBox="1"/>
-                  <p:nvPr/>
-                </p:nvSpPr>
-                <p:spPr>
-                  <a:xfrm>
-                    <a:off x="2031222" y="1155894"/>
-                    <a:ext cx="655372" cy="307777"/>
-                  </a:xfrm>
-                  <a:prstGeom prst="rect">
-                    <a:avLst/>
-                  </a:prstGeom>
-                  <a:noFill/>
-                </p:spPr>
-                <p:txBody>
-                  <a:bodyPr wrap="none" rtlCol="0">
-                    <a:spAutoFit/>
-                  </a:bodyPr>
-                  <a:lstStyle/>
-                  <a:p>
-                    <a:pPr algn="ctr"/>
-                    <a:r>
-                      <a:rPr lang="en-US" sz="1400" dirty="0" smtClean="0"/>
-                      <a:t>(B,</a:t>
-                    </a:r>
-                    <a:r>
-                      <a:rPr lang="en-US" sz="1400" dirty="0" smtClean="0"/>
-                      <a:t>–</a:t>
-                    </a:r>
-                    <a:r>
-                      <a:rPr lang="en-US" sz="1400" dirty="0" smtClean="0"/>
-                      <a:t>,</a:t>
-                    </a:r>
-                    <a:r>
-                      <a:rPr lang="en-US" sz="1400" dirty="0" smtClean="0"/>
-                      <a:t>3</a:t>
-                    </a:r>
-                    <a:r>
-                      <a:rPr lang="en-US" sz="1400" dirty="0" smtClean="0"/>
-                      <a:t>)</a:t>
-                    </a:r>
-                    <a:endParaRPr lang="en-US" sz="1400" dirty="0"/>
-                  </a:p>
-                </p:txBody>
-              </p:sp>
-            </p:grpSp>
-            <p:grpSp>
-              <p:nvGrpSpPr>
-                <p:cNvPr id="27" name="Group 26"/>
-                <p:cNvGrpSpPr/>
-                <p:nvPr/>
-              </p:nvGrpSpPr>
-              <p:grpSpPr>
-                <a:xfrm>
-                  <a:off x="3014511" y="3223595"/>
-                  <a:ext cx="655372" cy="561314"/>
-                  <a:chOff x="2031223" y="1140737"/>
-                  <a:chExt cx="655372" cy="561314"/>
-                </a:xfrm>
-              </p:grpSpPr>
-              <p:sp>
-                <p:nvSpPr>
-                  <p:cNvPr id="59" name="Oval 58"/>
-                  <p:cNvSpPr/>
-                  <p:nvPr/>
-                </p:nvSpPr>
-                <p:spPr>
-                  <a:xfrm>
-                    <a:off x="2064189" y="1140737"/>
-                    <a:ext cx="589441" cy="561314"/>
-                  </a:xfrm>
-                  <a:prstGeom prst="ellipse">
-                    <a:avLst/>
-                  </a:prstGeom>
-                  <a:solidFill>
-                    <a:schemeClr val="bg1"/>
-                  </a:solidFill>
-                  <a:ln w="9525">
-                    <a:solidFill>
-                      <a:schemeClr val="tx1"/>
-                    </a:solidFill>
-                  </a:ln>
-                </p:spPr>
-                <p:style>
-                  <a:lnRef idx="2">
-                    <a:schemeClr val="accent1">
-                      <a:shade val="50000"/>
-                    </a:schemeClr>
-                  </a:lnRef>
-                  <a:fillRef idx="1">
-                    <a:schemeClr val="accent1"/>
-                  </a:fillRef>
-                  <a:effectRef idx="0">
-                    <a:schemeClr val="accent1"/>
-                  </a:effectRef>
-                  <a:fontRef idx="minor">
-                    <a:schemeClr val="lt1"/>
-                  </a:fontRef>
-                </p:style>
-                <p:txBody>
-                  <a:bodyPr rtlCol="0" anchor="ctr"/>
-                  <a:lstStyle/>
-                  <a:p>
-                    <a:pPr algn="ctr"/>
-                    <a:endParaRPr lang="en-US" sz="2000"/>
-                  </a:p>
-                </p:txBody>
-              </p:sp>
-              <p:sp>
-                <p:nvSpPr>
-                  <p:cNvPr id="60" name="TextBox 59"/>
-                  <p:cNvSpPr txBox="1"/>
-                  <p:nvPr/>
-                </p:nvSpPr>
-                <p:spPr>
-                  <a:xfrm>
-                    <a:off x="2031223" y="1282894"/>
-                    <a:ext cx="655372" cy="307777"/>
-                  </a:xfrm>
-                  <a:prstGeom prst="rect">
-                    <a:avLst/>
-                  </a:prstGeom>
-                  <a:noFill/>
-                </p:spPr>
-                <p:txBody>
-                  <a:bodyPr wrap="none" rtlCol="0">
-                    <a:spAutoFit/>
-                  </a:bodyPr>
-                  <a:lstStyle/>
-                  <a:p>
-                    <a:pPr algn="ctr"/>
-                    <a:r>
-                      <a:rPr lang="en-US" sz="1400" dirty="0" smtClean="0"/>
-                      <a:t>(C,</a:t>
-                    </a:r>
-                    <a:r>
-                      <a:rPr lang="en-US" sz="1400" dirty="0" smtClean="0"/>
-                      <a:t>–</a:t>
-                    </a:r>
-                    <a:r>
-                      <a:rPr lang="en-US" sz="1400" dirty="0" smtClean="0"/>
-                      <a:t>,2)</a:t>
-                    </a:r>
-                    <a:endParaRPr lang="en-US" sz="1400" dirty="0"/>
-                  </a:p>
-                </p:txBody>
-              </p:sp>
-            </p:grpSp>
-            <p:grpSp>
-              <p:nvGrpSpPr>
-                <p:cNvPr id="28" name="Group 27"/>
-                <p:cNvGrpSpPr/>
-                <p:nvPr/>
-              </p:nvGrpSpPr>
-              <p:grpSpPr>
-                <a:xfrm>
-                  <a:off x="4152379" y="4491137"/>
-                  <a:ext cx="701346" cy="561314"/>
-                  <a:chOff x="2262236" y="886737"/>
-                  <a:chExt cx="701346" cy="561314"/>
-                </a:xfrm>
-              </p:grpSpPr>
-              <p:sp>
-                <p:nvSpPr>
-                  <p:cNvPr id="57" name="Oval 56"/>
-                  <p:cNvSpPr/>
-                  <p:nvPr/>
-                </p:nvSpPr>
-                <p:spPr>
-                  <a:xfrm>
-                    <a:off x="2318189" y="886737"/>
-                    <a:ext cx="589441" cy="561314"/>
-                  </a:xfrm>
-                  <a:prstGeom prst="ellipse">
-                    <a:avLst/>
-                  </a:prstGeom>
-                  <a:solidFill>
-                    <a:schemeClr val="bg1"/>
-                  </a:solidFill>
-                  <a:ln w="9525">
-                    <a:solidFill>
-                      <a:schemeClr val="tx1"/>
-                    </a:solidFill>
-                  </a:ln>
-                </p:spPr>
-                <p:style>
-                  <a:lnRef idx="2">
-                    <a:schemeClr val="accent1">
-                      <a:shade val="50000"/>
-                    </a:schemeClr>
-                  </a:lnRef>
-                  <a:fillRef idx="1">
-                    <a:schemeClr val="accent1"/>
-                  </a:fillRef>
-                  <a:effectRef idx="0">
-                    <a:schemeClr val="accent1"/>
-                  </a:effectRef>
-                  <a:fontRef idx="minor">
-                    <a:schemeClr val="lt1"/>
-                  </a:fontRef>
-                </p:style>
-                <p:txBody>
-                  <a:bodyPr rtlCol="0" anchor="ctr"/>
-                  <a:lstStyle/>
-                  <a:p>
-                    <a:pPr algn="ctr"/>
-                    <a:endParaRPr lang="en-US" sz="2000"/>
-                  </a:p>
-                </p:txBody>
-              </p:sp>
-              <p:sp>
-                <p:nvSpPr>
-                  <p:cNvPr id="58" name="TextBox 57"/>
-                  <p:cNvSpPr txBox="1"/>
-                  <p:nvPr/>
-                </p:nvSpPr>
-                <p:spPr>
-                  <a:xfrm>
-                    <a:off x="2262236" y="1028894"/>
-                    <a:ext cx="701346" cy="307777"/>
-                  </a:xfrm>
-                  <a:prstGeom prst="rect">
-                    <a:avLst/>
-                  </a:prstGeom>
-                  <a:noFill/>
-                </p:spPr>
-                <p:txBody>
-                  <a:bodyPr wrap="none" rtlCol="0">
-                    <a:spAutoFit/>
-                  </a:bodyPr>
-                  <a:lstStyle/>
-                  <a:p>
-                    <a:pPr algn="ctr"/>
-                    <a:r>
-                      <a:rPr lang="en-US" sz="1400" dirty="0" smtClean="0"/>
-                      <a:t>(W,</a:t>
-                    </a:r>
-                    <a:r>
-                      <a:rPr lang="en-US" sz="1400" dirty="0" smtClean="0"/>
-                      <a:t>–</a:t>
-                    </a:r>
-                    <a:r>
-                      <a:rPr lang="en-US" sz="1400" dirty="0" smtClean="0"/>
-                      <a:t>,</a:t>
-                    </a:r>
-                    <a:r>
-                      <a:rPr lang="en-US" sz="1400" dirty="0" smtClean="0"/>
-                      <a:t>4</a:t>
-                    </a:r>
-                    <a:r>
-                      <a:rPr lang="en-US" sz="1400" dirty="0" smtClean="0"/>
-                      <a:t>)</a:t>
-                    </a:r>
-                    <a:endParaRPr lang="en-US" sz="1400" dirty="0"/>
-                  </a:p>
-                </p:txBody>
-              </p:sp>
-            </p:grpSp>
-            <p:grpSp>
-              <p:nvGrpSpPr>
-                <p:cNvPr id="29" name="Group 28"/>
-                <p:cNvGrpSpPr/>
-                <p:nvPr/>
-              </p:nvGrpSpPr>
-              <p:grpSpPr>
-                <a:xfrm>
-                  <a:off x="4948099" y="4491137"/>
-                  <a:ext cx="701346" cy="561314"/>
-                  <a:chOff x="1500236" y="908219"/>
-                  <a:chExt cx="701346" cy="561314"/>
-                </a:xfrm>
-              </p:grpSpPr>
-              <p:sp>
-                <p:nvSpPr>
-                  <p:cNvPr id="55" name="Oval 54"/>
-                  <p:cNvSpPr/>
-                  <p:nvPr/>
-                </p:nvSpPr>
-                <p:spPr>
-                  <a:xfrm>
-                    <a:off x="1556189" y="908219"/>
-                    <a:ext cx="589441" cy="561314"/>
-                  </a:xfrm>
-                  <a:prstGeom prst="ellipse">
-                    <a:avLst/>
-                  </a:prstGeom>
-                  <a:solidFill>
-                    <a:schemeClr val="bg1"/>
-                  </a:solidFill>
-                  <a:ln w="9525">
-                    <a:solidFill>
-                      <a:schemeClr val="tx1"/>
-                    </a:solidFill>
-                  </a:ln>
-                </p:spPr>
-                <p:style>
-                  <a:lnRef idx="2">
-                    <a:schemeClr val="accent1">
-                      <a:shade val="50000"/>
-                    </a:schemeClr>
-                  </a:lnRef>
-                  <a:fillRef idx="1">
-                    <a:schemeClr val="accent1"/>
-                  </a:fillRef>
-                  <a:effectRef idx="0">
-                    <a:schemeClr val="accent1"/>
-                  </a:effectRef>
-                  <a:fontRef idx="minor">
-                    <a:schemeClr val="lt1"/>
-                  </a:fontRef>
-                </p:style>
-                <p:txBody>
-                  <a:bodyPr rtlCol="0" anchor="ctr"/>
-                  <a:lstStyle/>
-                  <a:p>
-                    <a:pPr algn="ctr"/>
-                    <a:endParaRPr lang="en-US" sz="2000"/>
-                  </a:p>
-                </p:txBody>
-              </p:sp>
-              <p:sp>
-                <p:nvSpPr>
-                  <p:cNvPr id="56" name="TextBox 55"/>
-                  <p:cNvSpPr txBox="1"/>
-                  <p:nvPr/>
-                </p:nvSpPr>
-                <p:spPr>
-                  <a:xfrm>
-                    <a:off x="1500236" y="1028894"/>
-                    <a:ext cx="701346" cy="307777"/>
-                  </a:xfrm>
-                  <a:prstGeom prst="rect">
-                    <a:avLst/>
-                  </a:prstGeom>
-                  <a:noFill/>
-                </p:spPr>
-                <p:txBody>
-                  <a:bodyPr wrap="none" rtlCol="0">
-                    <a:spAutoFit/>
-                  </a:bodyPr>
-                  <a:lstStyle/>
-                  <a:p>
-                    <a:pPr algn="ctr"/>
-                    <a:r>
-                      <a:rPr lang="en-US" sz="1400" dirty="0" smtClean="0"/>
-                      <a:t>(W,5,</a:t>
-                    </a:r>
-                    <a:r>
-                      <a:rPr lang="en-US" sz="1400" dirty="0" smtClean="0"/>
-                      <a:t>–</a:t>
-                    </a:r>
-                    <a:r>
-                      <a:rPr lang="en-US" sz="1400" dirty="0" smtClean="0"/>
-                      <a:t>)</a:t>
-                    </a:r>
-                    <a:endParaRPr lang="en-US" sz="1400" dirty="0"/>
-                  </a:p>
-                </p:txBody>
-              </p:sp>
-            </p:grpSp>
-            <p:cxnSp>
-              <p:nvCxnSpPr>
-                <p:cNvPr id="30" name="Straight Arrow Connector 29"/>
-                <p:cNvCxnSpPr>
-                  <a:stCxn id="13" idx="2"/>
-                  <a:endCxn id="6" idx="7"/>
-                </p:cNvCxnSpPr>
-                <p:nvPr/>
-              </p:nvCxnSpPr>
-              <p:spPr>
-                <a:xfrm flipH="1">
-                  <a:off x="3146729" y="1421394"/>
-                  <a:ext cx="813943" cy="362862"/>
-                </a:xfrm>
-                <a:prstGeom prst="straightConnector1">
-                  <a:avLst/>
-                </a:prstGeom>
-                <a:ln>
-                  <a:solidFill>
-                    <a:schemeClr val="tx1"/>
-                  </a:solidFill>
-                  <a:tailEnd type="stealth"/>
-                </a:ln>
-              </p:spPr>
-              <p:style>
-                <a:lnRef idx="1">
-                  <a:schemeClr val="accent1"/>
-                </a:lnRef>
-                <a:fillRef idx="0">
-                  <a:schemeClr val="accent1"/>
-                </a:fillRef>
-                <a:effectRef idx="0">
-                  <a:schemeClr val="accent1"/>
-                </a:effectRef>
-                <a:fontRef idx="minor">
-                  <a:schemeClr val="tx1"/>
-                </a:fontRef>
-              </p:style>
-            </p:cxnSp>
-            <p:cxnSp>
-              <p:nvCxnSpPr>
-                <p:cNvPr id="31" name="Straight Arrow Connector 30"/>
-                <p:cNvCxnSpPr>
-                  <a:stCxn id="13" idx="3"/>
-                  <a:endCxn id="16" idx="0"/>
-                </p:cNvCxnSpPr>
-                <p:nvPr/>
-              </p:nvCxnSpPr>
-              <p:spPr>
-                <a:xfrm flipH="1">
-                  <a:off x="3834801" y="1619848"/>
-                  <a:ext cx="212193" cy="82205"/>
-                </a:xfrm>
-                <a:prstGeom prst="straightConnector1">
-                  <a:avLst/>
-                </a:prstGeom>
-                <a:ln>
-                  <a:solidFill>
-                    <a:schemeClr val="tx1"/>
-                  </a:solidFill>
-                  <a:tailEnd type="stealth"/>
-                </a:ln>
-              </p:spPr>
-              <p:style>
-                <a:lnRef idx="1">
-                  <a:schemeClr val="accent1"/>
-                </a:lnRef>
-                <a:fillRef idx="0">
-                  <a:schemeClr val="accent1"/>
-                </a:fillRef>
-                <a:effectRef idx="0">
-                  <a:schemeClr val="accent1"/>
-                </a:effectRef>
-                <a:fontRef idx="minor">
-                  <a:schemeClr val="tx1"/>
-                </a:fontRef>
-              </p:style>
-            </p:cxnSp>
-            <p:cxnSp>
-              <p:nvCxnSpPr>
-                <p:cNvPr id="32" name="Straight Arrow Connector 31"/>
-                <p:cNvCxnSpPr>
-                  <a:stCxn id="13" idx="5"/>
-                  <a:endCxn id="19" idx="0"/>
-                </p:cNvCxnSpPr>
-                <p:nvPr/>
-              </p:nvCxnSpPr>
-              <p:spPr>
-                <a:xfrm>
-                  <a:off x="4463791" y="1619848"/>
-                  <a:ext cx="239837" cy="82204"/>
-                </a:xfrm>
-                <a:prstGeom prst="straightConnector1">
-                  <a:avLst/>
-                </a:prstGeom>
-                <a:ln>
-                  <a:solidFill>
-                    <a:schemeClr val="tx1"/>
-                  </a:solidFill>
-                  <a:tailEnd type="stealth"/>
-                </a:ln>
-              </p:spPr>
-              <p:style>
-                <a:lnRef idx="1">
-                  <a:schemeClr val="accent1"/>
-                </a:lnRef>
-                <a:fillRef idx="0">
-                  <a:schemeClr val="accent1"/>
-                </a:fillRef>
-                <a:effectRef idx="0">
-                  <a:schemeClr val="accent1"/>
-                </a:effectRef>
-                <a:fontRef idx="minor">
-                  <a:schemeClr val="tx1"/>
-                </a:fontRef>
-              </p:style>
-            </p:cxnSp>
-            <p:cxnSp>
-              <p:nvCxnSpPr>
-                <p:cNvPr id="33" name="Straight Arrow Connector 32"/>
-                <p:cNvCxnSpPr>
-                  <a:stCxn id="13" idx="6"/>
-                  <a:endCxn id="22" idx="1"/>
-                </p:cNvCxnSpPr>
-                <p:nvPr/>
-              </p:nvCxnSpPr>
-              <p:spPr>
-                <a:xfrm>
-                  <a:off x="4550113" y="1421394"/>
-                  <a:ext cx="813943" cy="362860"/>
-                </a:xfrm>
-                <a:prstGeom prst="straightConnector1">
-                  <a:avLst/>
-                </a:prstGeom>
-                <a:ln>
-                  <a:solidFill>
-                    <a:schemeClr val="tx1"/>
-                  </a:solidFill>
-                  <a:tailEnd type="stealth"/>
-                </a:ln>
-              </p:spPr>
-              <p:style>
-                <a:lnRef idx="1">
-                  <a:schemeClr val="accent1"/>
-                </a:lnRef>
-                <a:fillRef idx="0">
-                  <a:schemeClr val="accent1"/>
-                </a:fillRef>
-                <a:effectRef idx="0">
-                  <a:schemeClr val="accent1"/>
-                </a:effectRef>
-                <a:fontRef idx="minor">
-                  <a:schemeClr val="tx1"/>
-                </a:fontRef>
-              </p:style>
-            </p:cxnSp>
-            <p:cxnSp>
-              <p:nvCxnSpPr>
-                <p:cNvPr id="34" name="Straight Arrow Connector 33"/>
-                <p:cNvCxnSpPr>
-                  <a:stCxn id="6" idx="3"/>
-                  <a:endCxn id="25" idx="0"/>
-                </p:cNvCxnSpPr>
-                <p:nvPr/>
-              </p:nvCxnSpPr>
-              <p:spPr>
-                <a:xfrm flipH="1">
-                  <a:off x="2458043" y="2181164"/>
-                  <a:ext cx="271889" cy="248084"/>
-                </a:xfrm>
-                <a:prstGeom prst="straightConnector1">
-                  <a:avLst/>
-                </a:prstGeom>
-                <a:ln>
-                  <a:solidFill>
-                    <a:schemeClr val="tx1"/>
-                  </a:solidFill>
-                  <a:prstDash val="lgDash"/>
-                  <a:tailEnd type="stealth"/>
-                </a:ln>
-              </p:spPr>
-              <p:style>
-                <a:lnRef idx="1">
-                  <a:schemeClr val="accent1"/>
-                </a:lnRef>
-                <a:fillRef idx="0">
-                  <a:schemeClr val="accent1"/>
-                </a:fillRef>
-                <a:effectRef idx="0">
-                  <a:schemeClr val="accent1"/>
-                </a:effectRef>
-                <a:fontRef idx="minor">
-                  <a:schemeClr val="tx1"/>
-                </a:fontRef>
-              </p:style>
-            </p:cxnSp>
-            <p:cxnSp>
-              <p:nvCxnSpPr>
-                <p:cNvPr id="35" name="Straight Arrow Connector 34"/>
-                <p:cNvCxnSpPr>
-                  <a:stCxn id="6" idx="5"/>
-                  <a:endCxn id="28" idx="0"/>
-                </p:cNvCxnSpPr>
-                <p:nvPr/>
-              </p:nvCxnSpPr>
-              <p:spPr>
-                <a:xfrm>
-                  <a:off x="3146729" y="2181164"/>
-                  <a:ext cx="183856" cy="279617"/>
-                </a:xfrm>
-                <a:prstGeom prst="straightConnector1">
-                  <a:avLst/>
-                </a:prstGeom>
-                <a:ln>
-                  <a:solidFill>
-                    <a:schemeClr val="tx1"/>
-                  </a:solidFill>
-                  <a:prstDash val="lgDash"/>
-                  <a:tailEnd type="stealth"/>
-                </a:ln>
-              </p:spPr>
-              <p:style>
-                <a:lnRef idx="1">
-                  <a:schemeClr val="accent1"/>
-                </a:lnRef>
-                <a:fillRef idx="0">
-                  <a:schemeClr val="accent1"/>
-                </a:fillRef>
-                <a:effectRef idx="0">
-                  <a:schemeClr val="accent1"/>
-                </a:effectRef>
-                <a:fontRef idx="minor">
-                  <a:schemeClr val="tx1"/>
-                </a:fontRef>
-              </p:style>
-            </p:cxnSp>
-            <p:cxnSp>
-              <p:nvCxnSpPr>
-                <p:cNvPr id="36" name="Straight Arrow Connector 35"/>
-                <p:cNvCxnSpPr/>
-                <p:nvPr/>
-              </p:nvCxnSpPr>
-              <p:spPr>
-                <a:xfrm>
-                  <a:off x="2709985" y="2908359"/>
-                  <a:ext cx="407260" cy="361154"/>
-                </a:xfrm>
-                <a:prstGeom prst="straightConnector1">
-                  <a:avLst/>
-                </a:prstGeom>
-                <a:ln>
-                  <a:solidFill>
-                    <a:schemeClr val="tx1"/>
-                  </a:solidFill>
-                  <a:prstDash val="lgDash"/>
-                  <a:tailEnd type="stealth"/>
-                </a:ln>
-              </p:spPr>
-              <p:style>
-                <a:lnRef idx="1">
-                  <a:schemeClr val="accent1"/>
-                </a:lnRef>
-                <a:fillRef idx="0">
-                  <a:schemeClr val="accent1"/>
-                </a:fillRef>
-                <a:effectRef idx="0">
-                  <a:schemeClr val="accent1"/>
-                </a:effectRef>
-                <a:fontRef idx="minor">
-                  <a:schemeClr val="tx1"/>
-                </a:fontRef>
-              </p:style>
-            </p:cxnSp>
-            <p:cxnSp>
-              <p:nvCxnSpPr>
-                <p:cNvPr id="37" name="Straight Arrow Connector 36"/>
-                <p:cNvCxnSpPr>
-                  <a:stCxn id="28" idx="4"/>
-                  <a:endCxn id="49" idx="0"/>
-                </p:cNvCxnSpPr>
-                <p:nvPr/>
-              </p:nvCxnSpPr>
-              <p:spPr>
-                <a:xfrm>
-                  <a:off x="3330585" y="3022095"/>
-                  <a:ext cx="11613" cy="201500"/>
-                </a:xfrm>
-                <a:prstGeom prst="straightConnector1">
-                  <a:avLst/>
-                </a:prstGeom>
-                <a:ln>
-                  <a:solidFill>
-                    <a:schemeClr val="tx1"/>
-                  </a:solidFill>
-                  <a:prstDash val="sysDash"/>
-                  <a:tailEnd type="stealth"/>
-                </a:ln>
-              </p:spPr>
-              <p:style>
-                <a:lnRef idx="1">
-                  <a:schemeClr val="accent1"/>
-                </a:lnRef>
-                <a:fillRef idx="0">
-                  <a:schemeClr val="accent1"/>
-                </a:fillRef>
-                <a:effectRef idx="0">
-                  <a:schemeClr val="accent1"/>
-                </a:effectRef>
-                <a:fontRef idx="minor">
-                  <a:schemeClr val="tx1"/>
-                </a:fontRef>
-              </p:style>
-            </p:cxnSp>
-            <p:cxnSp>
-              <p:nvCxnSpPr>
-                <p:cNvPr id="38" name="Straight Arrow Connector 37"/>
-                <p:cNvCxnSpPr>
-                  <a:stCxn id="22" idx="4"/>
-                  <a:endCxn id="34" idx="7"/>
-                </p:cNvCxnSpPr>
-                <p:nvPr/>
-              </p:nvCxnSpPr>
-              <p:spPr>
-                <a:xfrm flipH="1">
-                  <a:off x="5336334" y="2263365"/>
-                  <a:ext cx="236121" cy="302570"/>
-                </a:xfrm>
-                <a:prstGeom prst="straightConnector1">
-                  <a:avLst/>
-                </a:prstGeom>
-                <a:ln>
-                  <a:solidFill>
-                    <a:schemeClr val="tx1"/>
-                  </a:solidFill>
-                  <a:tailEnd type="stealth"/>
-                </a:ln>
-              </p:spPr>
-              <p:style>
-                <a:lnRef idx="1">
-                  <a:schemeClr val="accent1"/>
-                </a:lnRef>
-                <a:fillRef idx="0">
-                  <a:schemeClr val="accent1"/>
-                </a:fillRef>
-                <a:effectRef idx="0">
-                  <a:schemeClr val="accent1"/>
-                </a:effectRef>
-                <a:fontRef idx="minor">
-                  <a:schemeClr val="tx1"/>
-                </a:fontRef>
-              </p:style>
-            </p:cxnSp>
-            <p:cxnSp>
-              <p:nvCxnSpPr>
-                <p:cNvPr id="39" name="Straight Arrow Connector 38"/>
-                <p:cNvCxnSpPr>
-                  <a:stCxn id="19" idx="4"/>
-                  <a:endCxn id="34" idx="1"/>
-                </p:cNvCxnSpPr>
-                <p:nvPr/>
-              </p:nvCxnSpPr>
-              <p:spPr>
-                <a:xfrm>
-                  <a:off x="4703628" y="2263366"/>
-                  <a:ext cx="215909" cy="302569"/>
-                </a:xfrm>
-                <a:prstGeom prst="straightConnector1">
-                  <a:avLst/>
-                </a:prstGeom>
-                <a:ln>
-                  <a:solidFill>
-                    <a:schemeClr val="tx1"/>
-                  </a:solidFill>
-                  <a:tailEnd type="stealth"/>
-                </a:ln>
-              </p:spPr>
-              <p:style>
-                <a:lnRef idx="1">
-                  <a:schemeClr val="accent1"/>
-                </a:lnRef>
-                <a:fillRef idx="0">
-                  <a:schemeClr val="accent1"/>
-                </a:fillRef>
-                <a:effectRef idx="0">
-                  <a:schemeClr val="accent1"/>
-                </a:effectRef>
-                <a:fontRef idx="minor">
-                  <a:schemeClr val="tx1"/>
-                </a:fontRef>
-              </p:style>
-            </p:cxnSp>
-            <p:cxnSp>
-              <p:nvCxnSpPr>
-                <p:cNvPr id="40" name="Straight Arrow Connector 39"/>
-                <p:cNvCxnSpPr>
-                  <a:stCxn id="34" idx="4"/>
-                  <a:endCxn id="37" idx="0"/>
-                </p:cNvCxnSpPr>
-                <p:nvPr/>
-              </p:nvCxnSpPr>
-              <p:spPr>
-                <a:xfrm>
-                  <a:off x="5127936" y="3045046"/>
-                  <a:ext cx="0" cy="178550"/>
-                </a:xfrm>
-                <a:prstGeom prst="straightConnector1">
-                  <a:avLst/>
-                </a:prstGeom>
-                <a:ln>
-                  <a:solidFill>
-                    <a:schemeClr val="tx1"/>
-                  </a:solidFill>
-                  <a:tailEnd type="stealth"/>
-                </a:ln>
-              </p:spPr>
-              <p:style>
-                <a:lnRef idx="1">
-                  <a:schemeClr val="accent1"/>
-                </a:lnRef>
-                <a:fillRef idx="0">
-                  <a:schemeClr val="accent1"/>
-                </a:fillRef>
-                <a:effectRef idx="0">
-                  <a:schemeClr val="accent1"/>
-                </a:effectRef>
-                <a:fontRef idx="minor">
-                  <a:schemeClr val="tx1"/>
-                </a:fontRef>
-              </p:style>
-            </p:cxnSp>
-            <p:cxnSp>
-              <p:nvCxnSpPr>
-                <p:cNvPr id="41" name="Straight Arrow Connector 40"/>
-                <p:cNvCxnSpPr>
-                  <a:stCxn id="37" idx="5"/>
-                  <a:endCxn id="40" idx="0"/>
-                </p:cNvCxnSpPr>
-                <p:nvPr/>
-              </p:nvCxnSpPr>
-              <p:spPr>
-                <a:xfrm>
-                  <a:off x="5336334" y="3702707"/>
-                  <a:ext cx="216439" cy="156723"/>
-                </a:xfrm>
-                <a:prstGeom prst="straightConnector1">
-                  <a:avLst/>
-                </a:prstGeom>
-                <a:ln>
-                  <a:solidFill>
-                    <a:schemeClr val="tx1"/>
-                  </a:solidFill>
-                  <a:tailEnd type="stealth"/>
-                </a:ln>
-              </p:spPr>
-              <p:style>
-                <a:lnRef idx="1">
-                  <a:schemeClr val="accent1"/>
-                </a:lnRef>
-                <a:fillRef idx="0">
-                  <a:schemeClr val="accent1"/>
-                </a:fillRef>
-                <a:effectRef idx="0">
-                  <a:schemeClr val="accent1"/>
-                </a:effectRef>
-                <a:fontRef idx="minor">
-                  <a:schemeClr val="tx1"/>
-                </a:fontRef>
-              </p:style>
-            </p:cxnSp>
-            <p:cxnSp>
-              <p:nvCxnSpPr>
-                <p:cNvPr id="42" name="Straight Arrow Connector 41"/>
-                <p:cNvCxnSpPr>
-                  <a:stCxn id="37" idx="3"/>
-                  <a:endCxn id="46" idx="7"/>
-                </p:cNvCxnSpPr>
-                <p:nvPr/>
-              </p:nvCxnSpPr>
-              <p:spPr>
-                <a:xfrm flipH="1">
-                  <a:off x="4463791" y="3702707"/>
-                  <a:ext cx="455746" cy="237726"/>
-                </a:xfrm>
-                <a:prstGeom prst="straightConnector1">
-                  <a:avLst/>
-                </a:prstGeom>
-                <a:ln>
-                  <a:solidFill>
-                    <a:schemeClr val="tx1"/>
-                  </a:solidFill>
-                  <a:tailEnd type="stealth"/>
-                </a:ln>
-              </p:spPr>
-              <p:style>
-                <a:lnRef idx="1">
-                  <a:schemeClr val="accent1"/>
-                </a:lnRef>
-                <a:fillRef idx="0">
-                  <a:schemeClr val="accent1"/>
-                </a:fillRef>
-                <a:effectRef idx="0">
-                  <a:schemeClr val="accent1"/>
-                </a:effectRef>
-                <a:fontRef idx="minor">
-                  <a:schemeClr val="tx1"/>
-                </a:fontRef>
-              </p:style>
-            </p:cxnSp>
-            <p:cxnSp>
-              <p:nvCxnSpPr>
-                <p:cNvPr id="43" name="Straight Arrow Connector 42"/>
-                <p:cNvCxnSpPr>
-                  <a:stCxn id="40" idx="4"/>
-                  <a:endCxn id="55" idx="7"/>
-                </p:cNvCxnSpPr>
-                <p:nvPr/>
-              </p:nvCxnSpPr>
-              <p:spPr>
-                <a:xfrm flipH="1">
-                  <a:off x="5507171" y="4420744"/>
-                  <a:ext cx="45602" cy="152596"/>
-                </a:xfrm>
-                <a:prstGeom prst="straightConnector1">
-                  <a:avLst/>
-                </a:prstGeom>
-                <a:ln>
-                  <a:solidFill>
-                    <a:schemeClr val="tx1"/>
-                  </a:solidFill>
-                  <a:tailEnd type="stealth"/>
-                </a:ln>
-              </p:spPr>
-              <p:style>
-                <a:lnRef idx="1">
-                  <a:schemeClr val="accent1"/>
-                </a:lnRef>
-                <a:fillRef idx="0">
-                  <a:schemeClr val="accent1"/>
-                </a:fillRef>
-                <a:effectRef idx="0">
-                  <a:schemeClr val="accent1"/>
-                </a:effectRef>
-                <a:fontRef idx="minor">
-                  <a:schemeClr val="tx1"/>
-                </a:fontRef>
-              </p:style>
-            </p:cxnSp>
-            <p:cxnSp>
-              <p:nvCxnSpPr>
-                <p:cNvPr id="44" name="Straight Arrow Connector 43"/>
-                <p:cNvCxnSpPr>
-                  <a:stCxn id="46" idx="4"/>
-                  <a:endCxn id="52" idx="1"/>
-                </p:cNvCxnSpPr>
-                <p:nvPr/>
-              </p:nvCxnSpPr>
-              <p:spPr>
-                <a:xfrm>
-                  <a:off x="4255393" y="4419544"/>
-                  <a:ext cx="39261" cy="153796"/>
-                </a:xfrm>
-                <a:prstGeom prst="straightConnector1">
-                  <a:avLst/>
-                </a:prstGeom>
-                <a:ln>
-                  <a:solidFill>
-                    <a:schemeClr val="tx1"/>
-                  </a:solidFill>
-                  <a:tailEnd type="stealth"/>
-                </a:ln>
-              </p:spPr>
-              <p:style>
-                <a:lnRef idx="1">
-                  <a:schemeClr val="accent1"/>
-                </a:lnRef>
-                <a:fillRef idx="0">
-                  <a:schemeClr val="accent1"/>
-                </a:fillRef>
-                <a:effectRef idx="0">
-                  <a:schemeClr val="accent1"/>
-                </a:effectRef>
-                <a:fontRef idx="minor">
-                  <a:schemeClr val="tx1"/>
-                </a:fontRef>
-              </p:style>
-            </p:cxnSp>
-            <p:cxnSp>
-              <p:nvCxnSpPr>
-                <p:cNvPr id="45" name="Straight Arrow Connector 44"/>
-                <p:cNvCxnSpPr>
-                  <a:stCxn id="37" idx="2"/>
-                  <a:endCxn id="43" idx="6"/>
-                </p:cNvCxnSpPr>
-                <p:nvPr/>
-              </p:nvCxnSpPr>
-              <p:spPr>
-                <a:xfrm flipH="1" flipV="1">
-                  <a:off x="4550113" y="3504252"/>
-                  <a:ext cx="283102" cy="1"/>
-                </a:xfrm>
-                <a:prstGeom prst="straightConnector1">
-                  <a:avLst/>
-                </a:prstGeom>
-                <a:ln>
-                  <a:solidFill>
-                    <a:schemeClr val="tx1"/>
-                  </a:solidFill>
-                  <a:prstDash val="lgDash"/>
-                  <a:tailEnd type="stealth"/>
-                </a:ln>
-              </p:spPr>
-              <p:style>
-                <a:lnRef idx="1">
-                  <a:schemeClr val="accent1"/>
-                </a:lnRef>
-                <a:fillRef idx="0">
-                  <a:schemeClr val="accent1"/>
-                </a:fillRef>
-                <a:effectRef idx="0">
-                  <a:schemeClr val="accent1"/>
-                </a:effectRef>
-                <a:fontRef idx="minor">
-                  <a:schemeClr val="tx1"/>
-                </a:fontRef>
-              </p:style>
-            </p:cxnSp>
-            <p:cxnSp>
-              <p:nvCxnSpPr>
-                <p:cNvPr id="46" name="Straight Arrow Connector 45"/>
-                <p:cNvCxnSpPr>
-                  <a:stCxn id="37" idx="1"/>
-                  <a:endCxn id="31" idx="5"/>
-                </p:cNvCxnSpPr>
-                <p:nvPr/>
-              </p:nvCxnSpPr>
-              <p:spPr>
-                <a:xfrm flipH="1" flipV="1">
-                  <a:off x="4452178" y="2939892"/>
-                  <a:ext cx="467359" cy="365907"/>
-                </a:xfrm>
-                <a:prstGeom prst="straightConnector1">
-                  <a:avLst/>
-                </a:prstGeom>
-                <a:ln>
-                  <a:solidFill>
-                    <a:schemeClr val="tx1"/>
-                  </a:solidFill>
-                  <a:prstDash val="lgDash"/>
-                  <a:tailEnd type="stealth"/>
-                </a:ln>
-              </p:spPr>
-              <p:style>
-                <a:lnRef idx="1">
-                  <a:schemeClr val="accent1"/>
-                </a:lnRef>
-                <a:fillRef idx="0">
-                  <a:schemeClr val="accent1"/>
-                </a:fillRef>
-                <a:effectRef idx="0">
-                  <a:schemeClr val="accent1"/>
-                </a:effectRef>
-                <a:fontRef idx="minor">
-                  <a:schemeClr val="tx1"/>
-                </a:fontRef>
-              </p:style>
-            </p:cxnSp>
-            <p:cxnSp>
-              <p:nvCxnSpPr>
-                <p:cNvPr id="47" name="Straight Arrow Connector 46"/>
-                <p:cNvCxnSpPr/>
-                <p:nvPr/>
-              </p:nvCxnSpPr>
-              <p:spPr>
-                <a:xfrm>
-                  <a:off x="3648531" y="3449822"/>
-                  <a:ext cx="312141" cy="0"/>
-                </a:xfrm>
-                <a:prstGeom prst="straightConnector1">
-                  <a:avLst/>
-                </a:prstGeom>
-                <a:ln>
-                  <a:solidFill>
-                    <a:schemeClr val="tx1"/>
-                  </a:solidFill>
-                  <a:prstDash val="lgDash"/>
-                  <a:tailEnd type="stealth"/>
-                </a:ln>
-              </p:spPr>
-              <p:style>
-                <a:lnRef idx="1">
-                  <a:schemeClr val="accent1"/>
-                </a:lnRef>
-                <a:fillRef idx="0">
-                  <a:schemeClr val="accent1"/>
-                </a:fillRef>
-                <a:effectRef idx="0">
-                  <a:schemeClr val="accent1"/>
-                </a:effectRef>
-                <a:fontRef idx="minor">
-                  <a:schemeClr val="tx1"/>
-                </a:fontRef>
-              </p:style>
-            </p:cxnSp>
-            <p:cxnSp>
-              <p:nvCxnSpPr>
-                <p:cNvPr id="48" name="Straight Arrow Connector 47"/>
-                <p:cNvCxnSpPr/>
-                <p:nvPr/>
-              </p:nvCxnSpPr>
-              <p:spPr>
-                <a:xfrm>
-                  <a:off x="3583254" y="3724478"/>
-                  <a:ext cx="374799" cy="284942"/>
-                </a:xfrm>
-                <a:prstGeom prst="straightConnector1">
-                  <a:avLst/>
-                </a:prstGeom>
-                <a:ln>
-                  <a:solidFill>
-                    <a:schemeClr val="tx1"/>
-                  </a:solidFill>
-                  <a:tailEnd type="stealth"/>
-                </a:ln>
-              </p:spPr>
-              <p:style>
-                <a:lnRef idx="1">
-                  <a:schemeClr val="accent1"/>
-                </a:lnRef>
-                <a:fillRef idx="0">
-                  <a:schemeClr val="accent1"/>
-                </a:fillRef>
-                <a:effectRef idx="0">
-                  <a:schemeClr val="accent1"/>
-                </a:effectRef>
-                <a:fontRef idx="minor">
-                  <a:schemeClr val="tx1"/>
-                </a:fontRef>
-              </p:style>
-            </p:cxnSp>
-            <p:cxnSp>
-              <p:nvCxnSpPr>
-                <p:cNvPr id="49" name="Straight Arrow Connector 48"/>
-                <p:cNvCxnSpPr/>
-                <p:nvPr/>
-              </p:nvCxnSpPr>
-              <p:spPr>
-                <a:xfrm flipV="1">
-                  <a:off x="3612281" y="3005207"/>
-                  <a:ext cx="484785" cy="365906"/>
-                </a:xfrm>
-                <a:prstGeom prst="straightConnector1">
-                  <a:avLst/>
-                </a:prstGeom>
-                <a:ln>
-                  <a:solidFill>
-                    <a:schemeClr val="tx1"/>
-                  </a:solidFill>
-                  <a:prstDash val="lgDash"/>
-                  <a:tailEnd type="stealth"/>
-                </a:ln>
-              </p:spPr>
-              <p:style>
-                <a:lnRef idx="1">
-                  <a:schemeClr val="accent1"/>
-                </a:lnRef>
-                <a:fillRef idx="0">
-                  <a:schemeClr val="accent1"/>
-                </a:fillRef>
-                <a:effectRef idx="0">
-                  <a:schemeClr val="accent1"/>
-                </a:effectRef>
-                <a:fontRef idx="minor">
-                  <a:schemeClr val="tx1"/>
-                </a:fontRef>
-              </p:style>
-            </p:cxnSp>
-            <p:cxnSp>
-              <p:nvCxnSpPr>
-                <p:cNvPr id="50" name="Straight Arrow Connector 49"/>
-                <p:cNvCxnSpPr/>
-                <p:nvPr/>
-              </p:nvCxnSpPr>
-              <p:spPr>
-                <a:xfrm flipH="1">
-                  <a:off x="3510681" y="2903607"/>
-                  <a:ext cx="484785" cy="365906"/>
-                </a:xfrm>
-                <a:prstGeom prst="straightConnector1">
-                  <a:avLst/>
-                </a:prstGeom>
-                <a:ln>
-                  <a:solidFill>
-                    <a:schemeClr val="tx1"/>
-                  </a:solidFill>
-                  <a:tailEnd type="stealth"/>
-                </a:ln>
-              </p:spPr>
-              <p:style>
-                <a:lnRef idx="1">
-                  <a:schemeClr val="accent1"/>
-                </a:lnRef>
-                <a:fillRef idx="0">
-                  <a:schemeClr val="accent1"/>
-                </a:fillRef>
-                <a:effectRef idx="0">
-                  <a:schemeClr val="accent1"/>
-                </a:effectRef>
-                <a:fontRef idx="minor">
-                  <a:schemeClr val="tx1"/>
-                </a:fontRef>
-              </p:style>
-            </p:cxnSp>
-            <p:cxnSp>
-              <p:nvCxnSpPr>
-                <p:cNvPr id="51" name="Straight Arrow Connector 50"/>
-                <p:cNvCxnSpPr/>
-                <p:nvPr/>
-              </p:nvCxnSpPr>
-              <p:spPr>
-                <a:xfrm flipH="1">
-                  <a:off x="3637645" y="3558681"/>
-                  <a:ext cx="312141" cy="0"/>
-                </a:xfrm>
-                <a:prstGeom prst="straightConnector1">
-                  <a:avLst/>
-                </a:prstGeom>
-                <a:ln>
-                  <a:solidFill>
-                    <a:schemeClr val="tx1"/>
-                  </a:solidFill>
-                  <a:prstDash val="lgDash"/>
-                  <a:tailEnd type="stealth"/>
-                </a:ln>
-              </p:spPr>
-              <p:style>
-                <a:lnRef idx="1">
-                  <a:schemeClr val="accent1"/>
-                </a:lnRef>
-                <a:fillRef idx="0">
-                  <a:schemeClr val="accent1"/>
-                </a:fillRef>
-                <a:effectRef idx="0">
-                  <a:schemeClr val="accent1"/>
-                </a:effectRef>
-                <a:fontRef idx="minor">
-                  <a:schemeClr val="tx1"/>
-                </a:fontRef>
-              </p:style>
-            </p:cxnSp>
-            <p:cxnSp>
-              <p:nvCxnSpPr>
-                <p:cNvPr id="52" name="Straight Arrow Connector 51"/>
-                <p:cNvCxnSpPr/>
-                <p:nvPr/>
-              </p:nvCxnSpPr>
-              <p:spPr>
-                <a:xfrm flipH="1" flipV="1">
-                  <a:off x="3475119" y="3801319"/>
-                  <a:ext cx="444870" cy="338884"/>
-                </a:xfrm>
-                <a:prstGeom prst="straightConnector1">
-                  <a:avLst/>
-                </a:prstGeom>
-                <a:ln>
-                  <a:solidFill>
-                    <a:schemeClr val="tx1"/>
-                  </a:solidFill>
-                  <a:prstDash val="lgDash"/>
-                  <a:tailEnd type="stealth"/>
-                </a:ln>
-              </p:spPr>
-              <p:style>
-                <a:lnRef idx="1">
-                  <a:schemeClr val="accent1"/>
-                </a:lnRef>
-                <a:fillRef idx="0">
-                  <a:schemeClr val="accent1"/>
-                </a:fillRef>
-                <a:effectRef idx="0">
-                  <a:schemeClr val="accent1"/>
-                </a:effectRef>
-                <a:fontRef idx="minor">
-                  <a:schemeClr val="tx1"/>
-                </a:fontRef>
-              </p:style>
-            </p:cxnSp>
-            <p:cxnSp>
-              <p:nvCxnSpPr>
-                <p:cNvPr id="53" name="Straight Arrow Connector 52"/>
-                <p:cNvCxnSpPr/>
-                <p:nvPr/>
-              </p:nvCxnSpPr>
-              <p:spPr>
-                <a:xfrm flipH="1" flipV="1">
-                  <a:off x="2621601" y="2979730"/>
-                  <a:ext cx="407260" cy="361154"/>
-                </a:xfrm>
-                <a:prstGeom prst="straightConnector1">
-                  <a:avLst/>
-                </a:prstGeom>
-                <a:ln>
-                  <a:solidFill>
-                    <a:schemeClr val="tx1"/>
-                  </a:solidFill>
-                  <a:prstDash val="lgDash"/>
-                  <a:tailEnd type="stealth"/>
-                </a:ln>
-              </p:spPr>
-              <p:style>
-                <a:lnRef idx="1">
-                  <a:schemeClr val="accent1"/>
-                </a:lnRef>
-                <a:fillRef idx="0">
-                  <a:schemeClr val="accent1"/>
-                </a:fillRef>
-                <a:effectRef idx="0">
-                  <a:schemeClr val="accent1"/>
-                </a:effectRef>
-                <a:fontRef idx="minor">
-                  <a:schemeClr val="tx1"/>
-                </a:fontRef>
-              </p:style>
-            </p:cxnSp>
-            <p:cxnSp>
-              <p:nvCxnSpPr>
-                <p:cNvPr id="54" name="Straight Arrow Connector 53"/>
-                <p:cNvCxnSpPr>
-                  <a:stCxn id="16" idx="4"/>
-                  <a:endCxn id="31" idx="1"/>
-                </p:cNvCxnSpPr>
-                <p:nvPr/>
-              </p:nvCxnSpPr>
-              <p:spPr>
-                <a:xfrm>
-                  <a:off x="3834801" y="2263367"/>
-                  <a:ext cx="200580" cy="279617"/>
-                </a:xfrm>
-                <a:prstGeom prst="straightConnector1">
-                  <a:avLst/>
-                </a:prstGeom>
-                <a:ln>
-                  <a:solidFill>
-                    <a:schemeClr val="tx1"/>
-                  </a:solidFill>
-                  <a:tailEnd type="stealth"/>
-                </a:ln>
-              </p:spPr>
-              <p:style>
-                <a:lnRef idx="1">
-                  <a:schemeClr val="accent1"/>
-                </a:lnRef>
-                <a:fillRef idx="0">
-                  <a:schemeClr val="accent1"/>
-                </a:fillRef>
-                <a:effectRef idx="0">
-                  <a:schemeClr val="accent1"/>
-                </a:effectRef>
-                <a:fontRef idx="minor">
-                  <a:schemeClr val="tx1"/>
-                </a:fontRef>
-              </p:style>
-            </p:cxnSp>
-          </p:grpSp>
-          <p:sp>
-            <p:nvSpPr>
-              <p:cNvPr id="8" name="TextBox 7"/>
-              <p:cNvSpPr txBox="1"/>
-              <p:nvPr/>
-            </p:nvSpPr>
-            <p:spPr>
-              <a:xfrm>
-                <a:off x="3661110" y="4994953"/>
-                <a:ext cx="934102" cy="338554"/>
-              </a:xfrm>
-              <a:prstGeom prst="rect">
-                <a:avLst/>
-              </a:prstGeom>
-              <a:noFill/>
-            </p:spPr>
-            <p:txBody>
-              <a:bodyPr wrap="none" rtlCol="0">
-                <a:spAutoFit/>
-              </a:bodyPr>
-              <a:lstStyle/>
-              <a:p>
-                <a:pPr algn="ctr"/>
-                <a:r>
-                  <a:rPr lang="en-US" sz="1600" dirty="0" err="1" smtClean="0"/>
-                  <a:t>Prefs</a:t>
-                </a:r>
-                <a:r>
-                  <a:rPr lang="en-US" sz="1600" dirty="0" smtClean="0"/>
-                  <a:t>: {2}</a:t>
-                </a:r>
-                <a:endParaRPr lang="en-US" sz="1600" dirty="0"/>
-              </a:p>
-            </p:txBody>
-          </p:sp>
-          <p:grpSp>
-            <p:nvGrpSpPr>
-              <p:cNvPr id="9" name="Group 8"/>
-              <p:cNvGrpSpPr/>
-              <p:nvPr/>
-            </p:nvGrpSpPr>
-            <p:grpSpPr>
-              <a:xfrm>
-                <a:off x="4591034" y="5157969"/>
-                <a:ext cx="589441" cy="561314"/>
-                <a:chOff x="4591034" y="5157969"/>
-                <a:chExt cx="589441" cy="561314"/>
-              </a:xfrm>
-            </p:grpSpPr>
-            <p:sp>
-              <p:nvSpPr>
-                <p:cNvPr id="12" name="Oval 11"/>
-                <p:cNvSpPr/>
-                <p:nvPr/>
-              </p:nvSpPr>
-              <p:spPr>
-                <a:xfrm>
-                  <a:off x="4591034" y="5157969"/>
-                  <a:ext cx="589441" cy="561314"/>
-                </a:xfrm>
-                <a:prstGeom prst="ellipse">
-                  <a:avLst/>
-                </a:prstGeom>
-                <a:solidFill>
-                  <a:schemeClr val="bg1"/>
-                </a:solidFill>
-                <a:ln w="9525">
-                  <a:solidFill>
-                    <a:schemeClr val="tx1"/>
-                  </a:solidFill>
-                </a:ln>
-              </p:spPr>
-              <p:style>
-                <a:lnRef idx="2">
-                  <a:schemeClr val="accent1">
-                    <a:shade val="50000"/>
-                  </a:schemeClr>
-                </a:lnRef>
-                <a:fillRef idx="1">
-                  <a:schemeClr val="accent1"/>
-                </a:fillRef>
-                <a:effectRef idx="0">
-                  <a:schemeClr val="accent1"/>
-                </a:effectRef>
-                <a:fontRef idx="minor">
-                  <a:schemeClr val="lt1"/>
-                </a:fontRef>
-              </p:style>
-              <p:txBody>
-                <a:bodyPr rtlCol="0" anchor="ctr"/>
-                <a:lstStyle/>
-                <a:p>
-                  <a:pPr algn="ctr"/>
-                  <a:endParaRPr lang="en-US" sz="2000"/>
-                </a:p>
-              </p:txBody>
-            </p:sp>
-            <p:sp>
-              <p:nvSpPr>
-                <p:cNvPr id="13" name="TextBox 12"/>
-                <p:cNvSpPr txBox="1"/>
-                <p:nvPr/>
-              </p:nvSpPr>
-              <p:spPr>
-                <a:xfrm>
-                  <a:off x="4664545" y="5300126"/>
-                  <a:ext cx="455573" cy="307777"/>
-                </a:xfrm>
-                <a:prstGeom prst="rect">
-                  <a:avLst/>
-                </a:prstGeom>
-                <a:noFill/>
-              </p:spPr>
-              <p:txBody>
-                <a:bodyPr wrap="none" rtlCol="0">
-                  <a:spAutoFit/>
-                </a:bodyPr>
-                <a:lstStyle/>
-                <a:p>
-                  <a:pPr algn="ctr"/>
-                  <a:r>
-                    <a:rPr lang="en-US" sz="1400" i="1" dirty="0" smtClean="0"/>
-                    <a:t>end</a:t>
-                  </a:r>
-                  <a:endParaRPr lang="en-US" sz="1400" i="1" dirty="0"/>
-                </a:p>
-              </p:txBody>
-            </p:sp>
-          </p:grpSp>
-          <p:cxnSp>
-            <p:nvCxnSpPr>
-              <p:cNvPr id="10" name="Straight Arrow Connector 9"/>
-              <p:cNvCxnSpPr>
-                <a:endCxn id="83" idx="7"/>
-              </p:cNvCxnSpPr>
-              <p:nvPr/>
-            </p:nvCxnSpPr>
-            <p:spPr>
-              <a:xfrm flipH="1">
-                <a:off x="5094153" y="5040535"/>
-                <a:ext cx="82628" cy="199637"/>
-              </a:xfrm>
-              <a:prstGeom prst="straightConnector1">
-                <a:avLst/>
-              </a:prstGeom>
-              <a:ln>
-                <a:solidFill>
-                  <a:schemeClr val="tx1"/>
-                </a:solidFill>
-                <a:tailEnd type="stealth"/>
-              </a:ln>
-            </p:spPr>
-            <p:style>
-              <a:lnRef idx="1">
-                <a:schemeClr val="accent1"/>
-              </a:lnRef>
-              <a:fillRef idx="0">
-                <a:schemeClr val="accent1"/>
-              </a:fillRef>
-              <a:effectRef idx="0">
-                <a:schemeClr val="accent1"/>
-              </a:effectRef>
-              <a:fontRef idx="minor">
-                <a:schemeClr val="tx1"/>
-              </a:fontRef>
-            </p:style>
-          </p:cxnSp>
-          <p:cxnSp>
-            <p:nvCxnSpPr>
-              <p:cNvPr id="11" name="Straight Arrow Connector 10"/>
-              <p:cNvCxnSpPr/>
-              <p:nvPr/>
-            </p:nvCxnSpPr>
-            <p:spPr>
-              <a:xfrm>
-                <a:off x="4596323" y="5036201"/>
-                <a:ext cx="81033" cy="192469"/>
-              </a:xfrm>
-              <a:prstGeom prst="straightConnector1">
-                <a:avLst/>
-              </a:prstGeom>
-              <a:ln>
-                <a:solidFill>
-                  <a:schemeClr val="tx1"/>
-                </a:solidFill>
-                <a:tailEnd type="stealth"/>
-              </a:ln>
-            </p:spPr>
-            <p:style>
-              <a:lnRef idx="1">
-                <a:schemeClr val="accent1"/>
-              </a:lnRef>
-              <a:fillRef idx="0">
-                <a:schemeClr val="accent1"/>
-              </a:fillRef>
-              <a:effectRef idx="0">
-                <a:schemeClr val="accent1"/>
-              </a:effectRef>
-              <a:fontRef idx="minor">
-                <a:schemeClr val="tx1"/>
-              </a:fontRef>
-            </p:style>
-          </p:cxnSp>
-        </p:grpSp>
-        <p:sp>
-          <p:nvSpPr>
-            <p:cNvPr id="6" name="TextBox 5"/>
-            <p:cNvSpPr txBox="1"/>
-            <p:nvPr/>
-          </p:nvSpPr>
-          <p:spPr>
-            <a:xfrm>
-              <a:off x="5183469" y="4989754"/>
-              <a:ext cx="934102" cy="338554"/>
-            </a:xfrm>
-            <a:prstGeom prst="rect">
-              <a:avLst/>
-            </a:prstGeom>
-            <a:noFill/>
-          </p:spPr>
-          <p:txBody>
-            <a:bodyPr wrap="none" rtlCol="0">
-              <a:spAutoFit/>
-            </a:bodyPr>
-            <a:lstStyle/>
-            <a:p>
-              <a:pPr algn="ctr"/>
-              <a:r>
-                <a:rPr lang="en-US" sz="1600" dirty="0" err="1" smtClean="0"/>
-                <a:t>Prefs</a:t>
-              </a:r>
-              <a:r>
-                <a:rPr lang="en-US" sz="1600" dirty="0" smtClean="0"/>
-                <a:t>: {1}</a:t>
-              </a:r>
-              <a:endParaRPr lang="en-US" sz="1600" dirty="0"/>
-            </a:p>
-          </p:txBody>
-        </p:sp>
-      </p:grpSp>
+          <a:prstGeom prst="rect">
+            <a:avLst/>
+          </a:prstGeom>
+        </p:spPr>
+      </p:pic>
     </p:spTree>
     <p:extLst>
       <p:ext uri="{BB962C8B-B14F-4D97-AF65-F5344CB8AC3E}">

</xml_diff>